<commit_message>
added figures to presentation
</commit_message>
<xml_diff>
--- a/presentation/presentation.pptx
+++ b/presentation/presentation.pptx
@@ -663,7 +663,7 @@
           <a:p>
             <a:fld id="{C6F05EAB-B404-4249-9B6E-2AB49D341D90}" type="datetimeFigureOut">
               <a:rPr lang="aa-ET" smtClean="0"/>
-              <a:t>24/11/2021</a:t>
+              <a:t>28/11/2021</a:t>
             </a:fld>
             <a:endParaRPr lang="aa-ET"/>
           </a:p>
@@ -1132,7 +1132,7 @@
           <a:p>
             <a:fld id="{C1520061-EEF2-4648-A61C-FD1D344FB2F0}" type="datetimeFigureOut">
               <a:rPr lang="aa-ET" smtClean="0"/>
-              <a:t>24/11/2021</a:t>
+              <a:t>28/11/2021</a:t>
             </a:fld>
             <a:endParaRPr lang="aa-ET"/>
           </a:p>
@@ -1302,7 +1302,7 @@
           <a:p>
             <a:fld id="{C1520061-EEF2-4648-A61C-FD1D344FB2F0}" type="datetimeFigureOut">
               <a:rPr lang="aa-ET" smtClean="0"/>
-              <a:t>24/11/2021</a:t>
+              <a:t>28/11/2021</a:t>
             </a:fld>
             <a:endParaRPr lang="aa-ET"/>
           </a:p>
@@ -1482,7 +1482,7 @@
           <a:p>
             <a:fld id="{C1520061-EEF2-4648-A61C-FD1D344FB2F0}" type="datetimeFigureOut">
               <a:rPr lang="aa-ET" smtClean="0"/>
-              <a:t>24/11/2021</a:t>
+              <a:t>28/11/2021</a:t>
             </a:fld>
             <a:endParaRPr lang="aa-ET"/>
           </a:p>
@@ -1652,7 +1652,7 @@
           <a:p>
             <a:fld id="{C1520061-EEF2-4648-A61C-FD1D344FB2F0}" type="datetimeFigureOut">
               <a:rPr lang="aa-ET" smtClean="0"/>
-              <a:t>24/11/2021</a:t>
+              <a:t>28/11/2021</a:t>
             </a:fld>
             <a:endParaRPr lang="aa-ET"/>
           </a:p>
@@ -1896,7 +1896,7 @@
           <a:p>
             <a:fld id="{C1520061-EEF2-4648-A61C-FD1D344FB2F0}" type="datetimeFigureOut">
               <a:rPr lang="aa-ET" smtClean="0"/>
-              <a:t>24/11/2021</a:t>
+              <a:t>28/11/2021</a:t>
             </a:fld>
             <a:endParaRPr lang="aa-ET"/>
           </a:p>
@@ -2128,7 +2128,7 @@
           <a:p>
             <a:fld id="{C1520061-EEF2-4648-A61C-FD1D344FB2F0}" type="datetimeFigureOut">
               <a:rPr lang="aa-ET" smtClean="0"/>
-              <a:t>24/11/2021</a:t>
+              <a:t>28/11/2021</a:t>
             </a:fld>
             <a:endParaRPr lang="aa-ET"/>
           </a:p>
@@ -2495,7 +2495,7 @@
           <a:p>
             <a:fld id="{C1520061-EEF2-4648-A61C-FD1D344FB2F0}" type="datetimeFigureOut">
               <a:rPr lang="aa-ET" smtClean="0"/>
-              <a:t>24/11/2021</a:t>
+              <a:t>28/11/2021</a:t>
             </a:fld>
             <a:endParaRPr lang="aa-ET"/>
           </a:p>
@@ -2613,7 +2613,7 @@
           <a:p>
             <a:fld id="{C1520061-EEF2-4648-A61C-FD1D344FB2F0}" type="datetimeFigureOut">
               <a:rPr lang="aa-ET" smtClean="0"/>
-              <a:t>24/11/2021</a:t>
+              <a:t>28/11/2021</a:t>
             </a:fld>
             <a:endParaRPr lang="aa-ET"/>
           </a:p>
@@ -2708,7 +2708,7 @@
           <a:p>
             <a:fld id="{C1520061-EEF2-4648-A61C-FD1D344FB2F0}" type="datetimeFigureOut">
               <a:rPr lang="aa-ET" smtClean="0"/>
-              <a:t>24/11/2021</a:t>
+              <a:t>28/11/2021</a:t>
             </a:fld>
             <a:endParaRPr lang="aa-ET"/>
           </a:p>
@@ -2985,7 +2985,7 @@
           <a:p>
             <a:fld id="{C1520061-EEF2-4648-A61C-FD1D344FB2F0}" type="datetimeFigureOut">
               <a:rPr lang="aa-ET" smtClean="0"/>
-              <a:t>24/11/2021</a:t>
+              <a:t>28/11/2021</a:t>
             </a:fld>
             <a:endParaRPr lang="aa-ET"/>
           </a:p>
@@ -3242,7 +3242,7 @@
           <a:p>
             <a:fld id="{C1520061-EEF2-4648-A61C-FD1D344FB2F0}" type="datetimeFigureOut">
               <a:rPr lang="aa-ET" smtClean="0"/>
-              <a:t>24/11/2021</a:t>
+              <a:t>28/11/2021</a:t>
             </a:fld>
             <a:endParaRPr lang="aa-ET"/>
           </a:p>
@@ -3455,7 +3455,7 @@
           <a:p>
             <a:fld id="{C1520061-EEF2-4648-A61C-FD1D344FB2F0}" type="datetimeFigureOut">
               <a:rPr lang="aa-ET" smtClean="0"/>
-              <a:t>24/11/2021</a:t>
+              <a:t>28/11/2021</a:t>
             </a:fld>
             <a:endParaRPr lang="aa-ET"/>
           </a:p>
@@ -4141,7 +4141,7 @@
           <p:cNvPr id="24" name="Straight Connector 23">
             <a:extLst>
               <a:ext uri="{FF2B5EF4-FFF2-40B4-BE49-F238E27FC236}">
-                <a16:creationId xmlns:a16="http://schemas.microsoft.com/office/drawing/2014/main" xmlns="" id="{3CD061AB-8876-704F-BE6A-E397F33852E1}"/>
+                <a16:creationId xmlns="" xmlns:a16="http://schemas.microsoft.com/office/drawing/2014/main" id="{3CD061AB-8876-704F-BE6A-E397F33852E1}"/>
               </a:ext>
             </a:extLst>
           </p:cNvPr>
@@ -4184,7 +4184,7 @@
           <p:cNvPr id="128" name="Round Same Side Corner Rectangle 137">
             <a:extLst>
               <a:ext uri="{FF2B5EF4-FFF2-40B4-BE49-F238E27FC236}">
-                <a16:creationId xmlns:a16="http://schemas.microsoft.com/office/drawing/2014/main" xmlns="" id="{85003210-220B-9A49-8091-B1A85DD76CE8}"/>
+                <a16:creationId xmlns="" xmlns:a16="http://schemas.microsoft.com/office/drawing/2014/main" id="{85003210-220B-9A49-8091-B1A85DD76CE8}"/>
               </a:ext>
             </a:extLst>
           </p:cNvPr>
@@ -4248,7 +4248,7 @@
           <p:cNvPr id="129" name="Round Same Side Corner Rectangle 137">
             <a:extLst>
               <a:ext uri="{FF2B5EF4-FFF2-40B4-BE49-F238E27FC236}">
-                <a16:creationId xmlns:a16="http://schemas.microsoft.com/office/drawing/2014/main" xmlns="" id="{7226A277-A8A7-9549-8FCF-1175CB0CE7B6}"/>
+                <a16:creationId xmlns="" xmlns:a16="http://schemas.microsoft.com/office/drawing/2014/main" id="{7226A277-A8A7-9549-8FCF-1175CB0CE7B6}"/>
               </a:ext>
             </a:extLst>
           </p:cNvPr>
@@ -4312,7 +4312,7 @@
           <p:cNvPr id="130" name="Round Same Side Corner Rectangle 137">
             <a:extLst>
               <a:ext uri="{FF2B5EF4-FFF2-40B4-BE49-F238E27FC236}">
-                <a16:creationId xmlns:a16="http://schemas.microsoft.com/office/drawing/2014/main" xmlns="" id="{0D73ACE7-C686-234D-9978-B3229B92843A}"/>
+                <a16:creationId xmlns="" xmlns:a16="http://schemas.microsoft.com/office/drawing/2014/main" id="{0D73ACE7-C686-234D-9978-B3229B92843A}"/>
               </a:ext>
             </a:extLst>
           </p:cNvPr>
@@ -4321,7 +4321,7 @@
         </p:nvSpPr>
         <p:spPr>
           <a:xfrm>
-            <a:off x="252208" y="17686481"/>
+            <a:off x="249258" y="18099845"/>
             <a:ext cx="20880000" cy="540000"/>
           </a:xfrm>
           <a:prstGeom prst="round2SameRect">
@@ -4376,7 +4376,7 @@
           <p:cNvPr id="91" name="TextBox 90">
             <a:extLst>
               <a:ext uri="{FF2B5EF4-FFF2-40B4-BE49-F238E27FC236}">
-                <a16:creationId xmlns:a16="http://schemas.microsoft.com/office/drawing/2014/main" xmlns="" id="{CE8C58B8-C0BC-CE41-9C20-5C588C41F47C}"/>
+                <a16:creationId xmlns="" xmlns:a16="http://schemas.microsoft.com/office/drawing/2014/main" id="{CE8C58B8-C0BC-CE41-9C20-5C588C41F47C}"/>
               </a:ext>
             </a:extLst>
           </p:cNvPr>
@@ -4445,7 +4445,7 @@
           <p:cNvPr id="3" name="Billede 6">
             <a:extLst>
               <a:ext uri="{FF2B5EF4-FFF2-40B4-BE49-F238E27FC236}">
-                <a16:creationId xmlns:a16="http://schemas.microsoft.com/office/drawing/2014/main" xmlns="" id="{79D342DF-0A65-4821-8F47-A3CE1793E1E6}"/>
+                <a16:creationId xmlns="" xmlns:a16="http://schemas.microsoft.com/office/drawing/2014/main" id="{79D342DF-0A65-4821-8F47-A3CE1793E1E6}"/>
               </a:ext>
             </a:extLst>
           </p:cNvPr>
@@ -4475,7 +4475,7 @@
           <p:cNvPr id="4" name="Rectangle 3">
             <a:extLst>
               <a:ext uri="{FF2B5EF4-FFF2-40B4-BE49-F238E27FC236}">
-                <a16:creationId xmlns:a16="http://schemas.microsoft.com/office/drawing/2014/main" xmlns="" id="{4D164955-C0E8-4C09-BF90-A5C4DE447B0C}"/>
+                <a16:creationId xmlns="" xmlns:a16="http://schemas.microsoft.com/office/drawing/2014/main" id="{4D164955-C0E8-4C09-BF90-A5C4DE447B0C}"/>
               </a:ext>
             </a:extLst>
           </p:cNvPr>
@@ -4538,7 +4538,7 @@
           <p:cNvPr id="17" name="Rectangle 16">
             <a:extLst>
               <a:ext uri="{FF2B5EF4-FFF2-40B4-BE49-F238E27FC236}">
-                <a16:creationId xmlns:a16="http://schemas.microsoft.com/office/drawing/2014/main" xmlns="" id="{67CAF441-CC34-4360-BF11-287A0103A8F8}"/>
+                <a16:creationId xmlns="" xmlns:a16="http://schemas.microsoft.com/office/drawing/2014/main" id="{67CAF441-CC34-4360-BF11-287A0103A8F8}"/>
               </a:ext>
             </a:extLst>
           </p:cNvPr>
@@ -4605,7 +4605,7 @@
           <p:cNvPr id="18" name="Rectangle 17">
             <a:extLst>
               <a:ext uri="{FF2B5EF4-FFF2-40B4-BE49-F238E27FC236}">
-                <a16:creationId xmlns:a16="http://schemas.microsoft.com/office/drawing/2014/main" xmlns="" id="{A11F58A7-6D7F-4558-989F-21EF31BF5A87}"/>
+                <a16:creationId xmlns="" xmlns:a16="http://schemas.microsoft.com/office/drawing/2014/main" id="{A11F58A7-6D7F-4558-989F-21EF31BF5A87}"/>
               </a:ext>
             </a:extLst>
           </p:cNvPr>
@@ -4668,7 +4668,7 @@
           <p:cNvPr id="19" name="Rectangle 18">
             <a:extLst>
               <a:ext uri="{FF2B5EF4-FFF2-40B4-BE49-F238E27FC236}">
-                <a16:creationId xmlns:a16="http://schemas.microsoft.com/office/drawing/2014/main" xmlns="" id="{7E83F05A-E681-4C38-B5BA-7833319671E3}"/>
+                <a16:creationId xmlns="" xmlns:a16="http://schemas.microsoft.com/office/drawing/2014/main" id="{7E83F05A-E681-4C38-B5BA-7833319671E3}"/>
               </a:ext>
             </a:extLst>
           </p:cNvPr>
@@ -4765,7 +4765,7 @@
           <p:cNvPr id="6" name="Straight Arrow Connector 5">
             <a:extLst>
               <a:ext uri="{FF2B5EF4-FFF2-40B4-BE49-F238E27FC236}">
-                <a16:creationId xmlns:a16="http://schemas.microsoft.com/office/drawing/2014/main" xmlns="" id="{4BC5C381-EF6A-472E-B50A-6D5600D1C737}"/>
+                <a16:creationId xmlns="" xmlns:a16="http://schemas.microsoft.com/office/drawing/2014/main" id="{4BC5C381-EF6A-472E-B50A-6D5600D1C737}"/>
               </a:ext>
             </a:extLst>
           </p:cNvPr>
@@ -4807,7 +4807,7 @@
           <p:cNvPr id="7" name="TextBox 6">
             <a:extLst>
               <a:ext uri="{FF2B5EF4-FFF2-40B4-BE49-F238E27FC236}">
-                <a16:creationId xmlns:a16="http://schemas.microsoft.com/office/drawing/2014/main" xmlns="" id="{6C496DF2-7979-46AE-9BF9-316CE5C9FBB0}"/>
+                <a16:creationId xmlns="" xmlns:a16="http://schemas.microsoft.com/office/drawing/2014/main" id="{6C496DF2-7979-46AE-9BF9-316CE5C9FBB0}"/>
               </a:ext>
             </a:extLst>
           </p:cNvPr>
@@ -4852,7 +4852,7 @@
           <p:cNvPr id="22" name="Straight Arrow Connector 21">
             <a:extLst>
               <a:ext uri="{FF2B5EF4-FFF2-40B4-BE49-F238E27FC236}">
-                <a16:creationId xmlns:a16="http://schemas.microsoft.com/office/drawing/2014/main" xmlns="" id="{D4F35B77-8D7C-46D2-872E-A831E3C3DC00}"/>
+                <a16:creationId xmlns="" xmlns:a16="http://schemas.microsoft.com/office/drawing/2014/main" id="{D4F35B77-8D7C-46D2-872E-A831E3C3DC00}"/>
               </a:ext>
             </a:extLst>
           </p:cNvPr>
@@ -4896,7 +4896,7 @@
           <p:cNvPr id="23" name="Straight Arrow Connector 22">
             <a:extLst>
               <a:ext uri="{FF2B5EF4-FFF2-40B4-BE49-F238E27FC236}">
-                <a16:creationId xmlns:a16="http://schemas.microsoft.com/office/drawing/2014/main" xmlns="" id="{4A3A8525-500B-468B-B048-01FC4E6A6543}"/>
+                <a16:creationId xmlns="" xmlns:a16="http://schemas.microsoft.com/office/drawing/2014/main" id="{4A3A8525-500B-468B-B048-01FC4E6A6543}"/>
               </a:ext>
             </a:extLst>
           </p:cNvPr>
@@ -4940,7 +4940,7 @@
           <p:cNvPr id="26" name="TextBox 25">
             <a:extLst>
               <a:ext uri="{FF2B5EF4-FFF2-40B4-BE49-F238E27FC236}">
-                <a16:creationId xmlns:a16="http://schemas.microsoft.com/office/drawing/2014/main" xmlns="" id="{6C4FD808-A6A2-4EE6-B3AF-F78DBF30AC35}"/>
+                <a16:creationId xmlns="" xmlns:a16="http://schemas.microsoft.com/office/drawing/2014/main" id="{6C4FD808-A6A2-4EE6-B3AF-F78DBF30AC35}"/>
               </a:ext>
             </a:extLst>
           </p:cNvPr>
@@ -4981,7 +4981,7 @@
           <p:cNvPr id="28" name="TextBox 27">
             <a:extLst>
               <a:ext uri="{FF2B5EF4-FFF2-40B4-BE49-F238E27FC236}">
-                <a16:creationId xmlns:a16="http://schemas.microsoft.com/office/drawing/2014/main" xmlns="" id="{194DC676-6DE3-4223-B9F2-8F1AD4FDF034}"/>
+                <a16:creationId xmlns="" xmlns:a16="http://schemas.microsoft.com/office/drawing/2014/main" id="{194DC676-6DE3-4223-B9F2-8F1AD4FDF034}"/>
               </a:ext>
             </a:extLst>
           </p:cNvPr>
@@ -5026,7 +5026,7 @@
           <p:cNvPr id="29" name="TextBox 28">
             <a:extLst>
               <a:ext uri="{FF2B5EF4-FFF2-40B4-BE49-F238E27FC236}">
-                <a16:creationId xmlns:a16="http://schemas.microsoft.com/office/drawing/2014/main" xmlns="" id="{6845518C-D880-4247-B237-ED013E326AF1}"/>
+                <a16:creationId xmlns="" xmlns:a16="http://schemas.microsoft.com/office/drawing/2014/main" id="{6845518C-D880-4247-B237-ED013E326AF1}"/>
               </a:ext>
             </a:extLst>
           </p:cNvPr>
@@ -5067,7 +5067,7 @@
           <p:cNvPr id="38" name="TextBox 37">
             <a:extLst>
               <a:ext uri="{FF2B5EF4-FFF2-40B4-BE49-F238E27FC236}">
-                <a16:creationId xmlns:a16="http://schemas.microsoft.com/office/drawing/2014/main" xmlns="" id="{457CF22A-6BB1-4870-A9E0-803F97EF2439}"/>
+                <a16:creationId xmlns="" xmlns:a16="http://schemas.microsoft.com/office/drawing/2014/main" id="{457CF22A-6BB1-4870-A9E0-803F97EF2439}"/>
               </a:ext>
             </a:extLst>
           </p:cNvPr>
@@ -5077,7 +5077,7 @@
         <p:spPr>
           <a:xfrm>
             <a:off x="12879970" y="11905447"/>
-            <a:ext cx="2346619" cy="923330"/>
+            <a:ext cx="2346619" cy="646331"/>
           </a:xfrm>
           <a:prstGeom prst="rect">
             <a:avLst/>
@@ -5103,21 +5103,16 @@
           </a:p>
           <a:p>
             <a:r>
-              <a:rPr lang="en-GB" dirty="0">
+              <a:rPr lang="en-GB" dirty="0" smtClean="0">
                 <a:latin typeface="Arial" panose="020B0604020202020204" pitchFamily="34" charset="0"/>
                 <a:cs typeface="Arial" panose="020B0604020202020204" pitchFamily="34" charset="0"/>
               </a:rPr>
-              <a:t>0 = not binding</a:t>
-            </a:r>
-          </a:p>
-          <a:p>
-            <a:r>
-              <a:rPr lang="en-GB" dirty="0">
-                <a:latin typeface="Arial" panose="020B0604020202020204" pitchFamily="34" charset="0"/>
-                <a:cs typeface="Arial" panose="020B0604020202020204" pitchFamily="34" charset="0"/>
-              </a:rPr>
-              <a:t>1 = binding</a:t>
-            </a:r>
+              <a:t>Probability of binding</a:t>
+            </a:r>
+            <a:endParaRPr lang="en-GB" dirty="0">
+              <a:latin typeface="Arial" panose="020B0604020202020204" pitchFamily="34" charset="0"/>
+              <a:cs typeface="Arial" panose="020B0604020202020204" pitchFamily="34" charset="0"/>
+            </a:endParaRPr>
           </a:p>
         </p:txBody>
       </p:sp>
@@ -5126,7 +5121,7 @@
           <p:cNvPr id="5" name="TextBox 4">
             <a:extLst>
               <a:ext uri="{FF2B5EF4-FFF2-40B4-BE49-F238E27FC236}">
-                <a16:creationId xmlns:a16="http://schemas.microsoft.com/office/drawing/2014/main" xmlns="" id="{555DBE74-403C-4246-B0C1-4F2AAF162AFF}"/>
+                <a16:creationId xmlns="" xmlns:a16="http://schemas.microsoft.com/office/drawing/2014/main" id="{555DBE74-403C-4246-B0C1-4F2AAF162AFF}"/>
               </a:ext>
             </a:extLst>
           </p:cNvPr>
@@ -5399,7 +5394,7 @@
           <p:cNvPr id="8" name="TextBox 7">
             <a:extLst>
               <a:ext uri="{FF2B5EF4-FFF2-40B4-BE49-F238E27FC236}">
-                <a16:creationId xmlns:a16="http://schemas.microsoft.com/office/drawing/2014/main" xmlns="" id="{BF27FA47-F412-41BA-9674-4AB98ABB11FF}"/>
+                <a16:creationId xmlns="" xmlns:a16="http://schemas.microsoft.com/office/drawing/2014/main" id="{BF27FA47-F412-41BA-9674-4AB98ABB11FF}"/>
               </a:ext>
             </a:extLst>
           </p:cNvPr>
@@ -5408,7 +5403,7 @@
         </p:nvSpPr>
         <p:spPr>
           <a:xfrm>
-            <a:off x="284220" y="28797885"/>
+            <a:off x="281270" y="29211249"/>
             <a:ext cx="20409853" cy="1200329"/>
           </a:xfrm>
           <a:prstGeom prst="rect">
@@ -5568,7 +5563,7 @@
           <p:cNvPr id="39" name="Round Same Side Corner Rectangle 137">
             <a:extLst>
               <a:ext uri="{FF2B5EF4-FFF2-40B4-BE49-F238E27FC236}">
-                <a16:creationId xmlns:a16="http://schemas.microsoft.com/office/drawing/2014/main" xmlns="" id="{E416DD2D-00A9-4581-8B16-BB3C03226A4A}"/>
+                <a16:creationId xmlns="" xmlns:a16="http://schemas.microsoft.com/office/drawing/2014/main" id="{E416DD2D-00A9-4581-8B16-BB3C03226A4A}"/>
               </a:ext>
             </a:extLst>
           </p:cNvPr>
@@ -5577,7 +5572,7 @@
         </p:nvSpPr>
         <p:spPr>
           <a:xfrm>
-            <a:off x="253970" y="27880586"/>
+            <a:off x="251020" y="28293950"/>
             <a:ext cx="20880000" cy="540000"/>
           </a:xfrm>
           <a:prstGeom prst="round2SameRect">
@@ -5627,102 +5622,12 @@
           </a:p>
         </p:txBody>
       </p:sp>
-      <p:sp>
-        <p:nvSpPr>
-          <p:cNvPr id="9" name="TextBox 8">
-            <a:extLst>
-              <a:ext uri="{FF2B5EF4-FFF2-40B4-BE49-F238E27FC236}">
-                <a16:creationId xmlns:a16="http://schemas.microsoft.com/office/drawing/2014/main" xmlns="" id="{7D584BC0-CFB4-44BF-8499-422590EEED04}"/>
-              </a:ext>
-            </a:extLst>
-          </p:cNvPr>
-          <p:cNvSpPr txBox="1"/>
-          <p:nvPr/>
-        </p:nvSpPr>
-        <p:spPr>
-          <a:xfrm>
-            <a:off x="13312258" y="7260730"/>
-            <a:ext cx="5201745" cy="1015663"/>
-          </a:xfrm>
-          <a:prstGeom prst="rect">
-            <a:avLst/>
-          </a:prstGeom>
-          <a:noFill/>
-        </p:spPr>
-        <p:txBody>
-          <a:bodyPr rot="0" spcFirstLastPara="0" vertOverflow="overflow" horzOverflow="overflow" vert="horz" wrap="square" lIns="91440" tIns="45720" rIns="91440" bIns="45720" numCol="1" spcCol="0" rtlCol="0" fromWordArt="0" anchor="t" anchorCtr="0" forceAA="0" compatLnSpc="1">
-            <a:prstTxWarp prst="textNoShape">
-              <a:avLst/>
-            </a:prstTxWarp>
-            <a:spAutoFit/>
-          </a:bodyPr>
-          <a:lstStyle/>
-          <a:p>
-            <a:r>
-              <a:rPr lang="en-GB" sz="3000" dirty="0">
-                <a:latin typeface="Arial" panose="020B0604020202020204" pitchFamily="34" charset="0"/>
-                <a:cs typeface="Arial" panose="020B0604020202020204" pitchFamily="34" charset="0"/>
-              </a:rPr>
-              <a:t>IMAGE OF TCR-PMHC COMPLEX</a:t>
-            </a:r>
-            <a:endParaRPr lang="en-US" sz="3000" dirty="0">
-              <a:latin typeface="Arial" panose="020B0604020202020204" pitchFamily="34" charset="0"/>
-              <a:cs typeface="Arial" panose="020B0604020202020204" pitchFamily="34" charset="0"/>
-            </a:endParaRPr>
-          </a:p>
-        </p:txBody>
-      </p:sp>
-      <p:sp>
-        <p:nvSpPr>
-          <p:cNvPr id="10" name="TextBox 9">
-            <a:extLst>
-              <a:ext uri="{FF2B5EF4-FFF2-40B4-BE49-F238E27FC236}">
-                <a16:creationId xmlns:a16="http://schemas.microsoft.com/office/drawing/2014/main" xmlns="" id="{0F50DE13-E128-4F41-B202-B86A9CAA9FC5}"/>
-              </a:ext>
-            </a:extLst>
-          </p:cNvPr>
-          <p:cNvSpPr txBox="1"/>
-          <p:nvPr/>
-        </p:nvSpPr>
-        <p:spPr>
-          <a:xfrm>
-            <a:off x="13036580" y="14204395"/>
-            <a:ext cx="6127720" cy="1015663"/>
-          </a:xfrm>
-          <a:prstGeom prst="rect">
-            <a:avLst/>
-          </a:prstGeom>
-          <a:noFill/>
-        </p:spPr>
-        <p:txBody>
-          <a:bodyPr rot="0" spcFirstLastPara="0" vertOverflow="overflow" horzOverflow="overflow" vert="horz" wrap="square" lIns="91440" tIns="45720" rIns="91440" bIns="45720" numCol="1" spcCol="0" rtlCol="0" fromWordArt="0" anchor="t" anchorCtr="0" forceAA="0" compatLnSpc="1">
-            <a:prstTxWarp prst="textNoShape">
-              <a:avLst/>
-            </a:prstTxWarp>
-            <a:spAutoFit/>
-          </a:bodyPr>
-          <a:lstStyle/>
-          <a:p>
-            <a:r>
-              <a:rPr lang="en-GB" sz="3000" dirty="0">
-                <a:latin typeface="Arial" panose="020B0604020202020204" pitchFamily="34" charset="0"/>
-                <a:cs typeface="Arial" panose="020B0604020202020204" pitchFamily="34" charset="0"/>
-              </a:rPr>
-              <a:t>IMAGE OF ARCHITECTURE FROM HENRIETTA</a:t>
-            </a:r>
-            <a:endParaRPr lang="en-GB" sz="3000" dirty="0">
-              <a:latin typeface="Arial" panose="020B0604020202020204" pitchFamily="34" charset="0"/>
-              <a:cs typeface="Arial" panose="020B0604020202020204" pitchFamily="34" charset="0"/>
-            </a:endParaRPr>
-          </a:p>
-        </p:txBody>
-      </p:sp>
       <p:cxnSp>
         <p:nvCxnSpPr>
           <p:cNvPr id="41" name="Straight Arrow Connector 5">
             <a:extLst>
               <a:ext uri="{FF2B5EF4-FFF2-40B4-BE49-F238E27FC236}">
-                <a16:creationId xmlns:a16="http://schemas.microsoft.com/office/drawing/2014/main" xmlns="" id="{4BC5C381-EF6A-472E-B50A-6D5600D1C737}"/>
+                <a16:creationId xmlns="" xmlns:a16="http://schemas.microsoft.com/office/drawing/2014/main" id="{4BC5C381-EF6A-472E-B50A-6D5600D1C737}"/>
               </a:ext>
             </a:extLst>
           </p:cNvPr>
@@ -5766,7 +5671,7 @@
           <p:cNvPr id="42" name="Straight Arrow Connector 5">
             <a:extLst>
               <a:ext uri="{FF2B5EF4-FFF2-40B4-BE49-F238E27FC236}">
-                <a16:creationId xmlns:a16="http://schemas.microsoft.com/office/drawing/2014/main" xmlns="" id="{4BC5C381-EF6A-472E-B50A-6D5600D1C737}"/>
+                <a16:creationId xmlns="" xmlns:a16="http://schemas.microsoft.com/office/drawing/2014/main" id="{4BC5C381-EF6A-472E-B50A-6D5600D1C737}"/>
               </a:ext>
             </a:extLst>
           </p:cNvPr>
@@ -5808,7 +5713,7 @@
           <p:cNvPr id="43" name="Rectangle 42">
             <a:extLst>
               <a:ext uri="{FF2B5EF4-FFF2-40B4-BE49-F238E27FC236}">
-                <a16:creationId xmlns:a16="http://schemas.microsoft.com/office/drawing/2014/main" xmlns="" id="{7E83F05A-E681-4C38-B5BA-7833319671E3}"/>
+                <a16:creationId xmlns="" xmlns:a16="http://schemas.microsoft.com/office/drawing/2014/main" id="{7E83F05A-E681-4C38-B5BA-7833319671E3}"/>
               </a:ext>
             </a:extLst>
           </p:cNvPr>
@@ -5878,7 +5783,7 @@
           <p:cNvPr id="46" name="Straight Arrow Connector 30">
             <a:extLst>
               <a:ext uri="{FF2B5EF4-FFF2-40B4-BE49-F238E27FC236}">
-                <a16:creationId xmlns:a16="http://schemas.microsoft.com/office/drawing/2014/main" xmlns="" id="{72A3FFE5-F991-423A-85A9-7571FF68D620}"/>
+                <a16:creationId xmlns="" xmlns:a16="http://schemas.microsoft.com/office/drawing/2014/main" id="{72A3FFE5-F991-423A-85A9-7571FF68D620}"/>
               </a:ext>
             </a:extLst>
           </p:cNvPr>
@@ -5919,7 +5824,7 @@
           <p:cNvPr id="56" name="Straight Arrow Connector 22">
             <a:extLst>
               <a:ext uri="{FF2B5EF4-FFF2-40B4-BE49-F238E27FC236}">
-                <a16:creationId xmlns:a16="http://schemas.microsoft.com/office/drawing/2014/main" xmlns="" id="{4A3A8525-500B-468B-B048-01FC4E6A6543}"/>
+                <a16:creationId xmlns="" xmlns:a16="http://schemas.microsoft.com/office/drawing/2014/main" id="{4A3A8525-500B-468B-B048-01FC4E6A6543}"/>
               </a:ext>
             </a:extLst>
           </p:cNvPr>
@@ -5963,7 +5868,7 @@
           <p:cNvPr id="57" name="Straight Arrow Connector 22">
             <a:extLst>
               <a:ext uri="{FF2B5EF4-FFF2-40B4-BE49-F238E27FC236}">
-                <a16:creationId xmlns:a16="http://schemas.microsoft.com/office/drawing/2014/main" xmlns="" id="{4A3A8525-500B-468B-B048-01FC4E6A6543}"/>
+                <a16:creationId xmlns="" xmlns:a16="http://schemas.microsoft.com/office/drawing/2014/main" id="{4A3A8525-500B-468B-B048-01FC4E6A6543}"/>
               </a:ext>
             </a:extLst>
           </p:cNvPr>
@@ -6007,7 +5912,7 @@
           <p:cNvPr id="58" name="Straight Arrow Connector 30">
             <a:extLst>
               <a:ext uri="{FF2B5EF4-FFF2-40B4-BE49-F238E27FC236}">
-                <a16:creationId xmlns:a16="http://schemas.microsoft.com/office/drawing/2014/main" xmlns="" id="{72A3FFE5-F991-423A-85A9-7571FF68D620}"/>
+                <a16:creationId xmlns="" xmlns:a16="http://schemas.microsoft.com/office/drawing/2014/main" id="{72A3FFE5-F991-423A-85A9-7571FF68D620}"/>
               </a:ext>
             </a:extLst>
           </p:cNvPr>
@@ -6048,7 +5953,7 @@
           <p:cNvPr id="61" name="TextBox 9">
             <a:extLst>
               <a:ext uri="{FF2B5EF4-FFF2-40B4-BE49-F238E27FC236}">
-                <a16:creationId xmlns:a16="http://schemas.microsoft.com/office/drawing/2014/main" xmlns="" id="{0F50DE13-E128-4F41-B202-B86A9CAA9FC5}"/>
+                <a16:creationId xmlns="" xmlns:a16="http://schemas.microsoft.com/office/drawing/2014/main" id="{0F50DE13-E128-4F41-B202-B86A9CAA9FC5}"/>
               </a:ext>
             </a:extLst>
           </p:cNvPr>
@@ -6057,7 +5962,7 @@
         </p:nvSpPr>
         <p:spPr>
           <a:xfrm>
-            <a:off x="2875818" y="19734935"/>
+            <a:off x="15572764" y="22622274"/>
             <a:ext cx="3591536" cy="1477328"/>
           </a:xfrm>
           <a:prstGeom prst="rect">
@@ -6114,7 +6019,7 @@
         </p:nvSpPr>
         <p:spPr>
           <a:xfrm>
-            <a:off x="7755971" y="20196600"/>
+            <a:off x="15839674" y="20677013"/>
             <a:ext cx="4221027" cy="553998"/>
           </a:xfrm>
           <a:prstGeom prst="rect">
@@ -6146,7 +6051,7 @@
           <p:cNvPr id="68" name="Round Same Side Corner Rectangle 137">
             <a:extLst>
               <a:ext uri="{FF2B5EF4-FFF2-40B4-BE49-F238E27FC236}">
-                <a16:creationId xmlns:a16="http://schemas.microsoft.com/office/drawing/2014/main" xmlns="" id="{E416DD2D-00A9-4581-8B16-BB3C03226A4A}"/>
+                <a16:creationId xmlns="" xmlns:a16="http://schemas.microsoft.com/office/drawing/2014/main" id="{E416DD2D-00A9-4581-8B16-BB3C03226A4A}"/>
               </a:ext>
             </a:extLst>
           </p:cNvPr>
@@ -6155,7 +6060,7 @@
         </p:nvSpPr>
         <p:spPr>
           <a:xfrm>
-            <a:off x="253970" y="25485928"/>
+            <a:off x="251020" y="25899292"/>
             <a:ext cx="20880000" cy="540000"/>
           </a:xfrm>
           <a:prstGeom prst="round2SameRect">
@@ -6218,7 +6123,7 @@
         </p:nvSpPr>
         <p:spPr>
           <a:xfrm>
-            <a:off x="760184" y="26412559"/>
+            <a:off x="757234" y="26825923"/>
             <a:ext cx="7911430" cy="923330"/>
           </a:xfrm>
           <a:prstGeom prst="rect">
@@ -6272,7 +6177,7 @@
         <p:spPr>
           <a:xfrm>
             <a:off x="6229507" y="14724431"/>
-            <a:ext cx="2998385" cy="369332"/>
+            <a:ext cx="3121817" cy="369332"/>
           </a:xfrm>
           <a:prstGeom prst="rect">
             <a:avLst/>
@@ -6286,8 +6191,1879 @@
           <a:lstStyle/>
           <a:p>
             <a:r>
+              <a:rPr lang="fr-FR" i="1" dirty="0"/>
+              <a:t>Figure 2. Pipeline for the data.</a:t>
+            </a:r>
+            <a:endParaRPr lang="fr-FR" i="1" dirty="0"/>
+          </a:p>
+        </p:txBody>
+      </p:sp>
+      <p:pic>
+        <p:nvPicPr>
+          <p:cNvPr id="1026" name="Picture 2" descr="Aucune description disponible."/>
+          <p:cNvPicPr>
+            <a:picLocks noChangeAspect="1" noChangeArrowheads="1"/>
+          </p:cNvPicPr>
+          <p:nvPr/>
+        </p:nvPicPr>
+        <p:blipFill rotWithShape="1">
+          <a:blip r:embed="rId5">
+            <a:extLst>
+              <a:ext uri="{28A0092B-C50C-407E-A947-70E740481C1C}">
+                <a14:useLocalDpi xmlns:a14="http://schemas.microsoft.com/office/drawing/2010/main" val="0"/>
+              </a:ext>
+            </a:extLst>
+          </a:blip>
+          <a:srcRect l="32243" t="2752" r="34089" b="13954"/>
+          <a:stretch/>
+        </p:blipFill>
+        <p:spPr bwMode="auto">
+          <a:xfrm rot="16200000">
+            <a:off x="13531473" y="3533556"/>
+            <a:ext cx="4154669" cy="7643674"/>
+          </a:xfrm>
+          <a:prstGeom prst="rect">
+            <a:avLst/>
+          </a:prstGeom>
+          <a:noFill/>
+          <a:extLst>
+            <a:ext uri="{909E8E84-426E-40DD-AFC4-6F175D3DCCD1}">
+              <a14:hiddenFill xmlns:a14="http://schemas.microsoft.com/office/drawing/2010/main">
+                <a:solidFill>
+                  <a:srgbClr val="FFFFFF"/>
+                </a:solidFill>
+              </a14:hiddenFill>
+            </a:ext>
+          </a:extLst>
+        </p:spPr>
+      </p:pic>
+      <p:sp>
+        <p:nvSpPr>
+          <p:cNvPr id="44" name="ZoneTexte 43"/>
+          <p:cNvSpPr txBox="1"/>
+          <p:nvPr/>
+        </p:nvSpPr>
+        <p:spPr>
+          <a:xfrm>
+            <a:off x="12232926" y="9353525"/>
+            <a:ext cx="6931374" cy="646331"/>
+          </a:xfrm>
+          <a:prstGeom prst="rect">
+            <a:avLst/>
+          </a:prstGeom>
+          <a:noFill/>
+        </p:spPr>
+        <p:txBody>
+          <a:bodyPr wrap="square" rtlCol="0">
+            <a:spAutoFit/>
+          </a:bodyPr>
+          <a:lstStyle/>
+          <a:p>
+            <a:r>
+              <a:rPr lang="fr-FR" i="1" dirty="0"/>
+              <a:t>Figure </a:t>
+            </a:r>
+            <a:r>
               <a:rPr lang="fr-FR" i="1" dirty="0" smtClean="0"/>
-              <a:t>Figure 2. Pipeline for the data.</a:t>
+              <a:t>1. </a:t>
+            </a:r>
+            <a:r>
+              <a:rPr lang="fr-FR" i="1" dirty="0" err="1" smtClean="0"/>
+              <a:t>Three</a:t>
+            </a:r>
+            <a:r>
+              <a:rPr lang="fr-FR" i="1" dirty="0" smtClean="0"/>
+              <a:t> dimension </a:t>
+            </a:r>
+            <a:r>
+              <a:rPr lang="fr-FR" i="1" dirty="0" err="1" smtClean="0"/>
+              <a:t>visualization</a:t>
+            </a:r>
+            <a:r>
+              <a:rPr lang="fr-FR" i="1" dirty="0" smtClean="0"/>
+              <a:t> of the TCR-</a:t>
+            </a:r>
+            <a:r>
+              <a:rPr lang="fr-FR" i="1" dirty="0" err="1" smtClean="0"/>
+              <a:t>pMHC</a:t>
+            </a:r>
+            <a:r>
+              <a:rPr lang="fr-FR" i="1" dirty="0" smtClean="0"/>
+              <a:t>  </a:t>
+            </a:r>
+            <a:r>
+              <a:rPr lang="fr-FR" i="1" dirty="0" err="1" smtClean="0"/>
+              <a:t>complex</a:t>
+            </a:r>
+            <a:r>
+              <a:rPr lang="fr-FR" i="1" dirty="0" smtClean="0"/>
+              <a:t>. Blue: TCR-</a:t>
+            </a:r>
+            <a:r>
+              <a:rPr lang="el-GR" dirty="0" smtClean="0"/>
+              <a:t>α</a:t>
+            </a:r>
+            <a:r>
+              <a:rPr lang="fr-FR" i="1" dirty="0" smtClean="0"/>
+              <a:t>, </a:t>
+            </a:r>
+            <a:r>
+              <a:rPr lang="fr-FR" i="1" dirty="0" err="1" smtClean="0"/>
+              <a:t>Purple</a:t>
+            </a:r>
+            <a:r>
+              <a:rPr lang="fr-FR" i="1" dirty="0" smtClean="0"/>
+              <a:t>: TCR-</a:t>
+            </a:r>
+            <a:r>
+              <a:rPr lang="el-GR" dirty="0"/>
+              <a:t>β</a:t>
+            </a:r>
+            <a:r>
+              <a:rPr lang="fr-FR" i="1" dirty="0" smtClean="0"/>
+              <a:t>, Green: Peptide, Grey: MHC.</a:t>
+            </a:r>
+            <a:endParaRPr lang="fr-FR" i="1" dirty="0"/>
+          </a:p>
+        </p:txBody>
+      </p:sp>
+      <p:pic>
+        <p:nvPicPr>
+          <p:cNvPr id="1028" name="Picture 4" descr="Aucune description disponible."/>
+          <p:cNvPicPr>
+            <a:picLocks noChangeAspect="1" noChangeArrowheads="1"/>
+          </p:cNvPicPr>
+          <p:nvPr/>
+        </p:nvPicPr>
+        <p:blipFill>
+          <a:blip r:embed="rId6">
+            <a:extLst>
+              <a:ext uri="{28A0092B-C50C-407E-A947-70E740481C1C}">
+                <a14:useLocalDpi xmlns:a14="http://schemas.microsoft.com/office/drawing/2010/main" val="0"/>
+              </a:ext>
+            </a:extLst>
+          </a:blip>
+          <a:srcRect/>
+          <a:stretch>
+            <a:fillRect/>
+          </a:stretch>
+        </p:blipFill>
+        <p:spPr bwMode="auto">
+          <a:xfrm>
+            <a:off x="9577145" y="12812033"/>
+            <a:ext cx="11218481" cy="4672313"/>
+          </a:xfrm>
+          <a:prstGeom prst="rect">
+            <a:avLst/>
+          </a:prstGeom>
+          <a:noFill/>
+          <a:extLst>
+            <a:ext uri="{909E8E84-426E-40DD-AFC4-6F175D3DCCD1}">
+              <a14:hiddenFill xmlns:a14="http://schemas.microsoft.com/office/drawing/2010/main">
+                <a:solidFill>
+                  <a:srgbClr val="FFFFFF"/>
+                </a:solidFill>
+              </a14:hiddenFill>
+            </a:ext>
+          </a:extLst>
+        </p:spPr>
+      </p:pic>
+      <p:sp>
+        <p:nvSpPr>
+          <p:cNvPr id="12" name="Rectangle 11"/>
+          <p:cNvSpPr/>
+          <p:nvPr/>
+        </p:nvSpPr>
+        <p:spPr>
+          <a:xfrm>
+            <a:off x="12672597" y="17455896"/>
+            <a:ext cx="4329519" cy="369332"/>
+          </a:xfrm>
+          <a:prstGeom prst="rect">
+            <a:avLst/>
+          </a:prstGeom>
+        </p:spPr>
+        <p:txBody>
+          <a:bodyPr wrap="none">
+            <a:spAutoFit/>
+          </a:bodyPr>
+          <a:lstStyle/>
+          <a:p>
+            <a:r>
+              <a:rPr lang="fr-FR" i="1" dirty="0"/>
+              <a:t>Figure </a:t>
+            </a:r>
+            <a:r>
+              <a:rPr lang="fr-FR" i="1" dirty="0" smtClean="0"/>
+              <a:t>3. Architecture of the neural network.</a:t>
+            </a:r>
+            <a:endParaRPr lang="fr-FR" i="1" dirty="0"/>
+          </a:p>
+        </p:txBody>
+      </p:sp>
+      <p:graphicFrame>
+        <p:nvGraphicFramePr>
+          <p:cNvPr id="13" name="Tableau 12"/>
+          <p:cNvGraphicFramePr>
+            <a:graphicFrameLocks noGrp="1"/>
+          </p:cNvGraphicFramePr>
+          <p:nvPr>
+            <p:extLst>
+              <p:ext uri="{D42A27DB-BD31-4B8C-83A1-F6EECF244321}">
+                <p14:modId xmlns:p14="http://schemas.microsoft.com/office/powerpoint/2010/main" val="4163292958"/>
+              </p:ext>
+            </p:extLst>
+          </p:nvPr>
+        </p:nvGraphicFramePr>
+        <p:xfrm>
+          <a:off x="1911125" y="20851987"/>
+          <a:ext cx="10691815" cy="1447924"/>
+        </p:xfrm>
+        <a:graphic>
+          <a:graphicData uri="http://schemas.openxmlformats.org/drawingml/2006/table">
+            <a:tbl>
+              <a:tblPr firstRow="1" bandRow="1">
+                <a:tableStyleId>{5C22544A-7EE6-4342-B048-85BDC9FD1C3A}</a:tableStyleId>
+              </a:tblPr>
+              <a:tblGrid>
+                <a:gridCol w="1589280"/>
+                <a:gridCol w="1589280"/>
+                <a:gridCol w="1589280"/>
+                <a:gridCol w="1589280"/>
+                <a:gridCol w="2022423"/>
+                <a:gridCol w="1156136"/>
+                <a:gridCol w="1156136"/>
+              </a:tblGrid>
+              <a:tr h="437004">
+                <a:tc>
+                  <a:txBody>
+                    <a:bodyPr/>
+                    <a:lstStyle/>
+                    <a:p>
+                      <a:endParaRPr lang="fr-FR" sz="1800" dirty="0">
+                        <a:solidFill>
+                          <a:schemeClr val="tx1"/>
+                        </a:solidFill>
+                        <a:latin typeface="Arial" panose="020B0604020202020204" pitchFamily="34" charset="0"/>
+                        <a:cs typeface="Arial" panose="020B0604020202020204" pitchFamily="34" charset="0"/>
+                      </a:endParaRPr>
+                    </a:p>
+                  </a:txBody>
+                  <a:tcPr>
+                    <a:lnL w="12700" cap="flat" cmpd="sng" algn="ctr">
+                      <a:solidFill>
+                        <a:schemeClr val="tx1"/>
+                      </a:solidFill>
+                      <a:prstDash val="solid"/>
+                      <a:round/>
+                      <a:headEnd type="none" w="med" len="med"/>
+                      <a:tailEnd type="none" w="med" len="med"/>
+                    </a:lnL>
+                    <a:lnR w="12700" cap="flat" cmpd="sng" algn="ctr">
+                      <a:solidFill>
+                        <a:schemeClr val="tx1"/>
+                      </a:solidFill>
+                      <a:prstDash val="solid"/>
+                      <a:round/>
+                      <a:headEnd type="none" w="med" len="med"/>
+                      <a:tailEnd type="none" w="med" len="med"/>
+                    </a:lnR>
+                    <a:lnT w="12700" cap="flat" cmpd="sng" algn="ctr">
+                      <a:solidFill>
+                        <a:schemeClr val="tx1"/>
+                      </a:solidFill>
+                      <a:prstDash val="solid"/>
+                      <a:round/>
+                      <a:headEnd type="none" w="med" len="med"/>
+                      <a:tailEnd type="none" w="med" len="med"/>
+                    </a:lnT>
+                    <a:lnB w="12700" cap="flat" cmpd="sng" algn="ctr">
+                      <a:solidFill>
+                        <a:schemeClr val="tx1"/>
+                      </a:solidFill>
+                      <a:prstDash val="solid"/>
+                      <a:round/>
+                      <a:headEnd type="none" w="med" len="med"/>
+                      <a:tailEnd type="none" w="med" len="med"/>
+                    </a:lnB>
+                    <a:lnTlToBr w="12700" cmpd="sng">
+                      <a:noFill/>
+                      <a:prstDash val="solid"/>
+                    </a:lnTlToBr>
+                    <a:lnBlToTr w="12700" cmpd="sng">
+                      <a:noFill/>
+                      <a:prstDash val="solid"/>
+                    </a:lnBlToTr>
+                    <a:solidFill>
+                      <a:schemeClr val="bg1"/>
+                    </a:solidFill>
+                  </a:tcPr>
+                </a:tc>
+                <a:tc>
+                  <a:txBody>
+                    <a:bodyPr/>
+                    <a:lstStyle/>
+                    <a:p>
+                      <a:r>
+                        <a:rPr lang="fr-FR" sz="1800" dirty="0" smtClean="0">
+                          <a:solidFill>
+                            <a:schemeClr val="tx1"/>
+                          </a:solidFill>
+                          <a:latin typeface="Arial" panose="020B0604020202020204" pitchFamily="34" charset="0"/>
+                          <a:cs typeface="Arial" panose="020B0604020202020204" pitchFamily="34" charset="0"/>
+                        </a:rPr>
+                        <a:t>AUC</a:t>
+                      </a:r>
+                      <a:endParaRPr lang="fr-FR" sz="1800" dirty="0">
+                        <a:solidFill>
+                          <a:schemeClr val="tx1"/>
+                        </a:solidFill>
+                        <a:latin typeface="Arial" panose="020B0604020202020204" pitchFamily="34" charset="0"/>
+                        <a:cs typeface="Arial" panose="020B0604020202020204" pitchFamily="34" charset="0"/>
+                      </a:endParaRPr>
+                    </a:p>
+                  </a:txBody>
+                  <a:tcPr>
+                    <a:lnL w="12700" cap="flat" cmpd="sng" algn="ctr">
+                      <a:solidFill>
+                        <a:schemeClr val="tx1"/>
+                      </a:solidFill>
+                      <a:prstDash val="solid"/>
+                      <a:round/>
+                      <a:headEnd type="none" w="med" len="med"/>
+                      <a:tailEnd type="none" w="med" len="med"/>
+                    </a:lnL>
+                    <a:lnR w="12700" cap="flat" cmpd="sng" algn="ctr">
+                      <a:solidFill>
+                        <a:schemeClr val="tx1"/>
+                      </a:solidFill>
+                      <a:prstDash val="solid"/>
+                      <a:round/>
+                      <a:headEnd type="none" w="med" len="med"/>
+                      <a:tailEnd type="none" w="med" len="med"/>
+                    </a:lnR>
+                    <a:lnT w="12700" cap="flat" cmpd="sng" algn="ctr">
+                      <a:solidFill>
+                        <a:schemeClr val="tx1"/>
+                      </a:solidFill>
+                      <a:prstDash val="solid"/>
+                      <a:round/>
+                      <a:headEnd type="none" w="med" len="med"/>
+                      <a:tailEnd type="none" w="med" len="med"/>
+                    </a:lnT>
+                    <a:lnB w="12700" cap="flat" cmpd="sng" algn="ctr">
+                      <a:solidFill>
+                        <a:schemeClr val="tx1"/>
+                      </a:solidFill>
+                      <a:prstDash val="solid"/>
+                      <a:round/>
+                      <a:headEnd type="none" w="med" len="med"/>
+                      <a:tailEnd type="none" w="med" len="med"/>
+                    </a:lnB>
+                    <a:lnTlToBr w="12700" cmpd="sng">
+                      <a:noFill/>
+                      <a:prstDash val="solid"/>
+                    </a:lnTlToBr>
+                    <a:lnBlToTr w="12700" cmpd="sng">
+                      <a:noFill/>
+                      <a:prstDash val="solid"/>
+                    </a:lnBlToTr>
+                    <a:solidFill>
+                      <a:schemeClr val="bg1"/>
+                    </a:solidFill>
+                  </a:tcPr>
+                </a:tc>
+                <a:tc>
+                  <a:txBody>
+                    <a:bodyPr/>
+                    <a:lstStyle/>
+                    <a:p>
+                      <a:r>
+                        <a:rPr lang="fr-FR" sz="1800" dirty="0" smtClean="0">
+                          <a:solidFill>
+                            <a:schemeClr val="tx1"/>
+                          </a:solidFill>
+                          <a:latin typeface="Arial" panose="020B0604020202020204" pitchFamily="34" charset="0"/>
+                          <a:cs typeface="Arial" panose="020B0604020202020204" pitchFamily="34" charset="0"/>
+                        </a:rPr>
+                        <a:t>MCC</a:t>
+                      </a:r>
+                      <a:endParaRPr lang="fr-FR" sz="1800" dirty="0">
+                        <a:solidFill>
+                          <a:schemeClr val="tx1"/>
+                        </a:solidFill>
+                        <a:latin typeface="Arial" panose="020B0604020202020204" pitchFamily="34" charset="0"/>
+                        <a:cs typeface="Arial" panose="020B0604020202020204" pitchFamily="34" charset="0"/>
+                      </a:endParaRPr>
+                    </a:p>
+                  </a:txBody>
+                  <a:tcPr>
+                    <a:lnL w="12700" cap="flat" cmpd="sng" algn="ctr">
+                      <a:solidFill>
+                        <a:schemeClr val="tx1"/>
+                      </a:solidFill>
+                      <a:prstDash val="solid"/>
+                      <a:round/>
+                      <a:headEnd type="none" w="med" len="med"/>
+                      <a:tailEnd type="none" w="med" len="med"/>
+                    </a:lnL>
+                    <a:lnR w="12700" cap="flat" cmpd="sng" algn="ctr">
+                      <a:solidFill>
+                        <a:schemeClr val="tx1"/>
+                      </a:solidFill>
+                      <a:prstDash val="solid"/>
+                      <a:round/>
+                      <a:headEnd type="none" w="med" len="med"/>
+                      <a:tailEnd type="none" w="med" len="med"/>
+                    </a:lnR>
+                    <a:lnT w="12700" cap="flat" cmpd="sng" algn="ctr">
+                      <a:solidFill>
+                        <a:schemeClr val="tx1"/>
+                      </a:solidFill>
+                      <a:prstDash val="solid"/>
+                      <a:round/>
+                      <a:headEnd type="none" w="med" len="med"/>
+                      <a:tailEnd type="none" w="med" len="med"/>
+                    </a:lnT>
+                    <a:lnB w="12700" cap="flat" cmpd="sng" algn="ctr">
+                      <a:solidFill>
+                        <a:schemeClr val="tx1"/>
+                      </a:solidFill>
+                      <a:prstDash val="solid"/>
+                      <a:round/>
+                      <a:headEnd type="none" w="med" len="med"/>
+                      <a:tailEnd type="none" w="med" len="med"/>
+                    </a:lnB>
+                    <a:lnTlToBr w="12700" cmpd="sng">
+                      <a:noFill/>
+                      <a:prstDash val="solid"/>
+                    </a:lnTlToBr>
+                    <a:lnBlToTr w="12700" cmpd="sng">
+                      <a:noFill/>
+                      <a:prstDash val="solid"/>
+                    </a:lnBlToTr>
+                    <a:solidFill>
+                      <a:schemeClr val="bg1"/>
+                    </a:solidFill>
+                  </a:tcPr>
+                </a:tc>
+                <a:tc>
+                  <a:txBody>
+                    <a:bodyPr/>
+                    <a:lstStyle/>
+                    <a:p>
+                      <a:r>
+                        <a:rPr lang="fr-FR" sz="1800" dirty="0" err="1" smtClean="0">
+                          <a:solidFill>
+                            <a:schemeClr val="tx1"/>
+                          </a:solidFill>
+                          <a:latin typeface="Arial" panose="020B0604020202020204" pitchFamily="34" charset="0"/>
+                          <a:cs typeface="Arial" panose="020B0604020202020204" pitchFamily="34" charset="0"/>
+                        </a:rPr>
+                        <a:t>Accuracy</a:t>
+                      </a:r>
+                      <a:endParaRPr lang="fr-FR" sz="1800" dirty="0">
+                        <a:solidFill>
+                          <a:schemeClr val="tx1"/>
+                        </a:solidFill>
+                        <a:latin typeface="Arial" panose="020B0604020202020204" pitchFamily="34" charset="0"/>
+                        <a:cs typeface="Arial" panose="020B0604020202020204" pitchFamily="34" charset="0"/>
+                      </a:endParaRPr>
+                    </a:p>
+                  </a:txBody>
+                  <a:tcPr>
+                    <a:lnL w="12700" cap="flat" cmpd="sng" algn="ctr">
+                      <a:solidFill>
+                        <a:schemeClr val="tx1"/>
+                      </a:solidFill>
+                      <a:prstDash val="solid"/>
+                      <a:round/>
+                      <a:headEnd type="none" w="med" len="med"/>
+                      <a:tailEnd type="none" w="med" len="med"/>
+                    </a:lnL>
+                    <a:lnR w="12700" cap="flat" cmpd="sng" algn="ctr">
+                      <a:solidFill>
+                        <a:schemeClr val="tx1"/>
+                      </a:solidFill>
+                      <a:prstDash val="solid"/>
+                      <a:round/>
+                      <a:headEnd type="none" w="med" len="med"/>
+                      <a:tailEnd type="none" w="med" len="med"/>
+                    </a:lnR>
+                    <a:lnT w="12700" cap="flat" cmpd="sng" algn="ctr">
+                      <a:solidFill>
+                        <a:schemeClr val="tx1"/>
+                      </a:solidFill>
+                      <a:prstDash val="solid"/>
+                      <a:round/>
+                      <a:headEnd type="none" w="med" len="med"/>
+                      <a:tailEnd type="none" w="med" len="med"/>
+                    </a:lnT>
+                    <a:lnB w="12700" cap="flat" cmpd="sng" algn="ctr">
+                      <a:solidFill>
+                        <a:schemeClr val="tx1"/>
+                      </a:solidFill>
+                      <a:prstDash val="solid"/>
+                      <a:round/>
+                      <a:headEnd type="none" w="med" len="med"/>
+                      <a:tailEnd type="none" w="med" len="med"/>
+                    </a:lnB>
+                    <a:lnTlToBr w="12700" cmpd="sng">
+                      <a:noFill/>
+                      <a:prstDash val="solid"/>
+                    </a:lnTlToBr>
+                    <a:lnBlToTr w="12700" cmpd="sng">
+                      <a:noFill/>
+                      <a:prstDash val="solid"/>
+                    </a:lnBlToTr>
+                    <a:solidFill>
+                      <a:schemeClr val="bg1"/>
+                    </a:solidFill>
+                  </a:tcPr>
+                </a:tc>
+                <a:tc>
+                  <a:txBody>
+                    <a:bodyPr/>
+                    <a:lstStyle/>
+                    <a:p>
+                      <a:r>
+                        <a:rPr lang="fr-FR" sz="1800" dirty="0" err="1" smtClean="0">
+                          <a:solidFill>
+                            <a:schemeClr val="tx1"/>
+                          </a:solidFill>
+                          <a:latin typeface="Arial" panose="020B0604020202020204" pitchFamily="34" charset="0"/>
+                          <a:cs typeface="Arial" panose="020B0604020202020204" pitchFamily="34" charset="0"/>
+                        </a:rPr>
+                        <a:t>Precision</a:t>
+                      </a:r>
+                      <a:endParaRPr lang="fr-FR" sz="1800" dirty="0">
+                        <a:solidFill>
+                          <a:schemeClr val="tx1"/>
+                        </a:solidFill>
+                        <a:latin typeface="Arial" panose="020B0604020202020204" pitchFamily="34" charset="0"/>
+                        <a:cs typeface="Arial" panose="020B0604020202020204" pitchFamily="34" charset="0"/>
+                      </a:endParaRPr>
+                    </a:p>
+                  </a:txBody>
+                  <a:tcPr>
+                    <a:lnL w="12700" cap="flat" cmpd="sng" algn="ctr">
+                      <a:solidFill>
+                        <a:schemeClr val="tx1"/>
+                      </a:solidFill>
+                      <a:prstDash val="solid"/>
+                      <a:round/>
+                      <a:headEnd type="none" w="med" len="med"/>
+                      <a:tailEnd type="none" w="med" len="med"/>
+                    </a:lnL>
+                    <a:lnR w="12700" cap="flat" cmpd="sng" algn="ctr">
+                      <a:solidFill>
+                        <a:schemeClr val="tx1"/>
+                      </a:solidFill>
+                      <a:prstDash val="solid"/>
+                      <a:round/>
+                      <a:headEnd type="none" w="med" len="med"/>
+                      <a:tailEnd type="none" w="med" len="med"/>
+                    </a:lnR>
+                    <a:lnT w="12700" cap="flat" cmpd="sng" algn="ctr">
+                      <a:solidFill>
+                        <a:schemeClr val="tx1"/>
+                      </a:solidFill>
+                      <a:prstDash val="solid"/>
+                      <a:round/>
+                      <a:headEnd type="none" w="med" len="med"/>
+                      <a:tailEnd type="none" w="med" len="med"/>
+                    </a:lnT>
+                    <a:lnB w="12700" cap="flat" cmpd="sng" algn="ctr">
+                      <a:solidFill>
+                        <a:schemeClr val="tx1"/>
+                      </a:solidFill>
+                      <a:prstDash val="solid"/>
+                      <a:round/>
+                      <a:headEnd type="none" w="med" len="med"/>
+                      <a:tailEnd type="none" w="med" len="med"/>
+                    </a:lnB>
+                    <a:lnTlToBr w="12700" cmpd="sng">
+                      <a:noFill/>
+                      <a:prstDash val="solid"/>
+                    </a:lnTlToBr>
+                    <a:lnBlToTr w="12700" cmpd="sng">
+                      <a:noFill/>
+                      <a:prstDash val="solid"/>
+                    </a:lnBlToTr>
+                    <a:solidFill>
+                      <a:schemeClr val="bg1"/>
+                    </a:solidFill>
+                  </a:tcPr>
+                </a:tc>
+                <a:tc>
+                  <a:txBody>
+                    <a:bodyPr/>
+                    <a:lstStyle/>
+                    <a:p>
+                      <a:r>
+                        <a:rPr lang="fr-FR" sz="1800" dirty="0" err="1" smtClean="0">
+                          <a:solidFill>
+                            <a:schemeClr val="tx1"/>
+                          </a:solidFill>
+                          <a:latin typeface="Arial" panose="020B0604020202020204" pitchFamily="34" charset="0"/>
+                          <a:cs typeface="Arial" panose="020B0604020202020204" pitchFamily="34" charset="0"/>
+                        </a:rPr>
+                        <a:t>Recall</a:t>
+                      </a:r>
+                      <a:endParaRPr lang="fr-FR" sz="1800" dirty="0">
+                        <a:solidFill>
+                          <a:schemeClr val="tx1"/>
+                        </a:solidFill>
+                        <a:latin typeface="Arial" panose="020B0604020202020204" pitchFamily="34" charset="0"/>
+                        <a:cs typeface="Arial" panose="020B0604020202020204" pitchFamily="34" charset="0"/>
+                      </a:endParaRPr>
+                    </a:p>
+                  </a:txBody>
+                  <a:tcPr>
+                    <a:lnL w="12700" cap="flat" cmpd="sng" algn="ctr">
+                      <a:solidFill>
+                        <a:schemeClr val="tx1"/>
+                      </a:solidFill>
+                      <a:prstDash val="solid"/>
+                      <a:round/>
+                      <a:headEnd type="none" w="med" len="med"/>
+                      <a:tailEnd type="none" w="med" len="med"/>
+                    </a:lnL>
+                    <a:lnR w="12700" cap="flat" cmpd="sng" algn="ctr">
+                      <a:solidFill>
+                        <a:schemeClr val="tx1"/>
+                      </a:solidFill>
+                      <a:prstDash val="solid"/>
+                      <a:round/>
+                      <a:headEnd type="none" w="med" len="med"/>
+                      <a:tailEnd type="none" w="med" len="med"/>
+                    </a:lnR>
+                    <a:lnT w="12700" cap="flat" cmpd="sng" algn="ctr">
+                      <a:solidFill>
+                        <a:schemeClr val="tx1"/>
+                      </a:solidFill>
+                      <a:prstDash val="solid"/>
+                      <a:round/>
+                      <a:headEnd type="none" w="med" len="med"/>
+                      <a:tailEnd type="none" w="med" len="med"/>
+                    </a:lnT>
+                    <a:lnB w="12700" cap="flat" cmpd="sng" algn="ctr">
+                      <a:solidFill>
+                        <a:schemeClr val="tx1"/>
+                      </a:solidFill>
+                      <a:prstDash val="solid"/>
+                      <a:round/>
+                      <a:headEnd type="none" w="med" len="med"/>
+                      <a:tailEnd type="none" w="med" len="med"/>
+                    </a:lnB>
+                    <a:lnTlToBr w="12700" cmpd="sng">
+                      <a:noFill/>
+                      <a:prstDash val="solid"/>
+                    </a:lnTlToBr>
+                    <a:lnBlToTr w="12700" cmpd="sng">
+                      <a:noFill/>
+                      <a:prstDash val="solid"/>
+                    </a:lnBlToTr>
+                    <a:solidFill>
+                      <a:schemeClr val="bg1"/>
+                    </a:solidFill>
+                  </a:tcPr>
+                </a:tc>
+                <a:tc>
+                  <a:txBody>
+                    <a:bodyPr/>
+                    <a:lstStyle/>
+                    <a:p>
+                      <a:r>
+                        <a:rPr lang="fr-FR" sz="1800" dirty="0" smtClean="0">
+                          <a:solidFill>
+                            <a:schemeClr val="tx1"/>
+                          </a:solidFill>
+                          <a:latin typeface="Arial" panose="020B0604020202020204" pitchFamily="34" charset="0"/>
+                          <a:cs typeface="Arial" panose="020B0604020202020204" pitchFamily="34" charset="0"/>
+                        </a:rPr>
+                        <a:t>F1</a:t>
+                      </a:r>
+                      <a:endParaRPr lang="fr-FR" sz="1800" dirty="0">
+                        <a:solidFill>
+                          <a:schemeClr val="tx1"/>
+                        </a:solidFill>
+                        <a:latin typeface="Arial" panose="020B0604020202020204" pitchFamily="34" charset="0"/>
+                        <a:cs typeface="Arial" panose="020B0604020202020204" pitchFamily="34" charset="0"/>
+                      </a:endParaRPr>
+                    </a:p>
+                  </a:txBody>
+                  <a:tcPr>
+                    <a:lnL w="12700" cap="flat" cmpd="sng" algn="ctr">
+                      <a:solidFill>
+                        <a:schemeClr val="tx1"/>
+                      </a:solidFill>
+                      <a:prstDash val="solid"/>
+                      <a:round/>
+                      <a:headEnd type="none" w="med" len="med"/>
+                      <a:tailEnd type="none" w="med" len="med"/>
+                    </a:lnL>
+                    <a:lnR w="12700" cap="flat" cmpd="sng" algn="ctr">
+                      <a:solidFill>
+                        <a:schemeClr val="tx1"/>
+                      </a:solidFill>
+                      <a:prstDash val="solid"/>
+                      <a:round/>
+                      <a:headEnd type="none" w="med" len="med"/>
+                      <a:tailEnd type="none" w="med" len="med"/>
+                    </a:lnR>
+                    <a:lnT w="12700" cap="flat" cmpd="sng" algn="ctr">
+                      <a:solidFill>
+                        <a:schemeClr val="tx1"/>
+                      </a:solidFill>
+                      <a:prstDash val="solid"/>
+                      <a:round/>
+                      <a:headEnd type="none" w="med" len="med"/>
+                      <a:tailEnd type="none" w="med" len="med"/>
+                    </a:lnT>
+                    <a:lnB w="12700" cap="flat" cmpd="sng" algn="ctr">
+                      <a:solidFill>
+                        <a:schemeClr val="tx1"/>
+                      </a:solidFill>
+                      <a:prstDash val="solid"/>
+                      <a:round/>
+                      <a:headEnd type="none" w="med" len="med"/>
+                      <a:tailEnd type="none" w="med" len="med"/>
+                    </a:lnB>
+                    <a:lnTlToBr w="12700" cmpd="sng">
+                      <a:noFill/>
+                      <a:prstDash val="solid"/>
+                    </a:lnTlToBr>
+                    <a:lnBlToTr w="12700" cmpd="sng">
+                      <a:noFill/>
+                      <a:prstDash val="solid"/>
+                    </a:lnBlToTr>
+                    <a:solidFill>
+                      <a:schemeClr val="bg1"/>
+                    </a:solidFill>
+                  </a:tcPr>
+                </a:tc>
+              </a:tr>
+              <a:tr h="370840">
+                <a:tc>
+                  <a:txBody>
+                    <a:bodyPr/>
+                    <a:lstStyle/>
+                    <a:p>
+                      <a:r>
+                        <a:rPr lang="fr-FR" sz="1800" dirty="0" smtClean="0">
+                          <a:solidFill>
+                            <a:schemeClr val="tx1"/>
+                          </a:solidFill>
+                          <a:latin typeface="Arial" panose="020B0604020202020204" pitchFamily="34" charset="0"/>
+                          <a:cs typeface="Arial" panose="020B0604020202020204" pitchFamily="34" charset="0"/>
+                        </a:rPr>
+                        <a:t>Our </a:t>
+                      </a:r>
+                      <a:r>
+                        <a:rPr lang="fr-FR" sz="1800" dirty="0" err="1" smtClean="0">
+                          <a:solidFill>
+                            <a:schemeClr val="tx1"/>
+                          </a:solidFill>
+                          <a:latin typeface="Arial" panose="020B0604020202020204" pitchFamily="34" charset="0"/>
+                          <a:cs typeface="Arial" panose="020B0604020202020204" pitchFamily="34" charset="0"/>
+                        </a:rPr>
+                        <a:t>results</a:t>
+                      </a:r>
+                      <a:endParaRPr lang="fr-FR" sz="1800" dirty="0">
+                        <a:solidFill>
+                          <a:schemeClr val="tx1"/>
+                        </a:solidFill>
+                        <a:latin typeface="Arial" panose="020B0604020202020204" pitchFamily="34" charset="0"/>
+                        <a:cs typeface="Arial" panose="020B0604020202020204" pitchFamily="34" charset="0"/>
+                      </a:endParaRPr>
+                    </a:p>
+                  </a:txBody>
+                  <a:tcPr>
+                    <a:lnL w="12700" cap="flat" cmpd="sng" algn="ctr">
+                      <a:solidFill>
+                        <a:schemeClr val="tx1"/>
+                      </a:solidFill>
+                      <a:prstDash val="solid"/>
+                      <a:round/>
+                      <a:headEnd type="none" w="med" len="med"/>
+                      <a:tailEnd type="none" w="med" len="med"/>
+                    </a:lnL>
+                    <a:lnR w="12700" cap="flat" cmpd="sng" algn="ctr">
+                      <a:solidFill>
+                        <a:schemeClr val="tx1"/>
+                      </a:solidFill>
+                      <a:prstDash val="solid"/>
+                      <a:round/>
+                      <a:headEnd type="none" w="med" len="med"/>
+                      <a:tailEnd type="none" w="med" len="med"/>
+                    </a:lnR>
+                    <a:lnT w="12700" cap="flat" cmpd="sng" algn="ctr">
+                      <a:solidFill>
+                        <a:schemeClr val="tx1"/>
+                      </a:solidFill>
+                      <a:prstDash val="solid"/>
+                      <a:round/>
+                      <a:headEnd type="none" w="med" len="med"/>
+                      <a:tailEnd type="none" w="med" len="med"/>
+                    </a:lnT>
+                    <a:lnB w="12700" cap="flat" cmpd="sng" algn="ctr">
+                      <a:solidFill>
+                        <a:schemeClr val="tx1"/>
+                      </a:solidFill>
+                      <a:prstDash val="solid"/>
+                      <a:round/>
+                      <a:headEnd type="none" w="med" len="med"/>
+                      <a:tailEnd type="none" w="med" len="med"/>
+                    </a:lnB>
+                    <a:lnTlToBr w="12700" cmpd="sng">
+                      <a:noFill/>
+                      <a:prstDash val="solid"/>
+                    </a:lnTlToBr>
+                    <a:lnBlToTr w="12700" cmpd="sng">
+                      <a:noFill/>
+                      <a:prstDash val="solid"/>
+                    </a:lnBlToTr>
+                    <a:solidFill>
+                      <a:schemeClr val="bg1"/>
+                    </a:solidFill>
+                  </a:tcPr>
+                </a:tc>
+                <a:tc>
+                  <a:txBody>
+                    <a:bodyPr/>
+                    <a:lstStyle/>
+                    <a:p>
+                      <a:endParaRPr lang="fr-FR" sz="1800" dirty="0">
+                        <a:solidFill>
+                          <a:schemeClr val="tx1"/>
+                        </a:solidFill>
+                        <a:latin typeface="Arial" panose="020B0604020202020204" pitchFamily="34" charset="0"/>
+                        <a:cs typeface="Arial" panose="020B0604020202020204" pitchFamily="34" charset="0"/>
+                      </a:endParaRPr>
+                    </a:p>
+                  </a:txBody>
+                  <a:tcPr>
+                    <a:lnL w="12700" cap="flat" cmpd="sng" algn="ctr">
+                      <a:solidFill>
+                        <a:schemeClr val="tx1"/>
+                      </a:solidFill>
+                      <a:prstDash val="solid"/>
+                      <a:round/>
+                      <a:headEnd type="none" w="med" len="med"/>
+                      <a:tailEnd type="none" w="med" len="med"/>
+                    </a:lnL>
+                    <a:lnR w="12700" cap="flat" cmpd="sng" algn="ctr">
+                      <a:solidFill>
+                        <a:schemeClr val="tx1"/>
+                      </a:solidFill>
+                      <a:prstDash val="solid"/>
+                      <a:round/>
+                      <a:headEnd type="none" w="med" len="med"/>
+                      <a:tailEnd type="none" w="med" len="med"/>
+                    </a:lnR>
+                    <a:lnT w="12700" cap="flat" cmpd="sng" algn="ctr">
+                      <a:solidFill>
+                        <a:schemeClr val="tx1"/>
+                      </a:solidFill>
+                      <a:prstDash val="solid"/>
+                      <a:round/>
+                      <a:headEnd type="none" w="med" len="med"/>
+                      <a:tailEnd type="none" w="med" len="med"/>
+                    </a:lnT>
+                    <a:lnB w="12700" cap="flat" cmpd="sng" algn="ctr">
+                      <a:solidFill>
+                        <a:schemeClr val="tx1"/>
+                      </a:solidFill>
+                      <a:prstDash val="solid"/>
+                      <a:round/>
+                      <a:headEnd type="none" w="med" len="med"/>
+                      <a:tailEnd type="none" w="med" len="med"/>
+                    </a:lnB>
+                    <a:lnTlToBr w="12700" cmpd="sng">
+                      <a:noFill/>
+                      <a:prstDash val="solid"/>
+                    </a:lnTlToBr>
+                    <a:lnBlToTr w="12700" cmpd="sng">
+                      <a:noFill/>
+                      <a:prstDash val="solid"/>
+                    </a:lnBlToTr>
+                    <a:solidFill>
+                      <a:schemeClr val="bg1"/>
+                    </a:solidFill>
+                  </a:tcPr>
+                </a:tc>
+                <a:tc>
+                  <a:txBody>
+                    <a:bodyPr/>
+                    <a:lstStyle/>
+                    <a:p>
+                      <a:endParaRPr lang="fr-FR" sz="1800" dirty="0">
+                        <a:solidFill>
+                          <a:schemeClr val="tx1"/>
+                        </a:solidFill>
+                        <a:latin typeface="Arial" panose="020B0604020202020204" pitchFamily="34" charset="0"/>
+                        <a:cs typeface="Arial" panose="020B0604020202020204" pitchFamily="34" charset="0"/>
+                      </a:endParaRPr>
+                    </a:p>
+                  </a:txBody>
+                  <a:tcPr>
+                    <a:lnL w="12700" cap="flat" cmpd="sng" algn="ctr">
+                      <a:solidFill>
+                        <a:schemeClr val="tx1"/>
+                      </a:solidFill>
+                      <a:prstDash val="solid"/>
+                      <a:round/>
+                      <a:headEnd type="none" w="med" len="med"/>
+                      <a:tailEnd type="none" w="med" len="med"/>
+                    </a:lnL>
+                    <a:lnR w="12700" cap="flat" cmpd="sng" algn="ctr">
+                      <a:solidFill>
+                        <a:schemeClr val="tx1"/>
+                      </a:solidFill>
+                      <a:prstDash val="solid"/>
+                      <a:round/>
+                      <a:headEnd type="none" w="med" len="med"/>
+                      <a:tailEnd type="none" w="med" len="med"/>
+                    </a:lnR>
+                    <a:lnT w="12700" cap="flat" cmpd="sng" algn="ctr">
+                      <a:solidFill>
+                        <a:schemeClr val="tx1"/>
+                      </a:solidFill>
+                      <a:prstDash val="solid"/>
+                      <a:round/>
+                      <a:headEnd type="none" w="med" len="med"/>
+                      <a:tailEnd type="none" w="med" len="med"/>
+                    </a:lnT>
+                    <a:lnB w="12700" cap="flat" cmpd="sng" algn="ctr">
+                      <a:solidFill>
+                        <a:schemeClr val="tx1"/>
+                      </a:solidFill>
+                      <a:prstDash val="solid"/>
+                      <a:round/>
+                      <a:headEnd type="none" w="med" len="med"/>
+                      <a:tailEnd type="none" w="med" len="med"/>
+                    </a:lnB>
+                    <a:lnTlToBr w="12700" cmpd="sng">
+                      <a:noFill/>
+                      <a:prstDash val="solid"/>
+                    </a:lnTlToBr>
+                    <a:lnBlToTr w="12700" cmpd="sng">
+                      <a:noFill/>
+                      <a:prstDash val="solid"/>
+                    </a:lnBlToTr>
+                    <a:solidFill>
+                      <a:schemeClr val="bg1"/>
+                    </a:solidFill>
+                  </a:tcPr>
+                </a:tc>
+                <a:tc>
+                  <a:txBody>
+                    <a:bodyPr/>
+                    <a:lstStyle/>
+                    <a:p>
+                      <a:endParaRPr lang="fr-FR" sz="1800" dirty="0">
+                        <a:solidFill>
+                          <a:schemeClr val="tx1"/>
+                        </a:solidFill>
+                        <a:latin typeface="Arial" panose="020B0604020202020204" pitchFamily="34" charset="0"/>
+                        <a:cs typeface="Arial" panose="020B0604020202020204" pitchFamily="34" charset="0"/>
+                      </a:endParaRPr>
+                    </a:p>
+                  </a:txBody>
+                  <a:tcPr>
+                    <a:lnL w="12700" cap="flat" cmpd="sng" algn="ctr">
+                      <a:solidFill>
+                        <a:schemeClr val="tx1"/>
+                      </a:solidFill>
+                      <a:prstDash val="solid"/>
+                      <a:round/>
+                      <a:headEnd type="none" w="med" len="med"/>
+                      <a:tailEnd type="none" w="med" len="med"/>
+                    </a:lnL>
+                    <a:lnR w="12700" cap="flat" cmpd="sng" algn="ctr">
+                      <a:solidFill>
+                        <a:schemeClr val="tx1"/>
+                      </a:solidFill>
+                      <a:prstDash val="solid"/>
+                      <a:round/>
+                      <a:headEnd type="none" w="med" len="med"/>
+                      <a:tailEnd type="none" w="med" len="med"/>
+                    </a:lnR>
+                    <a:lnT w="12700" cap="flat" cmpd="sng" algn="ctr">
+                      <a:solidFill>
+                        <a:schemeClr val="tx1"/>
+                      </a:solidFill>
+                      <a:prstDash val="solid"/>
+                      <a:round/>
+                      <a:headEnd type="none" w="med" len="med"/>
+                      <a:tailEnd type="none" w="med" len="med"/>
+                    </a:lnT>
+                    <a:lnB w="12700" cap="flat" cmpd="sng" algn="ctr">
+                      <a:solidFill>
+                        <a:schemeClr val="tx1"/>
+                      </a:solidFill>
+                      <a:prstDash val="solid"/>
+                      <a:round/>
+                      <a:headEnd type="none" w="med" len="med"/>
+                      <a:tailEnd type="none" w="med" len="med"/>
+                    </a:lnB>
+                    <a:lnTlToBr w="12700" cmpd="sng">
+                      <a:noFill/>
+                      <a:prstDash val="solid"/>
+                    </a:lnTlToBr>
+                    <a:lnBlToTr w="12700" cmpd="sng">
+                      <a:noFill/>
+                      <a:prstDash val="solid"/>
+                    </a:lnBlToTr>
+                    <a:solidFill>
+                      <a:schemeClr val="bg1"/>
+                    </a:solidFill>
+                  </a:tcPr>
+                </a:tc>
+                <a:tc>
+                  <a:txBody>
+                    <a:bodyPr/>
+                    <a:lstStyle/>
+                    <a:p>
+                      <a:endParaRPr lang="fr-FR" sz="1800" dirty="0">
+                        <a:solidFill>
+                          <a:schemeClr val="tx1"/>
+                        </a:solidFill>
+                        <a:latin typeface="Arial" panose="020B0604020202020204" pitchFamily="34" charset="0"/>
+                        <a:cs typeface="Arial" panose="020B0604020202020204" pitchFamily="34" charset="0"/>
+                      </a:endParaRPr>
+                    </a:p>
+                  </a:txBody>
+                  <a:tcPr>
+                    <a:lnL w="12700" cap="flat" cmpd="sng" algn="ctr">
+                      <a:solidFill>
+                        <a:schemeClr val="tx1"/>
+                      </a:solidFill>
+                      <a:prstDash val="solid"/>
+                      <a:round/>
+                      <a:headEnd type="none" w="med" len="med"/>
+                      <a:tailEnd type="none" w="med" len="med"/>
+                    </a:lnL>
+                    <a:lnR w="12700" cap="flat" cmpd="sng" algn="ctr">
+                      <a:solidFill>
+                        <a:schemeClr val="tx1"/>
+                      </a:solidFill>
+                      <a:prstDash val="solid"/>
+                      <a:round/>
+                      <a:headEnd type="none" w="med" len="med"/>
+                      <a:tailEnd type="none" w="med" len="med"/>
+                    </a:lnR>
+                    <a:lnT w="12700" cap="flat" cmpd="sng" algn="ctr">
+                      <a:solidFill>
+                        <a:schemeClr val="tx1"/>
+                      </a:solidFill>
+                      <a:prstDash val="solid"/>
+                      <a:round/>
+                      <a:headEnd type="none" w="med" len="med"/>
+                      <a:tailEnd type="none" w="med" len="med"/>
+                    </a:lnT>
+                    <a:lnB w="12700" cap="flat" cmpd="sng" algn="ctr">
+                      <a:solidFill>
+                        <a:schemeClr val="tx1"/>
+                      </a:solidFill>
+                      <a:prstDash val="solid"/>
+                      <a:round/>
+                      <a:headEnd type="none" w="med" len="med"/>
+                      <a:tailEnd type="none" w="med" len="med"/>
+                    </a:lnB>
+                    <a:lnTlToBr w="12700" cmpd="sng">
+                      <a:noFill/>
+                      <a:prstDash val="solid"/>
+                    </a:lnTlToBr>
+                    <a:lnBlToTr w="12700" cmpd="sng">
+                      <a:noFill/>
+                      <a:prstDash val="solid"/>
+                    </a:lnBlToTr>
+                    <a:solidFill>
+                      <a:schemeClr val="bg1"/>
+                    </a:solidFill>
+                  </a:tcPr>
+                </a:tc>
+                <a:tc>
+                  <a:txBody>
+                    <a:bodyPr/>
+                    <a:lstStyle/>
+                    <a:p>
+                      <a:endParaRPr lang="fr-FR" sz="1800" dirty="0">
+                        <a:solidFill>
+                          <a:schemeClr val="tx1"/>
+                        </a:solidFill>
+                        <a:latin typeface="Arial" panose="020B0604020202020204" pitchFamily="34" charset="0"/>
+                        <a:cs typeface="Arial" panose="020B0604020202020204" pitchFamily="34" charset="0"/>
+                      </a:endParaRPr>
+                    </a:p>
+                  </a:txBody>
+                  <a:tcPr>
+                    <a:lnL w="12700" cap="flat" cmpd="sng" algn="ctr">
+                      <a:solidFill>
+                        <a:schemeClr val="tx1"/>
+                      </a:solidFill>
+                      <a:prstDash val="solid"/>
+                      <a:round/>
+                      <a:headEnd type="none" w="med" len="med"/>
+                      <a:tailEnd type="none" w="med" len="med"/>
+                    </a:lnL>
+                    <a:lnR w="12700" cap="flat" cmpd="sng" algn="ctr">
+                      <a:solidFill>
+                        <a:schemeClr val="tx1"/>
+                      </a:solidFill>
+                      <a:prstDash val="solid"/>
+                      <a:round/>
+                      <a:headEnd type="none" w="med" len="med"/>
+                      <a:tailEnd type="none" w="med" len="med"/>
+                    </a:lnR>
+                    <a:lnT w="12700" cap="flat" cmpd="sng" algn="ctr">
+                      <a:solidFill>
+                        <a:schemeClr val="tx1"/>
+                      </a:solidFill>
+                      <a:prstDash val="solid"/>
+                      <a:round/>
+                      <a:headEnd type="none" w="med" len="med"/>
+                      <a:tailEnd type="none" w="med" len="med"/>
+                    </a:lnT>
+                    <a:lnB w="12700" cap="flat" cmpd="sng" algn="ctr">
+                      <a:solidFill>
+                        <a:schemeClr val="tx1"/>
+                      </a:solidFill>
+                      <a:prstDash val="solid"/>
+                      <a:round/>
+                      <a:headEnd type="none" w="med" len="med"/>
+                      <a:tailEnd type="none" w="med" len="med"/>
+                    </a:lnB>
+                    <a:lnTlToBr w="12700" cmpd="sng">
+                      <a:noFill/>
+                      <a:prstDash val="solid"/>
+                    </a:lnTlToBr>
+                    <a:lnBlToTr w="12700" cmpd="sng">
+                      <a:noFill/>
+                      <a:prstDash val="solid"/>
+                    </a:lnBlToTr>
+                    <a:solidFill>
+                      <a:schemeClr val="bg1"/>
+                    </a:solidFill>
+                  </a:tcPr>
+                </a:tc>
+                <a:tc>
+                  <a:txBody>
+                    <a:bodyPr/>
+                    <a:lstStyle/>
+                    <a:p>
+                      <a:endParaRPr lang="fr-FR" sz="1800" dirty="0">
+                        <a:solidFill>
+                          <a:schemeClr val="tx1"/>
+                        </a:solidFill>
+                        <a:latin typeface="Arial" panose="020B0604020202020204" pitchFamily="34" charset="0"/>
+                        <a:cs typeface="Arial" panose="020B0604020202020204" pitchFamily="34" charset="0"/>
+                      </a:endParaRPr>
+                    </a:p>
+                  </a:txBody>
+                  <a:tcPr>
+                    <a:lnL w="12700" cap="flat" cmpd="sng" algn="ctr">
+                      <a:solidFill>
+                        <a:schemeClr val="tx1"/>
+                      </a:solidFill>
+                      <a:prstDash val="solid"/>
+                      <a:round/>
+                      <a:headEnd type="none" w="med" len="med"/>
+                      <a:tailEnd type="none" w="med" len="med"/>
+                    </a:lnL>
+                    <a:lnR w="12700" cap="flat" cmpd="sng" algn="ctr">
+                      <a:solidFill>
+                        <a:schemeClr val="tx1"/>
+                      </a:solidFill>
+                      <a:prstDash val="solid"/>
+                      <a:round/>
+                      <a:headEnd type="none" w="med" len="med"/>
+                      <a:tailEnd type="none" w="med" len="med"/>
+                    </a:lnR>
+                    <a:lnT w="12700" cap="flat" cmpd="sng" algn="ctr">
+                      <a:solidFill>
+                        <a:schemeClr val="tx1"/>
+                      </a:solidFill>
+                      <a:prstDash val="solid"/>
+                      <a:round/>
+                      <a:headEnd type="none" w="med" len="med"/>
+                      <a:tailEnd type="none" w="med" len="med"/>
+                    </a:lnT>
+                    <a:lnB w="12700" cap="flat" cmpd="sng" algn="ctr">
+                      <a:solidFill>
+                        <a:schemeClr val="tx1"/>
+                      </a:solidFill>
+                      <a:prstDash val="solid"/>
+                      <a:round/>
+                      <a:headEnd type="none" w="med" len="med"/>
+                      <a:tailEnd type="none" w="med" len="med"/>
+                    </a:lnB>
+                    <a:lnTlToBr w="12700" cmpd="sng">
+                      <a:noFill/>
+                      <a:prstDash val="solid"/>
+                    </a:lnTlToBr>
+                    <a:lnBlToTr w="12700" cmpd="sng">
+                      <a:noFill/>
+                      <a:prstDash val="solid"/>
+                    </a:lnBlToTr>
+                    <a:solidFill>
+                      <a:schemeClr val="bg1"/>
+                    </a:solidFill>
+                  </a:tcPr>
+                </a:tc>
+              </a:tr>
+              <a:tr h="370840">
+                <a:tc>
+                  <a:txBody>
+                    <a:bodyPr/>
+                    <a:lstStyle/>
+                    <a:p>
+                      <a:r>
+                        <a:rPr lang="fr-FR" sz="1800" dirty="0" smtClean="0">
+                          <a:solidFill>
+                            <a:schemeClr val="tx1"/>
+                          </a:solidFill>
+                          <a:latin typeface="Arial" panose="020B0604020202020204" pitchFamily="34" charset="0"/>
+                          <a:cs typeface="Arial" panose="020B0604020202020204" pitchFamily="34" charset="0"/>
+                        </a:rPr>
+                        <a:t>Ida </a:t>
+                      </a:r>
+                      <a:r>
+                        <a:rPr lang="fr-FR" sz="1800" dirty="0" err="1" smtClean="0">
+                          <a:solidFill>
+                            <a:schemeClr val="tx1"/>
+                          </a:solidFill>
+                          <a:latin typeface="Arial" panose="020B0604020202020204" pitchFamily="34" charset="0"/>
+                          <a:cs typeface="Arial" panose="020B0604020202020204" pitchFamily="34" charset="0"/>
+                        </a:rPr>
+                        <a:t>Meitil’s</a:t>
+                      </a:r>
+                      <a:r>
+                        <a:rPr lang="fr-FR" sz="1800" dirty="0" smtClean="0">
+                          <a:solidFill>
+                            <a:schemeClr val="tx1"/>
+                          </a:solidFill>
+                          <a:latin typeface="Arial" panose="020B0604020202020204" pitchFamily="34" charset="0"/>
+                          <a:cs typeface="Arial" panose="020B0604020202020204" pitchFamily="34" charset="0"/>
+                        </a:rPr>
+                        <a:t> </a:t>
+                      </a:r>
+                      <a:r>
+                        <a:rPr lang="fr-FR" sz="1800" dirty="0" err="1" smtClean="0">
+                          <a:solidFill>
+                            <a:schemeClr val="tx1"/>
+                          </a:solidFill>
+                          <a:latin typeface="Arial" panose="020B0604020202020204" pitchFamily="34" charset="0"/>
+                          <a:cs typeface="Arial" panose="020B0604020202020204" pitchFamily="34" charset="0"/>
+                        </a:rPr>
+                        <a:t>results</a:t>
+                      </a:r>
+                      <a:endParaRPr lang="fr-FR" sz="1800" dirty="0">
+                        <a:solidFill>
+                          <a:schemeClr val="tx1"/>
+                        </a:solidFill>
+                        <a:latin typeface="Arial" panose="020B0604020202020204" pitchFamily="34" charset="0"/>
+                        <a:cs typeface="Arial" panose="020B0604020202020204" pitchFamily="34" charset="0"/>
+                      </a:endParaRPr>
+                    </a:p>
+                  </a:txBody>
+                  <a:tcPr>
+                    <a:lnL w="12700" cap="flat" cmpd="sng" algn="ctr">
+                      <a:solidFill>
+                        <a:schemeClr val="tx1"/>
+                      </a:solidFill>
+                      <a:prstDash val="solid"/>
+                      <a:round/>
+                      <a:headEnd type="none" w="med" len="med"/>
+                      <a:tailEnd type="none" w="med" len="med"/>
+                    </a:lnL>
+                    <a:lnR w="12700" cap="flat" cmpd="sng" algn="ctr">
+                      <a:solidFill>
+                        <a:schemeClr val="tx1"/>
+                      </a:solidFill>
+                      <a:prstDash val="solid"/>
+                      <a:round/>
+                      <a:headEnd type="none" w="med" len="med"/>
+                      <a:tailEnd type="none" w="med" len="med"/>
+                    </a:lnR>
+                    <a:lnT w="12700" cap="flat" cmpd="sng" algn="ctr">
+                      <a:solidFill>
+                        <a:schemeClr val="tx1"/>
+                      </a:solidFill>
+                      <a:prstDash val="solid"/>
+                      <a:round/>
+                      <a:headEnd type="none" w="med" len="med"/>
+                      <a:tailEnd type="none" w="med" len="med"/>
+                    </a:lnT>
+                    <a:lnB w="12700" cap="flat" cmpd="sng" algn="ctr">
+                      <a:solidFill>
+                        <a:schemeClr val="tx1"/>
+                      </a:solidFill>
+                      <a:prstDash val="solid"/>
+                      <a:round/>
+                      <a:headEnd type="none" w="med" len="med"/>
+                      <a:tailEnd type="none" w="med" len="med"/>
+                    </a:lnB>
+                    <a:lnTlToBr w="12700" cmpd="sng">
+                      <a:noFill/>
+                      <a:prstDash val="solid"/>
+                    </a:lnTlToBr>
+                    <a:lnBlToTr w="12700" cmpd="sng">
+                      <a:noFill/>
+                      <a:prstDash val="solid"/>
+                    </a:lnBlToTr>
+                    <a:solidFill>
+                      <a:schemeClr val="bg1"/>
+                    </a:solidFill>
+                  </a:tcPr>
+                </a:tc>
+                <a:tc>
+                  <a:txBody>
+                    <a:bodyPr/>
+                    <a:lstStyle/>
+                    <a:p>
+                      <a:r>
+                        <a:rPr lang="fr-FR" sz="1800" dirty="0" smtClean="0">
+                          <a:solidFill>
+                            <a:schemeClr val="tx1"/>
+                          </a:solidFill>
+                          <a:latin typeface="Arial" panose="020B0604020202020204" pitchFamily="34" charset="0"/>
+                          <a:cs typeface="Arial" panose="020B0604020202020204" pitchFamily="34" charset="0"/>
+                        </a:rPr>
+                        <a:t>0.84</a:t>
+                      </a:r>
+                      <a:endParaRPr lang="fr-FR" sz="1800" dirty="0">
+                        <a:solidFill>
+                          <a:schemeClr val="tx1"/>
+                        </a:solidFill>
+                        <a:latin typeface="Arial" panose="020B0604020202020204" pitchFamily="34" charset="0"/>
+                        <a:cs typeface="Arial" panose="020B0604020202020204" pitchFamily="34" charset="0"/>
+                      </a:endParaRPr>
+                    </a:p>
+                  </a:txBody>
+                  <a:tcPr>
+                    <a:lnL w="12700" cap="flat" cmpd="sng" algn="ctr">
+                      <a:solidFill>
+                        <a:schemeClr val="tx1"/>
+                      </a:solidFill>
+                      <a:prstDash val="solid"/>
+                      <a:round/>
+                      <a:headEnd type="none" w="med" len="med"/>
+                      <a:tailEnd type="none" w="med" len="med"/>
+                    </a:lnL>
+                    <a:lnR w="12700" cap="flat" cmpd="sng" algn="ctr">
+                      <a:solidFill>
+                        <a:schemeClr val="tx1"/>
+                      </a:solidFill>
+                      <a:prstDash val="solid"/>
+                      <a:round/>
+                      <a:headEnd type="none" w="med" len="med"/>
+                      <a:tailEnd type="none" w="med" len="med"/>
+                    </a:lnR>
+                    <a:lnT w="12700" cap="flat" cmpd="sng" algn="ctr">
+                      <a:solidFill>
+                        <a:schemeClr val="tx1"/>
+                      </a:solidFill>
+                      <a:prstDash val="solid"/>
+                      <a:round/>
+                      <a:headEnd type="none" w="med" len="med"/>
+                      <a:tailEnd type="none" w="med" len="med"/>
+                    </a:lnT>
+                    <a:lnB w="12700" cap="flat" cmpd="sng" algn="ctr">
+                      <a:solidFill>
+                        <a:schemeClr val="tx1"/>
+                      </a:solidFill>
+                      <a:prstDash val="solid"/>
+                      <a:round/>
+                      <a:headEnd type="none" w="med" len="med"/>
+                      <a:tailEnd type="none" w="med" len="med"/>
+                    </a:lnB>
+                    <a:lnTlToBr w="12700" cmpd="sng">
+                      <a:noFill/>
+                      <a:prstDash val="solid"/>
+                    </a:lnTlToBr>
+                    <a:lnBlToTr w="12700" cmpd="sng">
+                      <a:noFill/>
+                      <a:prstDash val="solid"/>
+                    </a:lnBlToTr>
+                    <a:solidFill>
+                      <a:schemeClr val="bg1"/>
+                    </a:solidFill>
+                  </a:tcPr>
+                </a:tc>
+                <a:tc>
+                  <a:txBody>
+                    <a:bodyPr/>
+                    <a:lstStyle/>
+                    <a:p>
+                      <a:r>
+                        <a:rPr lang="fr-FR" sz="1800" dirty="0" smtClean="0">
+                          <a:solidFill>
+                            <a:schemeClr val="tx1"/>
+                          </a:solidFill>
+                          <a:latin typeface="Arial" panose="020B0604020202020204" pitchFamily="34" charset="0"/>
+                          <a:cs typeface="Arial" panose="020B0604020202020204" pitchFamily="34" charset="0"/>
+                        </a:rPr>
+                        <a:t>0.63</a:t>
+                      </a:r>
+                      <a:endParaRPr lang="fr-FR" sz="1800" dirty="0">
+                        <a:solidFill>
+                          <a:schemeClr val="tx1"/>
+                        </a:solidFill>
+                        <a:latin typeface="Arial" panose="020B0604020202020204" pitchFamily="34" charset="0"/>
+                        <a:cs typeface="Arial" panose="020B0604020202020204" pitchFamily="34" charset="0"/>
+                      </a:endParaRPr>
+                    </a:p>
+                  </a:txBody>
+                  <a:tcPr>
+                    <a:lnL w="12700" cap="flat" cmpd="sng" algn="ctr">
+                      <a:solidFill>
+                        <a:schemeClr val="tx1"/>
+                      </a:solidFill>
+                      <a:prstDash val="solid"/>
+                      <a:round/>
+                      <a:headEnd type="none" w="med" len="med"/>
+                      <a:tailEnd type="none" w="med" len="med"/>
+                    </a:lnL>
+                    <a:lnR w="12700" cap="flat" cmpd="sng" algn="ctr">
+                      <a:solidFill>
+                        <a:schemeClr val="tx1"/>
+                      </a:solidFill>
+                      <a:prstDash val="solid"/>
+                      <a:round/>
+                      <a:headEnd type="none" w="med" len="med"/>
+                      <a:tailEnd type="none" w="med" len="med"/>
+                    </a:lnR>
+                    <a:lnT w="12700" cap="flat" cmpd="sng" algn="ctr">
+                      <a:solidFill>
+                        <a:schemeClr val="tx1"/>
+                      </a:solidFill>
+                      <a:prstDash val="solid"/>
+                      <a:round/>
+                      <a:headEnd type="none" w="med" len="med"/>
+                      <a:tailEnd type="none" w="med" len="med"/>
+                    </a:lnT>
+                    <a:lnB w="12700" cap="flat" cmpd="sng" algn="ctr">
+                      <a:solidFill>
+                        <a:schemeClr val="tx1"/>
+                      </a:solidFill>
+                      <a:prstDash val="solid"/>
+                      <a:round/>
+                      <a:headEnd type="none" w="med" len="med"/>
+                      <a:tailEnd type="none" w="med" len="med"/>
+                    </a:lnB>
+                    <a:lnTlToBr w="12700" cmpd="sng">
+                      <a:noFill/>
+                      <a:prstDash val="solid"/>
+                    </a:lnTlToBr>
+                    <a:lnBlToTr w="12700" cmpd="sng">
+                      <a:noFill/>
+                      <a:prstDash val="solid"/>
+                    </a:lnBlToTr>
+                    <a:solidFill>
+                      <a:schemeClr val="bg1"/>
+                    </a:solidFill>
+                  </a:tcPr>
+                </a:tc>
+                <a:tc>
+                  <a:txBody>
+                    <a:bodyPr/>
+                    <a:lstStyle/>
+                    <a:p>
+                      <a:r>
+                        <a:rPr lang="fr-FR" sz="1800" dirty="0" smtClean="0">
+                          <a:solidFill>
+                            <a:schemeClr val="tx1"/>
+                          </a:solidFill>
+                          <a:latin typeface="Arial" panose="020B0604020202020204" pitchFamily="34" charset="0"/>
+                          <a:cs typeface="Arial" panose="020B0604020202020204" pitchFamily="34" charset="0"/>
+                        </a:rPr>
+                        <a:t>0.88</a:t>
+                      </a:r>
+                      <a:endParaRPr lang="fr-FR" sz="1800" dirty="0">
+                        <a:solidFill>
+                          <a:schemeClr val="tx1"/>
+                        </a:solidFill>
+                        <a:latin typeface="Arial" panose="020B0604020202020204" pitchFamily="34" charset="0"/>
+                        <a:cs typeface="Arial" panose="020B0604020202020204" pitchFamily="34" charset="0"/>
+                      </a:endParaRPr>
+                    </a:p>
+                  </a:txBody>
+                  <a:tcPr>
+                    <a:lnL w="12700" cap="flat" cmpd="sng" algn="ctr">
+                      <a:solidFill>
+                        <a:schemeClr val="tx1"/>
+                      </a:solidFill>
+                      <a:prstDash val="solid"/>
+                      <a:round/>
+                      <a:headEnd type="none" w="med" len="med"/>
+                      <a:tailEnd type="none" w="med" len="med"/>
+                    </a:lnL>
+                    <a:lnR w="12700" cap="flat" cmpd="sng" algn="ctr">
+                      <a:solidFill>
+                        <a:schemeClr val="tx1"/>
+                      </a:solidFill>
+                      <a:prstDash val="solid"/>
+                      <a:round/>
+                      <a:headEnd type="none" w="med" len="med"/>
+                      <a:tailEnd type="none" w="med" len="med"/>
+                    </a:lnR>
+                    <a:lnT w="12700" cap="flat" cmpd="sng" algn="ctr">
+                      <a:solidFill>
+                        <a:schemeClr val="tx1"/>
+                      </a:solidFill>
+                      <a:prstDash val="solid"/>
+                      <a:round/>
+                      <a:headEnd type="none" w="med" len="med"/>
+                      <a:tailEnd type="none" w="med" len="med"/>
+                    </a:lnT>
+                    <a:lnB w="12700" cap="flat" cmpd="sng" algn="ctr">
+                      <a:solidFill>
+                        <a:schemeClr val="tx1"/>
+                      </a:solidFill>
+                      <a:prstDash val="solid"/>
+                      <a:round/>
+                      <a:headEnd type="none" w="med" len="med"/>
+                      <a:tailEnd type="none" w="med" len="med"/>
+                    </a:lnB>
+                    <a:lnTlToBr w="12700" cmpd="sng">
+                      <a:noFill/>
+                      <a:prstDash val="solid"/>
+                    </a:lnTlToBr>
+                    <a:lnBlToTr w="12700" cmpd="sng">
+                      <a:noFill/>
+                      <a:prstDash val="solid"/>
+                    </a:lnBlToTr>
+                    <a:solidFill>
+                      <a:schemeClr val="bg1"/>
+                    </a:solidFill>
+                  </a:tcPr>
+                </a:tc>
+                <a:tc>
+                  <a:txBody>
+                    <a:bodyPr/>
+                    <a:lstStyle/>
+                    <a:p>
+                      <a:r>
+                        <a:rPr lang="fr-FR" sz="1800" dirty="0" smtClean="0">
+                          <a:solidFill>
+                            <a:schemeClr val="tx1"/>
+                          </a:solidFill>
+                          <a:latin typeface="Arial" panose="020B0604020202020204" pitchFamily="34" charset="0"/>
+                          <a:cs typeface="Arial" panose="020B0604020202020204" pitchFamily="34" charset="0"/>
+                        </a:rPr>
+                        <a:t>0.79</a:t>
+                      </a:r>
+                      <a:endParaRPr lang="fr-FR" sz="1800" dirty="0">
+                        <a:solidFill>
+                          <a:schemeClr val="tx1"/>
+                        </a:solidFill>
+                        <a:latin typeface="Arial" panose="020B0604020202020204" pitchFamily="34" charset="0"/>
+                        <a:cs typeface="Arial" panose="020B0604020202020204" pitchFamily="34" charset="0"/>
+                      </a:endParaRPr>
+                    </a:p>
+                  </a:txBody>
+                  <a:tcPr>
+                    <a:lnL w="12700" cap="flat" cmpd="sng" algn="ctr">
+                      <a:solidFill>
+                        <a:schemeClr val="tx1"/>
+                      </a:solidFill>
+                      <a:prstDash val="solid"/>
+                      <a:round/>
+                      <a:headEnd type="none" w="med" len="med"/>
+                      <a:tailEnd type="none" w="med" len="med"/>
+                    </a:lnL>
+                    <a:lnR w="12700" cap="flat" cmpd="sng" algn="ctr">
+                      <a:solidFill>
+                        <a:schemeClr val="tx1"/>
+                      </a:solidFill>
+                      <a:prstDash val="solid"/>
+                      <a:round/>
+                      <a:headEnd type="none" w="med" len="med"/>
+                      <a:tailEnd type="none" w="med" len="med"/>
+                    </a:lnR>
+                    <a:lnT w="12700" cap="flat" cmpd="sng" algn="ctr">
+                      <a:solidFill>
+                        <a:schemeClr val="tx1"/>
+                      </a:solidFill>
+                      <a:prstDash val="solid"/>
+                      <a:round/>
+                      <a:headEnd type="none" w="med" len="med"/>
+                      <a:tailEnd type="none" w="med" len="med"/>
+                    </a:lnT>
+                    <a:lnB w="12700" cap="flat" cmpd="sng" algn="ctr">
+                      <a:solidFill>
+                        <a:schemeClr val="tx1"/>
+                      </a:solidFill>
+                      <a:prstDash val="solid"/>
+                      <a:round/>
+                      <a:headEnd type="none" w="med" len="med"/>
+                      <a:tailEnd type="none" w="med" len="med"/>
+                    </a:lnB>
+                    <a:lnTlToBr w="12700" cmpd="sng">
+                      <a:noFill/>
+                      <a:prstDash val="solid"/>
+                    </a:lnTlToBr>
+                    <a:lnBlToTr w="12700" cmpd="sng">
+                      <a:noFill/>
+                      <a:prstDash val="solid"/>
+                    </a:lnBlToTr>
+                    <a:solidFill>
+                      <a:schemeClr val="bg1"/>
+                    </a:solidFill>
+                  </a:tcPr>
+                </a:tc>
+                <a:tc>
+                  <a:txBody>
+                    <a:bodyPr/>
+                    <a:lstStyle/>
+                    <a:p>
+                      <a:r>
+                        <a:rPr lang="fr-FR" sz="1800" dirty="0" smtClean="0">
+                          <a:solidFill>
+                            <a:schemeClr val="tx1"/>
+                          </a:solidFill>
+                          <a:latin typeface="Arial" panose="020B0604020202020204" pitchFamily="34" charset="0"/>
+                          <a:cs typeface="Arial" panose="020B0604020202020204" pitchFamily="34" charset="0"/>
+                        </a:rPr>
+                        <a:t>0.61</a:t>
+                      </a:r>
+                      <a:endParaRPr lang="fr-FR" sz="1800" dirty="0">
+                        <a:solidFill>
+                          <a:schemeClr val="tx1"/>
+                        </a:solidFill>
+                        <a:latin typeface="Arial" panose="020B0604020202020204" pitchFamily="34" charset="0"/>
+                        <a:cs typeface="Arial" panose="020B0604020202020204" pitchFamily="34" charset="0"/>
+                      </a:endParaRPr>
+                    </a:p>
+                  </a:txBody>
+                  <a:tcPr>
+                    <a:lnL w="12700" cap="flat" cmpd="sng" algn="ctr">
+                      <a:solidFill>
+                        <a:schemeClr val="tx1"/>
+                      </a:solidFill>
+                      <a:prstDash val="solid"/>
+                      <a:round/>
+                      <a:headEnd type="none" w="med" len="med"/>
+                      <a:tailEnd type="none" w="med" len="med"/>
+                    </a:lnL>
+                    <a:lnR w="12700" cap="flat" cmpd="sng" algn="ctr">
+                      <a:solidFill>
+                        <a:schemeClr val="tx1"/>
+                      </a:solidFill>
+                      <a:prstDash val="solid"/>
+                      <a:round/>
+                      <a:headEnd type="none" w="med" len="med"/>
+                      <a:tailEnd type="none" w="med" len="med"/>
+                    </a:lnR>
+                    <a:lnT w="12700" cap="flat" cmpd="sng" algn="ctr">
+                      <a:solidFill>
+                        <a:schemeClr val="tx1"/>
+                      </a:solidFill>
+                      <a:prstDash val="solid"/>
+                      <a:round/>
+                      <a:headEnd type="none" w="med" len="med"/>
+                      <a:tailEnd type="none" w="med" len="med"/>
+                    </a:lnT>
+                    <a:lnB w="12700" cap="flat" cmpd="sng" algn="ctr">
+                      <a:solidFill>
+                        <a:schemeClr val="tx1"/>
+                      </a:solidFill>
+                      <a:prstDash val="solid"/>
+                      <a:round/>
+                      <a:headEnd type="none" w="med" len="med"/>
+                      <a:tailEnd type="none" w="med" len="med"/>
+                    </a:lnB>
+                    <a:lnTlToBr w="12700" cmpd="sng">
+                      <a:noFill/>
+                      <a:prstDash val="solid"/>
+                    </a:lnTlToBr>
+                    <a:lnBlToTr w="12700" cmpd="sng">
+                      <a:noFill/>
+                      <a:prstDash val="solid"/>
+                    </a:lnBlToTr>
+                    <a:solidFill>
+                      <a:schemeClr val="bg1"/>
+                    </a:solidFill>
+                  </a:tcPr>
+                </a:tc>
+                <a:tc>
+                  <a:txBody>
+                    <a:bodyPr/>
+                    <a:lstStyle/>
+                    <a:p>
+                      <a:r>
+                        <a:rPr lang="fr-FR" sz="1800" dirty="0" smtClean="0">
+                          <a:solidFill>
+                            <a:schemeClr val="tx1"/>
+                          </a:solidFill>
+                          <a:latin typeface="Arial" panose="020B0604020202020204" pitchFamily="34" charset="0"/>
+                          <a:cs typeface="Arial" panose="020B0604020202020204" pitchFamily="34" charset="0"/>
+                        </a:rPr>
+                        <a:t>0.69</a:t>
+                      </a:r>
+                      <a:endParaRPr lang="fr-FR" sz="1800" dirty="0">
+                        <a:solidFill>
+                          <a:schemeClr val="tx1"/>
+                        </a:solidFill>
+                        <a:latin typeface="Arial" panose="020B0604020202020204" pitchFamily="34" charset="0"/>
+                        <a:cs typeface="Arial" panose="020B0604020202020204" pitchFamily="34" charset="0"/>
+                      </a:endParaRPr>
+                    </a:p>
+                  </a:txBody>
+                  <a:tcPr>
+                    <a:lnL w="12700" cap="flat" cmpd="sng" algn="ctr">
+                      <a:solidFill>
+                        <a:schemeClr val="tx1"/>
+                      </a:solidFill>
+                      <a:prstDash val="solid"/>
+                      <a:round/>
+                      <a:headEnd type="none" w="med" len="med"/>
+                      <a:tailEnd type="none" w="med" len="med"/>
+                    </a:lnL>
+                    <a:lnR w="12700" cap="flat" cmpd="sng" algn="ctr">
+                      <a:solidFill>
+                        <a:schemeClr val="tx1"/>
+                      </a:solidFill>
+                      <a:prstDash val="solid"/>
+                      <a:round/>
+                      <a:headEnd type="none" w="med" len="med"/>
+                      <a:tailEnd type="none" w="med" len="med"/>
+                    </a:lnR>
+                    <a:lnT w="12700" cap="flat" cmpd="sng" algn="ctr">
+                      <a:solidFill>
+                        <a:schemeClr val="tx1"/>
+                      </a:solidFill>
+                      <a:prstDash val="solid"/>
+                      <a:round/>
+                      <a:headEnd type="none" w="med" len="med"/>
+                      <a:tailEnd type="none" w="med" len="med"/>
+                    </a:lnT>
+                    <a:lnB w="12700" cap="flat" cmpd="sng" algn="ctr">
+                      <a:solidFill>
+                        <a:schemeClr val="tx1"/>
+                      </a:solidFill>
+                      <a:prstDash val="solid"/>
+                      <a:round/>
+                      <a:headEnd type="none" w="med" len="med"/>
+                      <a:tailEnd type="none" w="med" len="med"/>
+                    </a:lnB>
+                    <a:lnTlToBr w="12700" cmpd="sng">
+                      <a:noFill/>
+                      <a:prstDash val="solid"/>
+                    </a:lnTlToBr>
+                    <a:lnBlToTr w="12700" cmpd="sng">
+                      <a:noFill/>
+                      <a:prstDash val="solid"/>
+                    </a:lnBlToTr>
+                    <a:solidFill>
+                      <a:schemeClr val="bg1"/>
+                    </a:solidFill>
+                  </a:tcPr>
+                </a:tc>
+              </a:tr>
+            </a:tbl>
+          </a:graphicData>
+        </a:graphic>
+      </p:graphicFrame>
+      <p:sp>
+        <p:nvSpPr>
+          <p:cNvPr id="14" name="Rectangle 13"/>
+          <p:cNvSpPr/>
+          <p:nvPr/>
+        </p:nvSpPr>
+        <p:spPr>
+          <a:xfrm>
+            <a:off x="1785542" y="20280690"/>
+            <a:ext cx="10032105" cy="369332"/>
+          </a:xfrm>
+          <a:prstGeom prst="rect">
+            <a:avLst/>
+          </a:prstGeom>
+        </p:spPr>
+        <p:txBody>
+          <a:bodyPr wrap="none">
+            <a:spAutoFit/>
+          </a:bodyPr>
+          <a:lstStyle/>
+          <a:p>
+            <a:r>
+              <a:rPr lang="fr-FR" i="1" dirty="0" smtClean="0"/>
+              <a:t>Table 1. </a:t>
+            </a:r>
+            <a:r>
+              <a:rPr lang="fr-FR" i="1" dirty="0" err="1" smtClean="0"/>
+              <a:t>Comparison</a:t>
+            </a:r>
+            <a:r>
+              <a:rPr lang="fr-FR" i="1" dirty="0" smtClean="0"/>
+              <a:t> </a:t>
+            </a:r>
+            <a:r>
+              <a:rPr lang="fr-FR" i="1" dirty="0" err="1" smtClean="0"/>
+              <a:t>between</a:t>
+            </a:r>
+            <a:r>
+              <a:rPr lang="fr-FR" i="1" dirty="0" smtClean="0"/>
+              <a:t> </a:t>
+            </a:r>
+            <a:r>
+              <a:rPr lang="fr-FR" i="1" dirty="0" err="1" smtClean="0"/>
+              <a:t>our</a:t>
+            </a:r>
+            <a:r>
+              <a:rPr lang="fr-FR" i="1" dirty="0" smtClean="0"/>
+              <a:t> </a:t>
+            </a:r>
+            <a:r>
+              <a:rPr lang="fr-FR" i="1" dirty="0" err="1" smtClean="0"/>
+              <a:t>results</a:t>
+            </a:r>
+            <a:r>
+              <a:rPr lang="fr-FR" i="1" dirty="0" smtClean="0"/>
+              <a:t> and the </a:t>
+            </a:r>
+            <a:r>
+              <a:rPr lang="fr-FR" i="1" dirty="0" err="1" smtClean="0"/>
+              <a:t>result</a:t>
+            </a:r>
+            <a:r>
+              <a:rPr lang="fr-FR" i="1" dirty="0" smtClean="0"/>
+              <a:t> </a:t>
+            </a:r>
+            <a:r>
+              <a:rPr lang="fr-FR" i="1" dirty="0" err="1" smtClean="0"/>
+              <a:t>from</a:t>
+            </a:r>
+            <a:r>
+              <a:rPr lang="fr-FR" i="1" dirty="0" smtClean="0"/>
+              <a:t> the Master </a:t>
+            </a:r>
+            <a:r>
+              <a:rPr lang="fr-FR" i="1" dirty="0" err="1" smtClean="0"/>
+              <a:t>Thesis</a:t>
+            </a:r>
+            <a:r>
+              <a:rPr lang="fr-FR" i="1" dirty="0" smtClean="0"/>
+              <a:t> </a:t>
+            </a:r>
+            <a:r>
+              <a:rPr lang="fr-FR" i="1" dirty="0" err="1" smtClean="0"/>
+              <a:t>authored</a:t>
+            </a:r>
+            <a:r>
+              <a:rPr lang="fr-FR" i="1" dirty="0" smtClean="0"/>
+              <a:t> by Ida </a:t>
+            </a:r>
+            <a:r>
+              <a:rPr lang="fr-FR" i="1" dirty="0" err="1" smtClean="0"/>
+              <a:t>Meitil</a:t>
+            </a:r>
+            <a:r>
+              <a:rPr lang="fr-FR" i="1" dirty="0" smtClean="0"/>
+              <a:t> [2].</a:t>
             </a:r>
             <a:endParaRPr lang="fr-FR" i="1" dirty="0"/>
           </a:p>
@@ -6870,6 +8646,21 @@
 </file>
 
 <file path=customXml/item1.xml><?xml version="1.0" encoding="utf-8"?>
+<?mso-contentType ?>
+<FormTemplates xmlns="http://schemas.microsoft.com/sharepoint/v3/contenttype/forms">
+  <Display>DocumentLibraryForm</Display>
+  <Edit>DocumentLibraryForm</Edit>
+  <New>DocumentLibraryForm</New>
+</FormTemplates>
+</file>
+
+<file path=customXml/item2.xml><?xml version="1.0" encoding="utf-8"?>
+<p:properties xmlns:p="http://schemas.microsoft.com/office/2006/metadata/properties" xmlns:xsi="http://www.w3.org/2001/XMLSchema-instance" xmlns:pc="http://schemas.microsoft.com/office/infopath/2007/PartnerControls">
+  <documentManagement/>
+</p:properties>
+</file>
+
+<file path=customXml/item3.xml><?xml version="1.0" encoding="utf-8"?>
 <ct:contentTypeSchema xmlns:ct="http://schemas.microsoft.com/office/2006/metadata/contentType" xmlns:ma="http://schemas.microsoft.com/office/2006/metadata/properties/metaAttributes" ct:_="" ma:_="" ma:contentTypeName="Dokument" ma:contentTypeID="0x0101005E463CDCE29E264BAAEC2B3AEC8F5142" ma:contentTypeVersion="2" ma:contentTypeDescription="Opret et nyt dokument." ma:contentTypeScope="" ma:versionID="40f9935ff4a16e0d5b8e000d0b147fdc">
   <xsd:schema xmlns:xsd="http://www.w3.org/2001/XMLSchema" xmlns:xs="http://www.w3.org/2001/XMLSchema" xmlns:p="http://schemas.microsoft.com/office/2006/metadata/properties" xmlns:ns2="74242bd1-cb82-4e60-a08e-4217a7fb8d1d" targetNamespace="http://schemas.microsoft.com/office/2006/metadata/properties" ma:root="true" ma:fieldsID="4c2aca2db47d5d21ece1ec953cba830c" ns2:_="">
     <xsd:import namespace="74242bd1-cb82-4e60-a08e-4217a7fb8d1d"/>
@@ -7001,22 +8792,24 @@
 </ct:contentTypeSchema>
 </file>
 
-<file path=customXml/item2.xml><?xml version="1.0" encoding="utf-8"?>
-<p:properties xmlns:p="http://schemas.microsoft.com/office/2006/metadata/properties" xmlns:xsi="http://www.w3.org/2001/XMLSchema-instance" xmlns:pc="http://schemas.microsoft.com/office/infopath/2007/PartnerControls">
-  <documentManagement/>
-</p:properties>
+<file path=customXml/itemProps1.xml><?xml version="1.0" encoding="utf-8"?>
+<ds:datastoreItem xmlns:ds="http://schemas.openxmlformats.org/officeDocument/2006/customXml" ds:itemID="{405562AF-484A-42F9-A02C-A3F5AD59D6C1}">
+  <ds:schemaRefs>
+    <ds:schemaRef ds:uri="http://schemas.microsoft.com/sharepoint/v3/contenttype/forms"/>
+  </ds:schemaRefs>
+</ds:datastoreItem>
 </file>
 
-<file path=customXml/item3.xml><?xml version="1.0" encoding="utf-8"?>
-<?mso-contentType ?>
-<FormTemplates xmlns="http://schemas.microsoft.com/sharepoint/v3/contenttype/forms">
-  <Display>DocumentLibraryForm</Display>
-  <Edit>DocumentLibraryForm</Edit>
-  <New>DocumentLibraryForm</New>
-</FormTemplates>
+<file path=customXml/itemProps2.xml><?xml version="1.0" encoding="utf-8"?>
+<ds:datastoreItem xmlns:ds="http://schemas.openxmlformats.org/officeDocument/2006/customXml" ds:itemID="{CB370A3C-731B-4F4D-ABD0-42474AC25910}">
+  <ds:schemaRefs>
+    <ds:schemaRef ds:uri="http://schemas.microsoft.com/office/2006/metadata/properties"/>
+    <ds:schemaRef ds:uri="http://schemas.microsoft.com/office/infopath/2007/PartnerControls"/>
+  </ds:schemaRefs>
+</ds:datastoreItem>
 </file>
 
-<file path=customXml/itemProps1.xml><?xml version="1.0" encoding="utf-8"?>
+<file path=customXml/itemProps3.xml><?xml version="1.0" encoding="utf-8"?>
 <ds:datastoreItem xmlns:ds="http://schemas.openxmlformats.org/officeDocument/2006/customXml" ds:itemID="{A265213D-E9A2-401B-A85F-226A40D5C1B2}">
   <ds:schemaRefs>
     <ds:schemaRef ds:uri="http://schemas.microsoft.com/office/2006/metadata/contentType"/>
@@ -7032,21 +8825,4 @@
     <ds:schemaRef ds:uri="http://schemas.microsoft.com/internal/obd"/>
   </ds:schemaRefs>
 </ds:datastoreItem>
-</file>
-
-<file path=customXml/itemProps2.xml><?xml version="1.0" encoding="utf-8"?>
-<ds:datastoreItem xmlns:ds="http://schemas.openxmlformats.org/officeDocument/2006/customXml" ds:itemID="{CB370A3C-731B-4F4D-ABD0-42474AC25910}">
-  <ds:schemaRefs>
-    <ds:schemaRef ds:uri="http://schemas.microsoft.com/office/2006/metadata/properties"/>
-    <ds:schemaRef ds:uri="http://schemas.microsoft.com/office/infopath/2007/PartnerControls"/>
-  </ds:schemaRefs>
-</ds:datastoreItem>
-</file>
-
-<file path=customXml/itemProps3.xml><?xml version="1.0" encoding="utf-8"?>
-<ds:datastoreItem xmlns:ds="http://schemas.openxmlformats.org/officeDocument/2006/customXml" ds:itemID="{405562AF-484A-42F9-A02C-A3F5AD59D6C1}">
-  <ds:schemaRefs>
-    <ds:schemaRef ds:uri="http://schemas.microsoft.com/sharepoint/v3/contenttype/forms"/>
-  </ds:schemaRefs>
-</ds:datastoreItem>
 </file>
</xml_diff>

<commit_message>
completed methods and started discussion
</commit_message>
<xml_diff>
--- a/presentation/presentation.pptx
+++ b/presentation/presentation.pptx
@@ -349,7 +349,7 @@
           <a:p>
             <a:fld id="{C6F05EAB-B404-4249-9B6E-2AB49D341D90}" type="datetimeFigureOut">
               <a:rPr lang="aa-ET" smtClean="0"/>
-              <a:t>11/30/2021</a:t>
+              <a:t>01/12/2021</a:t>
             </a:fld>
             <a:endParaRPr lang="aa-ET"/>
           </a:p>
@@ -508,7 +508,7 @@
           <a:p>
             <a:fld id="{CC384317-2FF9-C745-838D-094DFBA5C4CC}" type="slidenum">
               <a:rPr lang="aa-ET" smtClean="0"/>
-              <a:t>‹#›</a:t>
+              <a:t>‹N°›</a:t>
             </a:fld>
             <a:endParaRPr lang="aa-ET"/>
           </a:p>
@@ -818,7 +818,7 @@
           <a:p>
             <a:fld id="{C1520061-EEF2-4648-A61C-FD1D344FB2F0}" type="datetimeFigureOut">
               <a:rPr lang="aa-ET" smtClean="0"/>
-              <a:t>11/30/2021</a:t>
+              <a:t>01/12/2021</a:t>
             </a:fld>
             <a:endParaRPr lang="aa-ET"/>
           </a:p>
@@ -860,7 +860,7 @@
           <a:p>
             <a:fld id="{FDB24838-7C19-CC4E-B2E6-66E840BA735D}" type="slidenum">
               <a:rPr lang="aa-ET" smtClean="0"/>
-              <a:t>‹#›</a:t>
+              <a:t>‹N°›</a:t>
             </a:fld>
             <a:endParaRPr lang="aa-ET"/>
           </a:p>
@@ -988,7 +988,7 @@
           <a:p>
             <a:fld id="{C1520061-EEF2-4648-A61C-FD1D344FB2F0}" type="datetimeFigureOut">
               <a:rPr lang="aa-ET" smtClean="0"/>
-              <a:t>11/30/2021</a:t>
+              <a:t>01/12/2021</a:t>
             </a:fld>
             <a:endParaRPr lang="aa-ET"/>
           </a:p>
@@ -1030,7 +1030,7 @@
           <a:p>
             <a:fld id="{FDB24838-7C19-CC4E-B2E6-66E840BA735D}" type="slidenum">
               <a:rPr lang="aa-ET" smtClean="0"/>
-              <a:t>‹#›</a:t>
+              <a:t>‹N°›</a:t>
             </a:fld>
             <a:endParaRPr lang="aa-ET"/>
           </a:p>
@@ -1168,7 +1168,7 @@
           <a:p>
             <a:fld id="{C1520061-EEF2-4648-A61C-FD1D344FB2F0}" type="datetimeFigureOut">
               <a:rPr lang="aa-ET" smtClean="0"/>
-              <a:t>11/30/2021</a:t>
+              <a:t>01/12/2021</a:t>
             </a:fld>
             <a:endParaRPr lang="aa-ET"/>
           </a:p>
@@ -1210,7 +1210,7 @@
           <a:p>
             <a:fld id="{FDB24838-7C19-CC4E-B2E6-66E840BA735D}" type="slidenum">
               <a:rPr lang="aa-ET" smtClean="0"/>
-              <a:t>‹#›</a:t>
+              <a:t>‹N°›</a:t>
             </a:fld>
             <a:endParaRPr lang="aa-ET"/>
           </a:p>
@@ -1338,7 +1338,7 @@
           <a:p>
             <a:fld id="{C1520061-EEF2-4648-A61C-FD1D344FB2F0}" type="datetimeFigureOut">
               <a:rPr lang="aa-ET" smtClean="0"/>
-              <a:t>11/30/2021</a:t>
+              <a:t>01/12/2021</a:t>
             </a:fld>
             <a:endParaRPr lang="aa-ET"/>
           </a:p>
@@ -1380,7 +1380,7 @@
           <a:p>
             <a:fld id="{FDB24838-7C19-CC4E-B2E6-66E840BA735D}" type="slidenum">
               <a:rPr lang="aa-ET" smtClean="0"/>
-              <a:t>‹#›</a:t>
+              <a:t>‹N°›</a:t>
             </a:fld>
             <a:endParaRPr lang="aa-ET"/>
           </a:p>
@@ -1582,7 +1582,7 @@
           <a:p>
             <a:fld id="{C1520061-EEF2-4648-A61C-FD1D344FB2F0}" type="datetimeFigureOut">
               <a:rPr lang="aa-ET" smtClean="0"/>
-              <a:t>11/30/2021</a:t>
+              <a:t>01/12/2021</a:t>
             </a:fld>
             <a:endParaRPr lang="aa-ET"/>
           </a:p>
@@ -1624,7 +1624,7 @@
           <a:p>
             <a:fld id="{FDB24838-7C19-CC4E-B2E6-66E840BA735D}" type="slidenum">
               <a:rPr lang="aa-ET" smtClean="0"/>
-              <a:t>‹#›</a:t>
+              <a:t>‹N°›</a:t>
             </a:fld>
             <a:endParaRPr lang="aa-ET"/>
           </a:p>
@@ -1814,7 +1814,7 @@
           <a:p>
             <a:fld id="{C1520061-EEF2-4648-A61C-FD1D344FB2F0}" type="datetimeFigureOut">
               <a:rPr lang="aa-ET" smtClean="0"/>
-              <a:t>11/30/2021</a:t>
+              <a:t>01/12/2021</a:t>
             </a:fld>
             <a:endParaRPr lang="aa-ET"/>
           </a:p>
@@ -1856,7 +1856,7 @@
           <a:p>
             <a:fld id="{FDB24838-7C19-CC4E-B2E6-66E840BA735D}" type="slidenum">
               <a:rPr lang="aa-ET" smtClean="0"/>
-              <a:t>‹#›</a:t>
+              <a:t>‹N°›</a:t>
             </a:fld>
             <a:endParaRPr lang="aa-ET"/>
           </a:p>
@@ -2181,7 +2181,7 @@
           <a:p>
             <a:fld id="{C1520061-EEF2-4648-A61C-FD1D344FB2F0}" type="datetimeFigureOut">
               <a:rPr lang="aa-ET" smtClean="0"/>
-              <a:t>11/30/2021</a:t>
+              <a:t>01/12/2021</a:t>
             </a:fld>
             <a:endParaRPr lang="aa-ET"/>
           </a:p>
@@ -2223,7 +2223,7 @@
           <a:p>
             <a:fld id="{FDB24838-7C19-CC4E-B2E6-66E840BA735D}" type="slidenum">
               <a:rPr lang="aa-ET" smtClean="0"/>
-              <a:t>‹#›</a:t>
+              <a:t>‹N°›</a:t>
             </a:fld>
             <a:endParaRPr lang="aa-ET"/>
           </a:p>
@@ -2299,7 +2299,7 @@
           <a:p>
             <a:fld id="{C1520061-EEF2-4648-A61C-FD1D344FB2F0}" type="datetimeFigureOut">
               <a:rPr lang="aa-ET" smtClean="0"/>
-              <a:t>11/30/2021</a:t>
+              <a:t>01/12/2021</a:t>
             </a:fld>
             <a:endParaRPr lang="aa-ET"/>
           </a:p>
@@ -2341,7 +2341,7 @@
           <a:p>
             <a:fld id="{FDB24838-7C19-CC4E-B2E6-66E840BA735D}" type="slidenum">
               <a:rPr lang="aa-ET" smtClean="0"/>
-              <a:t>‹#›</a:t>
+              <a:t>‹N°›</a:t>
             </a:fld>
             <a:endParaRPr lang="aa-ET"/>
           </a:p>
@@ -2394,7 +2394,7 @@
           <a:p>
             <a:fld id="{C1520061-EEF2-4648-A61C-FD1D344FB2F0}" type="datetimeFigureOut">
               <a:rPr lang="aa-ET" smtClean="0"/>
-              <a:t>11/30/2021</a:t>
+              <a:t>01/12/2021</a:t>
             </a:fld>
             <a:endParaRPr lang="aa-ET"/>
           </a:p>
@@ -2436,7 +2436,7 @@
           <a:p>
             <a:fld id="{FDB24838-7C19-CC4E-B2E6-66E840BA735D}" type="slidenum">
               <a:rPr lang="aa-ET" smtClean="0"/>
-              <a:t>‹#›</a:t>
+              <a:t>‹N°›</a:t>
             </a:fld>
             <a:endParaRPr lang="aa-ET"/>
           </a:p>
@@ -2671,7 +2671,7 @@
           <a:p>
             <a:fld id="{C1520061-EEF2-4648-A61C-FD1D344FB2F0}" type="datetimeFigureOut">
               <a:rPr lang="aa-ET" smtClean="0"/>
-              <a:t>11/30/2021</a:t>
+              <a:t>01/12/2021</a:t>
             </a:fld>
             <a:endParaRPr lang="aa-ET"/>
           </a:p>
@@ -2713,7 +2713,7 @@
           <a:p>
             <a:fld id="{FDB24838-7C19-CC4E-B2E6-66E840BA735D}" type="slidenum">
               <a:rPr lang="aa-ET" smtClean="0"/>
-              <a:t>‹#›</a:t>
+              <a:t>‹N°›</a:t>
             </a:fld>
             <a:endParaRPr lang="aa-ET"/>
           </a:p>
@@ -2928,7 +2928,7 @@
           <a:p>
             <a:fld id="{C1520061-EEF2-4648-A61C-FD1D344FB2F0}" type="datetimeFigureOut">
               <a:rPr lang="aa-ET" smtClean="0"/>
-              <a:t>11/30/2021</a:t>
+              <a:t>01/12/2021</a:t>
             </a:fld>
             <a:endParaRPr lang="aa-ET"/>
           </a:p>
@@ -2970,7 +2970,7 @@
           <a:p>
             <a:fld id="{FDB24838-7C19-CC4E-B2E6-66E840BA735D}" type="slidenum">
               <a:rPr lang="aa-ET" smtClean="0"/>
-              <a:t>‹#›</a:t>
+              <a:t>‹N°›</a:t>
             </a:fld>
             <a:endParaRPr lang="aa-ET"/>
           </a:p>
@@ -3141,7 +3141,7 @@
           <a:p>
             <a:fld id="{C1520061-EEF2-4648-A61C-FD1D344FB2F0}" type="datetimeFigureOut">
               <a:rPr lang="aa-ET" smtClean="0"/>
-              <a:t>11/30/2021</a:t>
+              <a:t>01/12/2021</a:t>
             </a:fld>
             <a:endParaRPr lang="aa-ET"/>
           </a:p>
@@ -3219,7 +3219,7 @@
           <a:p>
             <a:fld id="{FDB24838-7C19-CC4E-B2E6-66E840BA735D}" type="slidenum">
               <a:rPr lang="aa-ET" smtClean="0"/>
-              <a:t>‹#›</a:t>
+              <a:t>‹N°›</a:t>
             </a:fld>
             <a:endParaRPr lang="aa-ET"/>
           </a:p>
@@ -3556,7 +3556,7 @@
         </p:nvSpPr>
         <p:spPr bwMode="auto">
           <a:xfrm>
-            <a:off x="3195226" y="234140"/>
+            <a:off x="2876866" y="80951"/>
             <a:ext cx="17938744" cy="2098083"/>
           </a:xfrm>
           <a:prstGeom prst="rect">
@@ -3658,7 +3658,7 @@
         </p:nvSpPr>
         <p:spPr bwMode="auto">
           <a:xfrm>
-            <a:off x="4525682" y="2839332"/>
+            <a:off x="4207322" y="2686143"/>
             <a:ext cx="15277831" cy="1146367"/>
           </a:xfrm>
           <a:prstGeom prst="rect">
@@ -3816,7 +3816,7 @@
           <p:cNvPr id="24" name="Straight Connector 23">
             <a:extLst>
               <a:ext uri="{FF2B5EF4-FFF2-40B4-BE49-F238E27FC236}">
-                <a16:creationId xmlns:a16="http://schemas.microsoft.com/office/drawing/2014/main" id="{3CD061AB-8876-704F-BE6A-E397F33852E1}"/>
+                <a16:creationId xmlns:a16="http://schemas.microsoft.com/office/drawing/2014/main" xmlns="" id="{3CD061AB-8876-704F-BE6A-E397F33852E1}"/>
               </a:ext>
             </a:extLst>
           </p:cNvPr>
@@ -3827,7 +3827,7 @@
         </p:nvCxnSpPr>
         <p:spPr>
           <a:xfrm>
-            <a:off x="-10390" y="4273147"/>
+            <a:off x="-10390" y="3928821"/>
             <a:ext cx="21408967" cy="0"/>
           </a:xfrm>
           <a:prstGeom prst="line">
@@ -3859,7 +3859,7 @@
           <p:cNvPr id="128" name="Round Same Side Corner Rectangle 137">
             <a:extLst>
               <a:ext uri="{FF2B5EF4-FFF2-40B4-BE49-F238E27FC236}">
-                <a16:creationId xmlns:a16="http://schemas.microsoft.com/office/drawing/2014/main" id="{85003210-220B-9A49-8091-B1A85DD76CE8}"/>
+                <a16:creationId xmlns:a16="http://schemas.microsoft.com/office/drawing/2014/main" xmlns="" id="{85003210-220B-9A49-8091-B1A85DD76CE8}"/>
               </a:ext>
             </a:extLst>
           </p:cNvPr>
@@ -3868,7 +3868,7 @@
         </p:nvSpPr>
         <p:spPr>
           <a:xfrm>
-            <a:off x="252605" y="4449749"/>
+            <a:off x="252605" y="4105423"/>
             <a:ext cx="20878415" cy="540000"/>
           </a:xfrm>
           <a:prstGeom prst="round2SameRect">
@@ -3923,7 +3923,7 @@
           <p:cNvPr id="129" name="Round Same Side Corner Rectangle 137">
             <a:extLst>
               <a:ext uri="{FF2B5EF4-FFF2-40B4-BE49-F238E27FC236}">
-                <a16:creationId xmlns:a16="http://schemas.microsoft.com/office/drawing/2014/main" id="{7226A277-A8A7-9549-8FCF-1175CB0CE7B6}"/>
+                <a16:creationId xmlns:a16="http://schemas.microsoft.com/office/drawing/2014/main" xmlns="" id="{7226A277-A8A7-9549-8FCF-1175CB0CE7B6}"/>
               </a:ext>
             </a:extLst>
           </p:cNvPr>
@@ -3932,7 +3932,7 @@
         </p:nvSpPr>
         <p:spPr>
           <a:xfrm>
-            <a:off x="309341" y="11619344"/>
+            <a:off x="309341" y="11205292"/>
             <a:ext cx="20880000" cy="540000"/>
           </a:xfrm>
           <a:prstGeom prst="round2SameRect">
@@ -3987,7 +3987,7 @@
           <p:cNvPr id="130" name="Round Same Side Corner Rectangle 137">
             <a:extLst>
               <a:ext uri="{FF2B5EF4-FFF2-40B4-BE49-F238E27FC236}">
-                <a16:creationId xmlns:a16="http://schemas.microsoft.com/office/drawing/2014/main" id="{0D73ACE7-C686-234D-9978-B3229B92843A}"/>
+                <a16:creationId xmlns:a16="http://schemas.microsoft.com/office/drawing/2014/main" xmlns="" id="{0D73ACE7-C686-234D-9978-B3229B92843A}"/>
               </a:ext>
             </a:extLst>
           </p:cNvPr>
@@ -3996,7 +3996,7 @@
         </p:nvSpPr>
         <p:spPr>
           <a:xfrm>
-            <a:off x="309341" y="19388344"/>
+            <a:off x="309341" y="19044018"/>
             <a:ext cx="20880000" cy="540000"/>
           </a:xfrm>
           <a:prstGeom prst="round2SameRect">
@@ -4051,7 +4051,7 @@
           <p:cNvPr id="91" name="TextBox 90">
             <a:extLst>
               <a:ext uri="{FF2B5EF4-FFF2-40B4-BE49-F238E27FC236}">
-                <a16:creationId xmlns:a16="http://schemas.microsoft.com/office/drawing/2014/main" id="{CE8C58B8-C0BC-CE41-9C20-5C588C41F47C}"/>
+                <a16:creationId xmlns:a16="http://schemas.microsoft.com/office/drawing/2014/main" xmlns="" id="{CE8C58B8-C0BC-CE41-9C20-5C588C41F47C}"/>
               </a:ext>
             </a:extLst>
           </p:cNvPr>
@@ -4060,7 +4060,7 @@
         </p:nvSpPr>
         <p:spPr>
           <a:xfrm>
-            <a:off x="20165285" y="2953656"/>
+            <a:off x="19846925" y="2448363"/>
             <a:ext cx="1536700" cy="1200329"/>
           </a:xfrm>
           <a:prstGeom prst="rect">
@@ -4120,7 +4120,7 @@
           <p:cNvPr id="3" name="Billede 6">
             <a:extLst>
               <a:ext uri="{FF2B5EF4-FFF2-40B4-BE49-F238E27FC236}">
-                <a16:creationId xmlns:a16="http://schemas.microsoft.com/office/drawing/2014/main" id="{79D342DF-0A65-4821-8F47-A3CE1793E1E6}"/>
+                <a16:creationId xmlns:a16="http://schemas.microsoft.com/office/drawing/2014/main" xmlns="" id="{79D342DF-0A65-4821-8F47-A3CE1793E1E6}"/>
               </a:ext>
             </a:extLst>
           </p:cNvPr>
@@ -4137,7 +4137,7 @@
         </p:blipFill>
         <p:spPr>
           <a:xfrm>
-            <a:off x="309341" y="354355"/>
+            <a:off x="172349" y="240008"/>
             <a:ext cx="2361742" cy="3446251"/>
           </a:xfrm>
           <a:prstGeom prst="rect">
@@ -4150,7 +4150,7 @@
           <p:cNvPr id="5" name="TextBox 4">
             <a:extLst>
               <a:ext uri="{FF2B5EF4-FFF2-40B4-BE49-F238E27FC236}">
-                <a16:creationId xmlns:a16="http://schemas.microsoft.com/office/drawing/2014/main" id="{555DBE74-403C-4246-B0C1-4F2AAF162AFF}"/>
+                <a16:creationId xmlns:a16="http://schemas.microsoft.com/office/drawing/2014/main" xmlns="" id="{555DBE74-403C-4246-B0C1-4F2AAF162AFF}"/>
               </a:ext>
             </a:extLst>
           </p:cNvPr>
@@ -4159,7 +4159,7 @@
         </p:nvSpPr>
         <p:spPr>
           <a:xfrm>
-            <a:off x="229641" y="5032193"/>
+            <a:off x="229641" y="4687867"/>
             <a:ext cx="12466451" cy="4231928"/>
           </a:xfrm>
           <a:prstGeom prst="rect">
@@ -4190,6 +4190,7 @@
                 </a:solidFill>
                 <a:effectLst/>
                 <a:latin typeface="Arial" panose="020B0604020202020204" pitchFamily="34" charset="0"/>
+                <a:cs typeface="Arial" panose="020B0604020202020204" pitchFamily="34" charset="0"/>
               </a:rPr>
               <a:t>Recent advances within biological sequencing and deep learning methods have made it possible to investigate key interactions of the immune system computationally.</a:t>
             </a:r>
@@ -4206,6 +4207,7 @@
               </a:solidFill>
               <a:effectLst/>
               <a:latin typeface="Arial" panose="020B0604020202020204" pitchFamily="34" charset="0"/>
+              <a:cs typeface="Arial" panose="020B0604020202020204" pitchFamily="34" charset="0"/>
             </a:endParaRPr>
           </a:p>
           <a:p>
@@ -4223,6 +4225,7 @@
                 </a:solidFill>
                 <a:effectLst/>
                 <a:latin typeface="Arial" panose="020B0604020202020204" pitchFamily="34" charset="0"/>
+                <a:cs typeface="Arial" panose="020B0604020202020204" pitchFamily="34" charset="0"/>
               </a:rPr>
               <a:t>The adaptive immune system is a key element for fighting diseases and the T-cells are responsible for cell-mediated immune response via their surface T-cell receptors  (TCR).</a:t>
             </a:r>
@@ -4239,6 +4242,7 @@
               </a:solidFill>
               <a:effectLst/>
               <a:latin typeface="Arial" panose="020B0604020202020204" pitchFamily="34" charset="0"/>
+              <a:cs typeface="Arial" panose="020B0604020202020204" pitchFamily="34" charset="0"/>
             </a:endParaRPr>
           </a:p>
           <a:p>
@@ -4256,6 +4260,7 @@
                 </a:solidFill>
                 <a:effectLst/>
                 <a:latin typeface="Arial" panose="020B0604020202020204" pitchFamily="34" charset="0"/>
+                <a:cs typeface="Arial" panose="020B0604020202020204" pitchFamily="34" charset="0"/>
               </a:rPr>
               <a:t>TCRs bind to peptide-Major Histocompatibility Complexes (</a:t>
             </a:r>
@@ -4266,6 +4271,7 @@
                 </a:solidFill>
                 <a:effectLst/>
                 <a:latin typeface="Arial" panose="020B0604020202020204" pitchFamily="34" charset="0"/>
+                <a:cs typeface="Arial" panose="020B0604020202020204" pitchFamily="34" charset="0"/>
               </a:rPr>
               <a:t>pMHC</a:t>
             </a:r>
@@ -4276,6 +4282,7 @@
                 </a:solidFill>
                 <a:effectLst/>
                 <a:latin typeface="Arial" panose="020B0604020202020204" pitchFamily="34" charset="0"/>
+                <a:cs typeface="Arial" panose="020B0604020202020204" pitchFamily="34" charset="0"/>
               </a:rPr>
               <a:t>) to form a complex that triggers an immune response.</a:t>
             </a:r>
@@ -4311,6 +4318,7 @@
                 </a:solidFill>
                 <a:effectLst/>
                 <a:latin typeface="Arial" panose="020B0604020202020204" pitchFamily="34" charset="0"/>
+                <a:cs typeface="Arial" panose="020B0604020202020204" pitchFamily="34" charset="0"/>
               </a:rPr>
               <a:t>Predict TCR-</a:t>
             </a:r>
@@ -4321,6 +4329,7 @@
                 </a:solidFill>
                 <a:effectLst/>
                 <a:latin typeface="Arial" panose="020B0604020202020204" pitchFamily="34" charset="0"/>
+                <a:cs typeface="Arial" panose="020B0604020202020204" pitchFamily="34" charset="0"/>
               </a:rPr>
               <a:t>pMHC</a:t>
             </a:r>
@@ -4331,6 +4340,7 @@
                 </a:solidFill>
                 <a:effectLst/>
                 <a:latin typeface="Arial" panose="020B0604020202020204" pitchFamily="34" charset="0"/>
+                <a:cs typeface="Arial" panose="020B0604020202020204" pitchFamily="34" charset="0"/>
               </a:rPr>
               <a:t> binding using molecular modeling and recurrent neural networks (RNN).</a:t>
             </a:r>
@@ -4342,7 +4352,7 @@
           <p:cNvPr id="8" name="TextBox 7">
             <a:extLst>
               <a:ext uri="{FF2B5EF4-FFF2-40B4-BE49-F238E27FC236}">
-                <a16:creationId xmlns:a16="http://schemas.microsoft.com/office/drawing/2014/main" id="{BF27FA47-F412-41BA-9674-4AB98ABB11FF}"/>
+                <a16:creationId xmlns:a16="http://schemas.microsoft.com/office/drawing/2014/main" xmlns="" id="{BF27FA47-F412-41BA-9674-4AB98ABB11FF}"/>
               </a:ext>
             </a:extLst>
           </p:cNvPr>
@@ -4351,7 +4361,7 @@
         </p:nvSpPr>
         <p:spPr>
           <a:xfrm>
-            <a:off x="281270" y="29211249"/>
+            <a:off x="172349" y="29211249"/>
             <a:ext cx="20409853" cy="1200329"/>
           </a:xfrm>
           <a:prstGeom prst="rect">
@@ -4504,7 +4514,7 @@
           <p:cNvPr id="39" name="Round Same Side Corner Rectangle 137">
             <a:extLst>
               <a:ext uri="{FF2B5EF4-FFF2-40B4-BE49-F238E27FC236}">
-                <a16:creationId xmlns:a16="http://schemas.microsoft.com/office/drawing/2014/main" id="{E416DD2D-00A9-4581-8B16-BB3C03226A4A}"/>
+                <a16:creationId xmlns:a16="http://schemas.microsoft.com/office/drawing/2014/main" xmlns="" id="{E416DD2D-00A9-4581-8B16-BB3C03226A4A}"/>
               </a:ext>
             </a:extLst>
           </p:cNvPr>
@@ -4513,7 +4523,7 @@
         </p:nvSpPr>
         <p:spPr>
           <a:xfrm>
-            <a:off x="251020" y="28454316"/>
+            <a:off x="229640" y="28589431"/>
             <a:ext cx="20880000" cy="540000"/>
           </a:xfrm>
           <a:prstGeom prst="round2SameRect">
@@ -4568,7 +4578,7 @@
           <p:cNvPr id="61" name="TextBox 9">
             <a:extLst>
               <a:ext uri="{FF2B5EF4-FFF2-40B4-BE49-F238E27FC236}">
-                <a16:creationId xmlns:a16="http://schemas.microsoft.com/office/drawing/2014/main" id="{0F50DE13-E128-4F41-B202-B86A9CAA9FC5}"/>
+                <a16:creationId xmlns:a16="http://schemas.microsoft.com/office/drawing/2014/main" xmlns="" id="{0F50DE13-E128-4F41-B202-B86A9CAA9FC5}"/>
               </a:ext>
             </a:extLst>
           </p:cNvPr>
@@ -4577,8 +4587,8 @@
         </p:nvSpPr>
         <p:spPr>
           <a:xfrm>
-            <a:off x="15572764" y="22622274"/>
-            <a:ext cx="3591536" cy="1477328"/>
+            <a:off x="12609741" y="21445101"/>
+            <a:ext cx="4881846" cy="3323987"/>
           </a:xfrm>
           <a:prstGeom prst="rect">
             <a:avLst/>
@@ -4595,11 +4605,47 @@
           <a:lstStyle/>
           <a:p>
             <a:r>
+              <a:rPr lang="en-GB" sz="3000" dirty="0" smtClean="0">
+                <a:latin typeface="Arial" panose="020B0604020202020204" pitchFamily="34" charset="0"/>
+                <a:cs typeface="Arial" panose="020B0604020202020204" pitchFamily="34" charset="0"/>
+              </a:rPr>
+              <a:t>From 2</a:t>
+            </a:r>
+            <a:r>
+              <a:rPr lang="en-GB" sz="3000" baseline="30000" dirty="0" smtClean="0">
+                <a:latin typeface="Arial" panose="020B0604020202020204" pitchFamily="34" charset="0"/>
+                <a:cs typeface="Arial" panose="020B0604020202020204" pitchFamily="34" charset="0"/>
+              </a:rPr>
+              <a:t>nd</a:t>
+            </a:r>
+            <a:r>
+              <a:rPr lang="en-GB" sz="3000" dirty="0" smtClean="0">
+                <a:latin typeface="Arial" panose="020B0604020202020204" pitchFamily="34" charset="0"/>
+                <a:cs typeface="Arial" panose="020B0604020202020204" pitchFamily="34" charset="0"/>
+              </a:rPr>
+              <a:t> architecture, dropout is applied to avoid overfitting</a:t>
+            </a:r>
+          </a:p>
+          <a:p>
+            <a:endParaRPr lang="en-GB" sz="3000" dirty="0">
+              <a:latin typeface="Arial" panose="020B0604020202020204" pitchFamily="34" charset="0"/>
+              <a:cs typeface="Arial" panose="020B0604020202020204" pitchFamily="34" charset="0"/>
+            </a:endParaRPr>
+          </a:p>
+          <a:p>
+            <a:r>
+              <a:rPr lang="en-GB" sz="3000" dirty="0" smtClean="0">
+                <a:latin typeface="Arial" panose="020B0604020202020204" pitchFamily="34" charset="0"/>
+                <a:cs typeface="Arial" panose="020B0604020202020204" pitchFamily="34" charset="0"/>
+              </a:rPr>
+              <a:t>MCC </a:t>
+            </a:r>
+            <a:r>
               <a:rPr lang="en-GB" sz="3000" dirty="0">
                 <a:latin typeface="Arial" panose="020B0604020202020204" pitchFamily="34" charset="0"/>
                 <a:cs typeface="Arial" panose="020B0604020202020204" pitchFamily="34" charset="0"/>
               </a:rPr>
-              <a:t>MCC on test</a:t>
+              <a:t>on test</a:t>
             </a:r>
           </a:p>
           <a:p>
@@ -4618,37 +4664,6 @@
                 <a:cs typeface="Arial" panose="020B0604020202020204" pitchFamily="34" charset="0"/>
               </a:rPr>
               <a:t>AUC plot</a:t>
-            </a:r>
-          </a:p>
-        </p:txBody>
-      </p:sp>
-      <p:sp>
-        <p:nvSpPr>
-          <p:cNvPr id="53" name="Rectangle 52"/>
-          <p:cNvSpPr/>
-          <p:nvPr/>
-        </p:nvSpPr>
-        <p:spPr>
-          <a:xfrm>
-            <a:off x="15839674" y="20677013"/>
-            <a:ext cx="4221027" cy="553998"/>
-          </a:xfrm>
-          <a:prstGeom prst="rect">
-            <a:avLst/>
-          </a:prstGeom>
-        </p:spPr>
-        <p:txBody>
-          <a:bodyPr wrap="none">
-            <a:spAutoFit/>
-          </a:bodyPr>
-          <a:lstStyle/>
-          <a:p>
-            <a:r>
-              <a:rPr lang="en-GB" sz="3000" dirty="0">
-                <a:latin typeface="Arial" panose="020B0604020202020204" pitchFamily="34" charset="0"/>
-                <a:cs typeface="Arial" panose="020B0604020202020204" pitchFamily="34" charset="0"/>
-              </a:rPr>
-              <a:t>Comparison with Ida [2]</a:t>
             </a:r>
           </a:p>
         </p:txBody>
@@ -4658,7 +4673,7 @@
           <p:cNvPr id="68" name="Round Same Side Corner Rectangle 137">
             <a:extLst>
               <a:ext uri="{FF2B5EF4-FFF2-40B4-BE49-F238E27FC236}">
-                <a16:creationId xmlns:a16="http://schemas.microsoft.com/office/drawing/2014/main" id="{E416DD2D-00A9-4581-8B16-BB3C03226A4A}"/>
+                <a16:creationId xmlns:a16="http://schemas.microsoft.com/office/drawing/2014/main" xmlns="" id="{E416DD2D-00A9-4581-8B16-BB3C03226A4A}"/>
               </a:ext>
             </a:extLst>
           </p:cNvPr>
@@ -4667,7 +4682,7 @@
         </p:nvSpPr>
         <p:spPr>
           <a:xfrm>
-            <a:off x="251020" y="26605166"/>
+            <a:off x="252605" y="25991103"/>
             <a:ext cx="20880000" cy="540000"/>
           </a:xfrm>
           <a:prstGeom prst="round2SameRect">
@@ -4725,8 +4740,8 @@
         </p:nvSpPr>
         <p:spPr>
           <a:xfrm>
-            <a:off x="677812" y="27435881"/>
-            <a:ext cx="7990852" cy="923330"/>
+            <a:off x="229640" y="26631311"/>
+            <a:ext cx="20901379" cy="1938992"/>
           </a:xfrm>
           <a:prstGeom prst="rect">
             <a:avLst/>
@@ -4738,35 +4753,100 @@
           </a:bodyPr>
           <a:lstStyle/>
           <a:p>
-            <a:r>
-              <a:rPr lang="en-US" dirty="0">
+            <a:pPr marL="342900" indent="-342900" algn="just">
+              <a:buFont typeface="Arial" panose="020B0604020202020204" pitchFamily="34" charset="0"/>
+              <a:buChar char="•"/>
+            </a:pPr>
+            <a:r>
+              <a:rPr lang="en-US" sz="2400" dirty="0">
                 <a:latin typeface="Arial" panose="020B0604020202020204" pitchFamily="34" charset="0"/>
                 <a:ea typeface="+mn-lt"/>
                 <a:cs typeface="Arial" panose="020B0604020202020204" pitchFamily="34" charset="0"/>
               </a:rPr>
-              <a:t>High number of negative</a:t>
-            </a:r>
-          </a:p>
-          <a:p>
-            <a:r>
-              <a:rPr lang="en-US" dirty="0">
+              <a:t>The dataset is really skewed towards </a:t>
+            </a:r>
+            <a:r>
+              <a:rPr lang="en-US" sz="2400" dirty="0" smtClean="0">
                 <a:latin typeface="Arial" panose="020B0604020202020204" pitchFamily="34" charset="0"/>
                 <a:ea typeface="+mn-lt"/>
                 <a:cs typeface="Arial" panose="020B0604020202020204" pitchFamily="34" charset="0"/>
               </a:rPr>
-              <a:t>BERT</a:t>
-            </a:r>
-          </a:p>
-          <a:p>
-            <a:r>
-              <a:rPr lang="en-US" dirty="0">
+              <a:t>negative (75%) </a:t>
+            </a:r>
+            <a:r>
+              <a:rPr lang="en-US" sz="2400" dirty="0">
                 <a:latin typeface="Arial" panose="020B0604020202020204" pitchFamily="34" charset="0"/>
                 <a:ea typeface="+mn-lt"/>
                 <a:cs typeface="Arial" panose="020B0604020202020204" pitchFamily="34" charset="0"/>
               </a:rPr>
-              <a:t>Graph based approach</a:t>
-            </a:r>
-            <a:endParaRPr lang="fr-FR" dirty="0"/>
+              <a:t>which makes metrics like accuracy less reliable. Changing the threshold gives a better MCC because the model tends to predict more negatives. The best threshold is found to be </a:t>
+            </a:r>
+            <a:r>
+              <a:rPr lang="en-US" sz="2400" dirty="0" smtClean="0">
+                <a:latin typeface="Arial" panose="020B0604020202020204" pitchFamily="34" charset="0"/>
+                <a:ea typeface="+mn-lt"/>
+                <a:cs typeface="Arial" panose="020B0604020202020204" pitchFamily="34" charset="0"/>
+              </a:rPr>
+              <a:t>0.63 during validation and is applied for testing.</a:t>
+            </a:r>
+            <a:endParaRPr lang="en-US" sz="2400" dirty="0">
+              <a:latin typeface="Arial" panose="020B0604020202020204" pitchFamily="34" charset="0"/>
+              <a:ea typeface="+mn-lt"/>
+              <a:cs typeface="Arial" panose="020B0604020202020204" pitchFamily="34" charset="0"/>
+            </a:endParaRPr>
+          </a:p>
+          <a:p>
+            <a:pPr marL="342900" indent="-342900">
+              <a:buFont typeface="Arial" panose="020B0604020202020204" pitchFamily="34" charset="0"/>
+              <a:buChar char="•"/>
+            </a:pPr>
+            <a:r>
+              <a:rPr lang="en-US" sz="2400" dirty="0" smtClean="0">
+                <a:latin typeface="Arial" panose="020B0604020202020204" pitchFamily="34" charset="0"/>
+                <a:ea typeface="+mn-lt"/>
+                <a:cs typeface="Arial" panose="020B0604020202020204" pitchFamily="34" charset="0"/>
+              </a:rPr>
+              <a:t>The model </a:t>
+            </a:r>
+            <a:r>
+              <a:rPr lang="en-US" sz="2400" dirty="0" err="1" smtClean="0">
+                <a:latin typeface="Arial" panose="020B0604020202020204" pitchFamily="34" charset="0"/>
+                <a:ea typeface="+mn-lt"/>
+                <a:cs typeface="Arial" panose="020B0604020202020204" pitchFamily="34" charset="0"/>
+              </a:rPr>
+              <a:t>overfits</a:t>
+            </a:r>
+            <a:r>
+              <a:rPr lang="en-US" sz="2400" dirty="0" smtClean="0">
+                <a:latin typeface="Arial" panose="020B0604020202020204" pitchFamily="34" charset="0"/>
+                <a:ea typeface="+mn-lt"/>
+                <a:cs typeface="Arial" panose="020B0604020202020204" pitchFamily="34" charset="0"/>
+              </a:rPr>
+              <a:t> the dataset. If we were to predict binding for other peptides, the model would likely fail. This can be shown by leave-one-out cross-validation [2].</a:t>
+            </a:r>
+            <a:endParaRPr lang="en-US" sz="2400" dirty="0">
+              <a:latin typeface="Arial" panose="020B0604020202020204" pitchFamily="34" charset="0"/>
+              <a:ea typeface="+mn-lt"/>
+              <a:cs typeface="Arial" panose="020B0604020202020204" pitchFamily="34" charset="0"/>
+            </a:endParaRPr>
+          </a:p>
+          <a:p>
+            <a:pPr marL="342900" indent="-342900">
+              <a:buFont typeface="Arial" panose="020B0604020202020204" pitchFamily="34" charset="0"/>
+              <a:buChar char="•"/>
+            </a:pPr>
+            <a:r>
+              <a:rPr lang="en-US" sz="2400" dirty="0" smtClean="0">
+                <a:latin typeface="Arial" panose="020B0604020202020204" pitchFamily="34" charset="0"/>
+                <a:ea typeface="+mn-lt"/>
+                <a:cs typeface="Arial" panose="020B0604020202020204" pitchFamily="34" charset="0"/>
+              </a:rPr>
+              <a:t>TCR-BERT</a:t>
+            </a:r>
+            <a:endParaRPr lang="fr-FR" sz="2400" dirty="0">
+              <a:latin typeface="Arial" panose="020B0604020202020204" pitchFamily="34" charset="0"/>
+              <a:cs typeface="Arial" panose="020B0604020202020204" pitchFamily="34" charset="0"/>
+            </a:endParaRPr>
           </a:p>
         </p:txBody>
       </p:sp>
@@ -4778,8 +4858,8 @@
         </p:nvSpPr>
         <p:spPr>
           <a:xfrm>
-            <a:off x="677812" y="18851332"/>
-            <a:ext cx="3121817" cy="369332"/>
+            <a:off x="251020" y="18491999"/>
+            <a:ext cx="5506636" cy="369332"/>
           </a:xfrm>
           <a:prstGeom prst="rect">
             <a:avLst/>
@@ -4793,9 +4873,37 @@
           <a:lstStyle/>
           <a:p>
             <a:r>
-              <a:rPr lang="fr-FR" i="1" dirty="0"/>
-              <a:t>Figure 2. Pipeline for the data.</a:t>
-            </a:r>
+              <a:rPr lang="fr-FR" i="1" dirty="0">
+                <a:latin typeface="Arial" panose="020B0604020202020204" pitchFamily="34" charset="0"/>
+                <a:cs typeface="Arial" panose="020B0604020202020204" pitchFamily="34" charset="0"/>
+              </a:rPr>
+              <a:t>Figure 2. Pipeline for the </a:t>
+            </a:r>
+            <a:r>
+              <a:rPr lang="fr-FR" i="1" dirty="0" err="1" smtClean="0">
+                <a:latin typeface="Arial" panose="020B0604020202020204" pitchFamily="34" charset="0"/>
+                <a:cs typeface="Arial" panose="020B0604020202020204" pitchFamily="34" charset="0"/>
+              </a:rPr>
+              <a:t>pre-processing</a:t>
+            </a:r>
+            <a:r>
+              <a:rPr lang="fr-FR" i="1" dirty="0" smtClean="0">
+                <a:latin typeface="Arial" panose="020B0604020202020204" pitchFamily="34" charset="0"/>
+                <a:cs typeface="Arial" panose="020B0604020202020204" pitchFamily="34" charset="0"/>
+              </a:rPr>
+              <a:t> of the data</a:t>
+            </a:r>
+            <a:r>
+              <a:rPr lang="fr-FR" i="1" dirty="0" smtClean="0">
+                <a:latin typeface="Arial" panose="020B0604020202020204" pitchFamily="34" charset="0"/>
+                <a:cs typeface="Arial" panose="020B0604020202020204" pitchFamily="34" charset="0"/>
+              </a:rPr>
+              <a:t>.</a:t>
+            </a:r>
+            <a:endParaRPr lang="fr-FR" i="1" dirty="0">
+              <a:latin typeface="Arial" panose="020B0604020202020204" pitchFamily="34" charset="0"/>
+              <a:cs typeface="Arial" panose="020B0604020202020204" pitchFamily="34" charset="0"/>
+            </a:endParaRPr>
           </a:p>
         </p:txBody>
       </p:sp>
@@ -4807,7 +4915,7 @@
         </p:nvSpPr>
         <p:spPr>
           <a:xfrm>
-            <a:off x="13488278" y="8738754"/>
+            <a:off x="13488278" y="8394428"/>
             <a:ext cx="6677007" cy="646331"/>
           </a:xfrm>
           <a:prstGeom prst="rect">
@@ -4822,47 +4930,80 @@
           <a:lstStyle/>
           <a:p>
             <a:r>
-              <a:rPr lang="fr-FR" i="1" dirty="0"/>
+              <a:rPr lang="fr-FR" i="1" dirty="0">
+                <a:latin typeface="Arial" panose="020B0604020202020204" pitchFamily="34" charset="0"/>
+                <a:cs typeface="Arial" panose="020B0604020202020204" pitchFamily="34" charset="0"/>
+              </a:rPr>
               <a:t>Figure 1. 3D-visualization of the TCR-</a:t>
             </a:r>
             <a:r>
-              <a:rPr lang="fr-FR" i="1" dirty="0" err="1"/>
+              <a:rPr lang="fr-FR" i="1" dirty="0" err="1">
+                <a:latin typeface="Arial" panose="020B0604020202020204" pitchFamily="34" charset="0"/>
+                <a:cs typeface="Arial" panose="020B0604020202020204" pitchFamily="34" charset="0"/>
+              </a:rPr>
               <a:t>pMHC</a:t>
             </a:r>
             <a:r>
-              <a:rPr lang="fr-FR" i="1" dirty="0"/>
+              <a:rPr lang="fr-FR" i="1" dirty="0">
+                <a:latin typeface="Arial" panose="020B0604020202020204" pitchFamily="34" charset="0"/>
+                <a:cs typeface="Arial" panose="020B0604020202020204" pitchFamily="34" charset="0"/>
+              </a:rPr>
               <a:t> </a:t>
             </a:r>
             <a:r>
-              <a:rPr lang="fr-FR" i="1" dirty="0" err="1"/>
+              <a:rPr lang="fr-FR" i="1" dirty="0" err="1">
+                <a:latin typeface="Arial" panose="020B0604020202020204" pitchFamily="34" charset="0"/>
+                <a:cs typeface="Arial" panose="020B0604020202020204" pitchFamily="34" charset="0"/>
+              </a:rPr>
               <a:t>complex</a:t>
             </a:r>
             <a:r>
-              <a:rPr lang="fr-FR" i="1" dirty="0"/>
+              <a:rPr lang="fr-FR" i="1" dirty="0">
+                <a:latin typeface="Arial" panose="020B0604020202020204" pitchFamily="34" charset="0"/>
+                <a:cs typeface="Arial" panose="020B0604020202020204" pitchFamily="34" charset="0"/>
+              </a:rPr>
               <a:t>. Blue: TCR-</a:t>
             </a:r>
             <a:r>
-              <a:rPr lang="el-GR" dirty="0"/>
+              <a:rPr lang="el-GR" dirty="0">
+                <a:latin typeface="Arial" panose="020B0604020202020204" pitchFamily="34" charset="0"/>
+                <a:cs typeface="Arial" panose="020B0604020202020204" pitchFamily="34" charset="0"/>
+              </a:rPr>
               <a:t>α</a:t>
             </a:r>
             <a:r>
-              <a:rPr lang="fr-FR" i="1" dirty="0"/>
+              <a:rPr lang="fr-FR" i="1" dirty="0">
+                <a:latin typeface="Arial" panose="020B0604020202020204" pitchFamily="34" charset="0"/>
+                <a:cs typeface="Arial" panose="020B0604020202020204" pitchFamily="34" charset="0"/>
+              </a:rPr>
               <a:t>, </a:t>
             </a:r>
             <a:r>
-              <a:rPr lang="fr-FR" i="1" dirty="0" err="1"/>
+              <a:rPr lang="fr-FR" i="1" dirty="0" err="1">
+                <a:latin typeface="Arial" panose="020B0604020202020204" pitchFamily="34" charset="0"/>
+                <a:cs typeface="Arial" panose="020B0604020202020204" pitchFamily="34" charset="0"/>
+              </a:rPr>
               <a:t>Purple</a:t>
             </a:r>
             <a:r>
-              <a:rPr lang="fr-FR" i="1" dirty="0"/>
+              <a:rPr lang="fr-FR" i="1" dirty="0">
+                <a:latin typeface="Arial" panose="020B0604020202020204" pitchFamily="34" charset="0"/>
+                <a:cs typeface="Arial" panose="020B0604020202020204" pitchFamily="34" charset="0"/>
+              </a:rPr>
               <a:t>: TCR-</a:t>
             </a:r>
             <a:r>
-              <a:rPr lang="el-GR" dirty="0"/>
+              <a:rPr lang="el-GR" dirty="0">
+                <a:latin typeface="Arial" panose="020B0604020202020204" pitchFamily="34" charset="0"/>
+                <a:cs typeface="Arial" panose="020B0604020202020204" pitchFamily="34" charset="0"/>
+              </a:rPr>
               <a:t>β</a:t>
             </a:r>
             <a:r>
-              <a:rPr lang="fr-FR" i="1" dirty="0"/>
+              <a:rPr lang="fr-FR" i="1" dirty="0">
+                <a:latin typeface="Arial" panose="020B0604020202020204" pitchFamily="34" charset="0"/>
+                <a:cs typeface="Arial" panose="020B0604020202020204" pitchFamily="34" charset="0"/>
+              </a:rPr>
               <a:t>, Green: Peptide, Grey: MHC.</a:t>
             </a:r>
           </a:p>
@@ -4891,8 +5032,8 @@
         </p:blipFill>
         <p:spPr bwMode="auto">
           <a:xfrm>
-            <a:off x="8458625" y="14029036"/>
-            <a:ext cx="12675345" cy="5279073"/>
+            <a:off x="11245119" y="14363511"/>
+            <a:ext cx="9944222" cy="4198660"/>
           </a:xfrm>
           <a:prstGeom prst="rect">
             <a:avLst/>
@@ -4917,8 +5058,8 @@
         </p:nvSpPr>
         <p:spPr>
           <a:xfrm>
-            <a:off x="10945640" y="18867631"/>
-            <a:ext cx="4329519" cy="369332"/>
+            <a:off x="11245119" y="18507006"/>
+            <a:ext cx="4664482" cy="369332"/>
           </a:xfrm>
           <a:prstGeom prst="rect">
             <a:avLst/>
@@ -4931,7 +5072,10 @@
           <a:lstStyle/>
           <a:p>
             <a:r>
-              <a:rPr lang="fr-FR" i="1" dirty="0"/>
+              <a:rPr lang="fr-FR" i="1" dirty="0">
+                <a:latin typeface="Arial" panose="020B0604020202020204" pitchFamily="34" charset="0"/>
+                <a:cs typeface="Arial" panose="020B0604020202020204" pitchFamily="34" charset="0"/>
+              </a:rPr>
               <a:t>Figure 3. Architecture of the neural network.</a:t>
             </a:r>
           </a:p>
@@ -4945,84 +5089,135 @@
         </p:nvSpPr>
         <p:spPr>
           <a:xfrm>
-            <a:off x="558746" y="26140729"/>
-            <a:ext cx="8228984" cy="369332"/>
+            <a:off x="309341" y="23695084"/>
+            <a:ext cx="8347903" cy="646331"/>
           </a:xfrm>
           <a:prstGeom prst="rect">
             <a:avLst/>
           </a:prstGeom>
         </p:spPr>
         <p:txBody>
-          <a:bodyPr wrap="none">
+          <a:bodyPr wrap="square">
             <a:spAutoFit/>
           </a:bodyPr>
           <a:lstStyle/>
           <a:p>
             <a:r>
-              <a:rPr lang="fr-FR" i="1" dirty="0"/>
+              <a:rPr lang="fr-FR" i="1" dirty="0">
+                <a:latin typeface="Arial" panose="020B0604020202020204" pitchFamily="34" charset="0"/>
+                <a:cs typeface="Arial" panose="020B0604020202020204" pitchFamily="34" charset="0"/>
+              </a:rPr>
               <a:t>Table 1. </a:t>
             </a:r>
             <a:r>
-              <a:rPr lang="fr-FR" i="1" dirty="0" err="1"/>
+              <a:rPr lang="fr-FR" i="1" dirty="0" err="1">
+                <a:latin typeface="Arial" panose="020B0604020202020204" pitchFamily="34" charset="0"/>
+                <a:cs typeface="Arial" panose="020B0604020202020204" pitchFamily="34" charset="0"/>
+              </a:rPr>
               <a:t>Comparison</a:t>
             </a:r>
             <a:r>
-              <a:rPr lang="fr-FR" i="1" dirty="0"/>
+              <a:rPr lang="fr-FR" i="1" dirty="0">
+                <a:latin typeface="Arial" panose="020B0604020202020204" pitchFamily="34" charset="0"/>
+                <a:cs typeface="Arial" panose="020B0604020202020204" pitchFamily="34" charset="0"/>
+              </a:rPr>
               <a:t> </a:t>
             </a:r>
             <a:r>
-              <a:rPr lang="fr-FR" i="1" dirty="0" err="1"/>
+              <a:rPr lang="fr-FR" i="1" dirty="0" err="1">
+                <a:latin typeface="Arial" panose="020B0604020202020204" pitchFamily="34" charset="0"/>
+                <a:cs typeface="Arial" panose="020B0604020202020204" pitchFamily="34" charset="0"/>
+              </a:rPr>
               <a:t>between</a:t>
             </a:r>
             <a:r>
-              <a:rPr lang="fr-FR" i="1" dirty="0"/>
+              <a:rPr lang="fr-FR" i="1" dirty="0">
+                <a:latin typeface="Arial" panose="020B0604020202020204" pitchFamily="34" charset="0"/>
+                <a:cs typeface="Arial" panose="020B0604020202020204" pitchFamily="34" charset="0"/>
+              </a:rPr>
               <a:t> the </a:t>
             </a:r>
             <a:r>
-              <a:rPr lang="fr-FR" i="1" dirty="0" err="1"/>
+              <a:rPr lang="fr-FR" i="1" dirty="0" err="1">
+                <a:latin typeface="Arial" panose="020B0604020202020204" pitchFamily="34" charset="0"/>
+                <a:cs typeface="Arial" panose="020B0604020202020204" pitchFamily="34" charset="0"/>
+              </a:rPr>
               <a:t>different</a:t>
             </a:r>
             <a:r>
-              <a:rPr lang="fr-FR" i="1" dirty="0"/>
+              <a:rPr lang="fr-FR" i="1" dirty="0">
+                <a:latin typeface="Arial" panose="020B0604020202020204" pitchFamily="34" charset="0"/>
+                <a:cs typeface="Arial" panose="020B0604020202020204" pitchFamily="34" charset="0"/>
+              </a:rPr>
               <a:t> networks </a:t>
             </a:r>
             <a:r>
-              <a:rPr lang="fr-FR" i="1" dirty="0" err="1"/>
+              <a:rPr lang="fr-FR" i="1" dirty="0" err="1">
+                <a:latin typeface="Arial" panose="020B0604020202020204" pitchFamily="34" charset="0"/>
+                <a:cs typeface="Arial" panose="020B0604020202020204" pitchFamily="34" charset="0"/>
+              </a:rPr>
               <a:t>that</a:t>
             </a:r>
             <a:r>
-              <a:rPr lang="fr-FR" i="1" dirty="0"/>
+              <a:rPr lang="fr-FR" i="1" dirty="0">
+                <a:latin typeface="Arial" panose="020B0604020202020204" pitchFamily="34" charset="0"/>
+                <a:cs typeface="Arial" panose="020B0604020202020204" pitchFamily="34" charset="0"/>
+              </a:rPr>
               <a:t> </a:t>
             </a:r>
             <a:r>
-              <a:rPr lang="fr-FR" i="1" dirty="0" err="1"/>
+              <a:rPr lang="fr-FR" i="1" dirty="0" err="1">
+                <a:latin typeface="Arial" panose="020B0604020202020204" pitchFamily="34" charset="0"/>
+                <a:cs typeface="Arial" panose="020B0604020202020204" pitchFamily="34" charset="0"/>
+              </a:rPr>
               <a:t>we</a:t>
             </a:r>
             <a:r>
-              <a:rPr lang="fr-FR" i="1" dirty="0"/>
+              <a:rPr lang="fr-FR" i="1" dirty="0">
+                <a:latin typeface="Arial" panose="020B0604020202020204" pitchFamily="34" charset="0"/>
+                <a:cs typeface="Arial" panose="020B0604020202020204" pitchFamily="34" charset="0"/>
+              </a:rPr>
               <a:t> </a:t>
             </a:r>
             <a:r>
-              <a:rPr lang="fr-FR" i="1" dirty="0" err="1"/>
+              <a:rPr lang="fr-FR" i="1" dirty="0" err="1">
+                <a:latin typeface="Arial" panose="020B0604020202020204" pitchFamily="34" charset="0"/>
+                <a:cs typeface="Arial" panose="020B0604020202020204" pitchFamily="34" charset="0"/>
+              </a:rPr>
               <a:t>constructed</a:t>
             </a:r>
             <a:r>
-              <a:rPr lang="fr-FR" i="1" dirty="0"/>
+              <a:rPr lang="fr-FR" i="1" dirty="0">
+                <a:latin typeface="Arial" panose="020B0604020202020204" pitchFamily="34" charset="0"/>
+                <a:cs typeface="Arial" panose="020B0604020202020204" pitchFamily="34" charset="0"/>
+              </a:rPr>
               <a:t> in </a:t>
             </a:r>
             <a:r>
-              <a:rPr lang="fr-FR" i="1" dirty="0" err="1"/>
+              <a:rPr lang="fr-FR" i="1" dirty="0" err="1">
+                <a:latin typeface="Arial" panose="020B0604020202020204" pitchFamily="34" charset="0"/>
+                <a:cs typeface="Arial" panose="020B0604020202020204" pitchFamily="34" charset="0"/>
+              </a:rPr>
               <a:t>this</a:t>
             </a:r>
             <a:r>
-              <a:rPr lang="fr-FR" i="1" dirty="0"/>
+              <a:rPr lang="fr-FR" i="1" dirty="0">
+                <a:latin typeface="Arial" panose="020B0604020202020204" pitchFamily="34" charset="0"/>
+                <a:cs typeface="Arial" panose="020B0604020202020204" pitchFamily="34" charset="0"/>
+              </a:rPr>
               <a:t> </a:t>
             </a:r>
             <a:r>
-              <a:rPr lang="fr-FR" i="1" dirty="0" err="1"/>
+              <a:rPr lang="fr-FR" i="1" dirty="0" err="1">
+                <a:latin typeface="Arial" panose="020B0604020202020204" pitchFamily="34" charset="0"/>
+                <a:cs typeface="Arial" panose="020B0604020202020204" pitchFamily="34" charset="0"/>
+              </a:rPr>
               <a:t>project</a:t>
             </a:r>
-            <a:endParaRPr lang="fr-FR" i="1" dirty="0"/>
+            <a:endParaRPr lang="fr-FR" i="1" dirty="0">
+              <a:latin typeface="Arial" panose="020B0604020202020204" pitchFamily="34" charset="0"/>
+              <a:cs typeface="Arial" panose="020B0604020202020204" pitchFamily="34" charset="0"/>
+            </a:endParaRPr>
           </a:p>
         </p:txBody>
       </p:sp>
@@ -5031,7 +5226,7 @@
           <p:cNvPr id="15" name="Picture 14" descr="Graphical user interface&#10;&#10;Description automatically generated with low confidence">
             <a:extLst>
               <a:ext uri="{FF2B5EF4-FFF2-40B4-BE49-F238E27FC236}">
-                <a16:creationId xmlns:a16="http://schemas.microsoft.com/office/drawing/2014/main" id="{3BC95CEC-30C8-4CC6-9A6F-CEA5128B28D7}"/>
+                <a16:creationId xmlns:a16="http://schemas.microsoft.com/office/drawing/2014/main" xmlns="" id="{3BC95CEC-30C8-4CC6-9A6F-CEA5128B28D7}"/>
               </a:ext>
             </a:extLst>
           </p:cNvPr>
@@ -5048,8 +5243,8 @@
         </p:blipFill>
         <p:spPr>
           <a:xfrm>
-            <a:off x="367747" y="16466064"/>
-            <a:ext cx="6863763" cy="2499220"/>
+            <a:off x="252605" y="14260665"/>
+            <a:ext cx="10628481" cy="3859584"/>
           </a:xfrm>
           <a:prstGeom prst="rect">
             <a:avLst/>
@@ -5077,7 +5272,7 @@
         </p:blipFill>
         <p:spPr bwMode="auto">
           <a:xfrm rot="16200000">
-            <a:off x="14979058" y="3342190"/>
+            <a:off x="14979058" y="2997864"/>
             <a:ext cx="3886583" cy="7150454"/>
           </a:xfrm>
           <a:prstGeom prst="rect">
@@ -5100,7 +5295,7 @@
           <p:cNvPr id="52" name="TextBox 51">
             <a:extLst>
               <a:ext uri="{FF2B5EF4-FFF2-40B4-BE49-F238E27FC236}">
-                <a16:creationId xmlns:a16="http://schemas.microsoft.com/office/drawing/2014/main" id="{8D25C8AF-29B9-4B5F-A484-1C152F2D45F1}"/>
+                <a16:creationId xmlns:a16="http://schemas.microsoft.com/office/drawing/2014/main" xmlns="" id="{8D25C8AF-29B9-4B5F-A484-1C152F2D45F1}"/>
               </a:ext>
             </a:extLst>
           </p:cNvPr>
@@ -5109,7 +5304,7 @@
         </p:nvSpPr>
         <p:spPr>
           <a:xfrm>
-            <a:off x="10689258" y="9642407"/>
+            <a:off x="10630937" y="9257692"/>
             <a:ext cx="10500083" cy="1608133"/>
           </a:xfrm>
           <a:prstGeom prst="rect">
@@ -5195,7 +5390,7 @@
           <p:cNvPr id="59" name="TextBox 58">
             <a:extLst>
               <a:ext uri="{FF2B5EF4-FFF2-40B4-BE49-F238E27FC236}">
-                <a16:creationId xmlns:a16="http://schemas.microsoft.com/office/drawing/2014/main" id="{25FCE40A-6812-4241-9AFC-C4527E1E08D6}"/>
+                <a16:creationId xmlns:a16="http://schemas.microsoft.com/office/drawing/2014/main" xmlns="" id="{25FCE40A-6812-4241-9AFC-C4527E1E08D6}"/>
               </a:ext>
             </a:extLst>
           </p:cNvPr>
@@ -5204,8 +5399,8 @@
         </p:nvSpPr>
         <p:spPr>
           <a:xfrm>
-            <a:off x="229641" y="12361309"/>
-            <a:ext cx="10459617" cy="1225977"/>
+            <a:off x="251020" y="11913270"/>
+            <a:ext cx="20938321" cy="1595309"/>
           </a:xfrm>
           <a:prstGeom prst="rect">
             <a:avLst/>
@@ -5229,6 +5424,244 @@
                 <a:cs typeface="Arial" panose="020B0604020202020204" pitchFamily="34" charset="0"/>
               </a:rPr>
               <a:t>Pre-processing with protein embedding</a:t>
+            </a:r>
+          </a:p>
+          <a:p>
+            <a:pPr marL="342900" indent="-342900" algn="just">
+              <a:spcAft>
+                <a:spcPts val="100"/>
+              </a:spcAft>
+              <a:buFont typeface="Arial" panose="020B0604020202020204" pitchFamily="34" charset="0"/>
+              <a:buChar char="•"/>
+            </a:pPr>
+            <a:r>
+              <a:rPr lang="en-GB" sz="2400" b="1" dirty="0" smtClean="0">
+                <a:latin typeface="Arial" panose="020B0604020202020204" pitchFamily="34" charset="0"/>
+                <a:cs typeface="Arial" panose="020B0604020202020204" pitchFamily="34" charset="0"/>
+              </a:rPr>
+              <a:t>BLOSUM (</a:t>
+            </a:r>
+            <a:r>
+              <a:rPr lang="en-GB" sz="2400" b="1" dirty="0" err="1" smtClean="0">
+                <a:latin typeface="Arial" panose="020B0604020202020204" pitchFamily="34" charset="0"/>
+                <a:cs typeface="Arial" panose="020B0604020202020204" pitchFamily="34" charset="0"/>
+              </a:rPr>
+              <a:t>BLOcks</a:t>
+            </a:r>
+            <a:r>
+              <a:rPr lang="en-GB" sz="2400" b="1" dirty="0" smtClean="0">
+                <a:latin typeface="Arial" panose="020B0604020202020204" pitchFamily="34" charset="0"/>
+                <a:cs typeface="Arial" panose="020B0604020202020204" pitchFamily="34" charset="0"/>
+              </a:rPr>
+              <a:t> </a:t>
+            </a:r>
+            <a:r>
+              <a:rPr lang="en-GB" sz="2400" b="1" dirty="0" err="1">
+                <a:latin typeface="Arial" panose="020B0604020202020204" pitchFamily="34" charset="0"/>
+                <a:cs typeface="Arial" panose="020B0604020202020204" pitchFamily="34" charset="0"/>
+              </a:rPr>
+              <a:t>SUbstitution</a:t>
+            </a:r>
+            <a:r>
+              <a:rPr lang="en-GB" sz="2400" b="1" dirty="0">
+                <a:latin typeface="Arial" panose="020B0604020202020204" pitchFamily="34" charset="0"/>
+                <a:cs typeface="Arial" panose="020B0604020202020204" pitchFamily="34" charset="0"/>
+              </a:rPr>
+              <a:t> Matrix</a:t>
+            </a:r>
+            <a:r>
+              <a:rPr lang="en-GB" sz="2400" b="1" dirty="0" smtClean="0">
+                <a:latin typeface="Arial" panose="020B0604020202020204" pitchFamily="34" charset="0"/>
+                <a:cs typeface="Arial" panose="020B0604020202020204" pitchFamily="34" charset="0"/>
+              </a:rPr>
+              <a:t>): </a:t>
+            </a:r>
+            <a:r>
+              <a:rPr lang="en-GB" sz="2400" dirty="0" smtClean="0">
+                <a:latin typeface="Arial" panose="020B0604020202020204" pitchFamily="34" charset="0"/>
+                <a:cs typeface="Arial" panose="020B0604020202020204" pitchFamily="34" charset="0"/>
+              </a:rPr>
+              <a:t>Captures the biochemical properties of amino acids. It turns one-hot encoding into a vector with less 0s.</a:t>
+            </a:r>
+            <a:endParaRPr lang="en-GB" sz="2400" b="1" dirty="0" smtClean="0">
+              <a:latin typeface="Arial" panose="020B0604020202020204" pitchFamily="34" charset="0"/>
+              <a:cs typeface="Arial" panose="020B0604020202020204" pitchFamily="34" charset="0"/>
+            </a:endParaRPr>
+          </a:p>
+          <a:p>
+            <a:pPr marL="342900" indent="-342900" algn="just">
+              <a:spcAft>
+                <a:spcPts val="100"/>
+              </a:spcAft>
+              <a:buFont typeface="Arial" panose="020B0604020202020204" pitchFamily="34" charset="0"/>
+              <a:buChar char="•"/>
+            </a:pPr>
+            <a:r>
+              <a:rPr lang="en-GB" sz="2400" b="1" dirty="0">
+                <a:latin typeface="Arial" panose="020B0604020202020204" pitchFamily="34" charset="0"/>
+                <a:cs typeface="Arial" panose="020B0604020202020204" pitchFamily="34" charset="0"/>
+              </a:rPr>
+              <a:t>ESM </a:t>
+            </a:r>
+            <a:r>
+              <a:rPr lang="en-GB" sz="2400" b="1" dirty="0" smtClean="0">
+                <a:latin typeface="Arial" panose="020B0604020202020204" pitchFamily="34" charset="0"/>
+                <a:cs typeface="Arial" panose="020B0604020202020204" pitchFamily="34" charset="0"/>
+              </a:rPr>
+              <a:t>(</a:t>
+            </a:r>
+            <a:r>
+              <a:rPr lang="en-GB" sz="2400" b="1" dirty="0">
+                <a:latin typeface="Arial" panose="020B0604020202020204" pitchFamily="34" charset="0"/>
+                <a:cs typeface="Arial" panose="020B0604020202020204" pitchFamily="34" charset="0"/>
+              </a:rPr>
+              <a:t>Evolutionary Scale </a:t>
+            </a:r>
+            <a:r>
+              <a:rPr lang="en-GB" sz="2400" b="1" dirty="0" err="1">
+                <a:latin typeface="Arial" panose="020B0604020202020204" pitchFamily="34" charset="0"/>
+                <a:cs typeface="Arial" panose="020B0604020202020204" pitchFamily="34" charset="0"/>
+              </a:rPr>
+              <a:t>Modeling</a:t>
+            </a:r>
+            <a:r>
+              <a:rPr lang="en-GB" sz="2400" b="1" dirty="0" smtClean="0">
+                <a:latin typeface="Arial" panose="020B0604020202020204" pitchFamily="34" charset="0"/>
+                <a:cs typeface="Arial" panose="020B0604020202020204" pitchFamily="34" charset="0"/>
+              </a:rPr>
+              <a:t>) [3]: </a:t>
+            </a:r>
+            <a:r>
+              <a:rPr lang="en-GB" sz="2400" dirty="0" smtClean="0">
+                <a:latin typeface="Arial" panose="020B0604020202020204" pitchFamily="34" charset="0"/>
+                <a:cs typeface="Arial" panose="020B0604020202020204" pitchFamily="34" charset="0"/>
+              </a:rPr>
+              <a:t>A transformer, i.e. a </a:t>
+            </a:r>
+            <a:r>
+              <a:rPr lang="en-US" sz="2400" dirty="0" smtClean="0">
+                <a:latin typeface="Arial" panose="020B0604020202020204" pitchFamily="34" charset="0"/>
+                <a:cs typeface="Arial" panose="020B0604020202020204" pitchFamily="34" charset="0"/>
+              </a:rPr>
+              <a:t>series </a:t>
+            </a:r>
+            <a:r>
+              <a:rPr lang="en-US" sz="2400" dirty="0">
+                <a:latin typeface="Arial" panose="020B0604020202020204" pitchFamily="34" charset="0"/>
+                <a:cs typeface="Arial" panose="020B0604020202020204" pitchFamily="34" charset="0"/>
+              </a:rPr>
+              <a:t>of </a:t>
+            </a:r>
+            <a:r>
+              <a:rPr lang="en-US" sz="2400" dirty="0" smtClean="0">
+                <a:latin typeface="Arial" panose="020B0604020202020204" pitchFamily="34" charset="0"/>
+                <a:cs typeface="Arial" panose="020B0604020202020204" pitchFamily="34" charset="0"/>
+              </a:rPr>
+              <a:t>blocks that </a:t>
+            </a:r>
+            <a:r>
+              <a:rPr lang="en-US" sz="2400" dirty="0">
+                <a:latin typeface="Arial" panose="020B0604020202020204" pitchFamily="34" charset="0"/>
+                <a:cs typeface="Arial" panose="020B0604020202020204" pitchFamily="34" charset="0"/>
+              </a:rPr>
+              <a:t>alternate self-attention with feed-forward </a:t>
+            </a:r>
+            <a:r>
+              <a:rPr lang="en-US" sz="2400" dirty="0" smtClean="0">
+                <a:latin typeface="Arial" panose="020B0604020202020204" pitchFamily="34" charset="0"/>
+                <a:cs typeface="Arial" panose="020B0604020202020204" pitchFamily="34" charset="0"/>
+              </a:rPr>
+              <a:t>connections. It has been trained beforehand with 250 million sequences and has 650 million weights. The output is a vector of size 1280 for each amino acid position.</a:t>
+            </a:r>
+            <a:endParaRPr lang="en-GB" sz="2400" b="1" dirty="0">
+              <a:latin typeface="Arial" panose="020B0604020202020204" pitchFamily="34" charset="0"/>
+              <a:cs typeface="Arial" panose="020B0604020202020204" pitchFamily="34" charset="0"/>
+            </a:endParaRPr>
+          </a:p>
+        </p:txBody>
+      </p:sp>
+      <p:sp>
+        <p:nvSpPr>
+          <p:cNvPr id="60" name="TextBox 59">
+            <a:extLst>
+              <a:ext uri="{FF2B5EF4-FFF2-40B4-BE49-F238E27FC236}">
+                <a16:creationId xmlns:a16="http://schemas.microsoft.com/office/drawing/2014/main" xmlns="" id="{5EC9703E-C0FE-42AC-9186-837AE535C777}"/>
+              </a:ext>
+            </a:extLst>
+          </p:cNvPr>
+          <p:cNvSpPr txBox="1"/>
+          <p:nvPr/>
+        </p:nvSpPr>
+        <p:spPr>
+          <a:xfrm>
+            <a:off x="5519532" y="13801143"/>
+            <a:ext cx="10459617" cy="461665"/>
+          </a:xfrm>
+          <a:prstGeom prst="rect">
+            <a:avLst/>
+          </a:prstGeom>
+          <a:noFill/>
+        </p:spPr>
+        <p:txBody>
+          <a:bodyPr wrap="square">
+            <a:spAutoFit/>
+          </a:bodyPr>
+          <a:lstStyle/>
+          <a:p>
+            <a:pPr algn="ctr">
+              <a:spcAft>
+                <a:spcPts val="100"/>
+              </a:spcAft>
+            </a:pPr>
+            <a:r>
+              <a:rPr lang="en-GB" sz="2400" b="1" dirty="0">
+                <a:latin typeface="Arial" panose="020B0604020202020204" pitchFamily="34" charset="0"/>
+                <a:cs typeface="Arial" panose="020B0604020202020204" pitchFamily="34" charset="0"/>
+              </a:rPr>
+              <a:t>Neural network architecture</a:t>
+            </a:r>
+          </a:p>
+        </p:txBody>
+      </p:sp>
+      <p:sp>
+        <p:nvSpPr>
+          <p:cNvPr id="62" name="TextBox 61">
+            <a:extLst>
+              <a:ext uri="{FF2B5EF4-FFF2-40B4-BE49-F238E27FC236}">
+                <a16:creationId xmlns:a16="http://schemas.microsoft.com/office/drawing/2014/main" xmlns="" id="{658BED85-75EA-4BFC-BF85-417C54E59FAC}"/>
+              </a:ext>
+            </a:extLst>
+          </p:cNvPr>
+          <p:cNvSpPr txBox="1"/>
+          <p:nvPr/>
+        </p:nvSpPr>
+        <p:spPr>
+          <a:xfrm>
+            <a:off x="229641" y="9225409"/>
+            <a:ext cx="10379917" cy="1608133"/>
+          </a:xfrm>
+          <a:prstGeom prst="rect">
+            <a:avLst/>
+          </a:prstGeom>
+          <a:noFill/>
+        </p:spPr>
+        <p:txBody>
+          <a:bodyPr wrap="square">
+            <a:spAutoFit/>
+          </a:bodyPr>
+          <a:lstStyle/>
+          <a:p>
+            <a:pPr algn="ctr">
+              <a:spcAft>
+                <a:spcPts val="100"/>
+              </a:spcAft>
+            </a:pPr>
+            <a:r>
+              <a:rPr lang="en-GB" sz="2400" b="1" dirty="0">
+                <a:latin typeface="Arial" panose="020B0604020202020204" pitchFamily="34" charset="0"/>
+                <a:cs typeface="Arial" panose="020B0604020202020204" pitchFamily="34" charset="0"/>
+              </a:rPr>
+              <a:t>Input data [1]</a:t>
             </a:r>
           </a:p>
           <a:p>
@@ -5240,11 +5673,15 @@
               <a:buChar char="•"/>
             </a:pPr>
             <a:r>
-              <a:rPr lang="en-GB" sz="2400" b="1" dirty="0">
-                <a:latin typeface="Arial" panose="020B0604020202020204" pitchFamily="34" charset="0"/>
-                <a:cs typeface="Arial" panose="020B0604020202020204" pitchFamily="34" charset="0"/>
-              </a:rPr>
-              <a:t>BLOSUM</a:t>
+              <a:rPr lang="en-US" sz="2400" b="0" i="0" u="none" strike="noStrike" dirty="0">
+                <a:solidFill>
+                  <a:srgbClr val="000000"/>
+                </a:solidFill>
+                <a:effectLst/>
+                <a:latin typeface="Arial" panose="020B0604020202020204" pitchFamily="34" charset="0"/>
+                <a:cs typeface="Arial" panose="020B0604020202020204" pitchFamily="34" charset="0"/>
+              </a:rPr>
+              <a:t>Protein sequence (one-hot-encoding)</a:t>
             </a:r>
           </a:p>
           <a:p>
@@ -5256,97 +5693,15 @@
               <a:buChar char="•"/>
             </a:pPr>
             <a:r>
-              <a:rPr lang="en-GB" sz="2400" b="1" dirty="0">
-                <a:latin typeface="Arial" panose="020B0604020202020204" pitchFamily="34" charset="0"/>
-                <a:cs typeface="Arial" panose="020B0604020202020204" pitchFamily="34" charset="0"/>
-              </a:rPr>
-              <a:t>ESM</a:t>
-            </a:r>
-          </a:p>
-        </p:txBody>
-      </p:sp>
-      <p:sp>
-        <p:nvSpPr>
-          <p:cNvPr id="60" name="TextBox 59">
-            <a:extLst>
-              <a:ext uri="{FF2B5EF4-FFF2-40B4-BE49-F238E27FC236}">
-                <a16:creationId xmlns:a16="http://schemas.microsoft.com/office/drawing/2014/main" id="{5EC9703E-C0FE-42AC-9186-837AE535C777}"/>
-              </a:ext>
-            </a:extLst>
-          </p:cNvPr>
-          <p:cNvSpPr txBox="1"/>
-          <p:nvPr/>
-        </p:nvSpPr>
-        <p:spPr>
-          <a:xfrm>
-            <a:off x="10689258" y="12361308"/>
-            <a:ext cx="10459617" cy="461665"/>
-          </a:xfrm>
-          <a:prstGeom prst="rect">
-            <a:avLst/>
-          </a:prstGeom>
-          <a:noFill/>
-        </p:spPr>
-        <p:txBody>
-          <a:bodyPr wrap="square">
-            <a:spAutoFit/>
-          </a:bodyPr>
-          <a:lstStyle/>
-          <a:p>
-            <a:pPr algn="ctr">
-              <a:spcAft>
-                <a:spcPts val="100"/>
-              </a:spcAft>
-            </a:pPr>
-            <a:r>
-              <a:rPr lang="en-GB" sz="2400" b="1" dirty="0">
-                <a:latin typeface="Arial" panose="020B0604020202020204" pitchFamily="34" charset="0"/>
-                <a:cs typeface="Arial" panose="020B0604020202020204" pitchFamily="34" charset="0"/>
-              </a:rPr>
-              <a:t>Neural network architecture</a:t>
-            </a:r>
-          </a:p>
-        </p:txBody>
-      </p:sp>
-      <p:sp>
-        <p:nvSpPr>
-          <p:cNvPr id="62" name="TextBox 61">
-            <a:extLst>
-              <a:ext uri="{FF2B5EF4-FFF2-40B4-BE49-F238E27FC236}">
-                <a16:creationId xmlns:a16="http://schemas.microsoft.com/office/drawing/2014/main" id="{658BED85-75EA-4BFC-BF85-417C54E59FAC}"/>
-              </a:ext>
-            </a:extLst>
-          </p:cNvPr>
-          <p:cNvSpPr txBox="1"/>
-          <p:nvPr/>
-        </p:nvSpPr>
-        <p:spPr>
-          <a:xfrm>
-            <a:off x="309341" y="9596186"/>
-            <a:ext cx="10379917" cy="1608133"/>
-          </a:xfrm>
-          <a:prstGeom prst="rect">
-            <a:avLst/>
-          </a:prstGeom>
-          <a:noFill/>
-        </p:spPr>
-        <p:txBody>
-          <a:bodyPr wrap="square">
-            <a:spAutoFit/>
-          </a:bodyPr>
-          <a:lstStyle/>
-          <a:p>
-            <a:pPr algn="ctr">
-              <a:spcAft>
-                <a:spcPts val="100"/>
-              </a:spcAft>
-            </a:pPr>
-            <a:r>
-              <a:rPr lang="en-GB" sz="2400" b="1" dirty="0">
-                <a:latin typeface="Arial" panose="020B0604020202020204" pitchFamily="34" charset="0"/>
-                <a:cs typeface="Arial" panose="020B0604020202020204" pitchFamily="34" charset="0"/>
-              </a:rPr>
-              <a:t>Input data [1]</a:t>
+              <a:rPr lang="en-US" sz="2400" b="0" i="0" u="none" strike="noStrike" dirty="0">
+                <a:solidFill>
+                  <a:srgbClr val="000000"/>
+                </a:solidFill>
+                <a:effectLst/>
+                <a:latin typeface="Arial" panose="020B0604020202020204" pitchFamily="34" charset="0"/>
+                <a:cs typeface="Arial" panose="020B0604020202020204" pitchFamily="34" charset="0"/>
+              </a:rPr>
+              <a:t>Per-residue energy terms  (one value per row)</a:t>
             </a:r>
           </a:p>
           <a:p>
@@ -5364,44 +5719,7 @@
                 </a:solidFill>
                 <a:effectLst/>
                 <a:latin typeface="Arial" panose="020B0604020202020204" pitchFamily="34" charset="0"/>
-              </a:rPr>
-              <a:t>Protein sequence (one-hot-encoding)</a:t>
-            </a:r>
-          </a:p>
-          <a:p>
-            <a:pPr marL="342900" indent="-342900">
-              <a:spcAft>
-                <a:spcPts val="100"/>
-              </a:spcAft>
-              <a:buFont typeface="Arial" panose="020B0604020202020204" pitchFamily="34" charset="0"/>
-              <a:buChar char="•"/>
-            </a:pPr>
-            <a:r>
-              <a:rPr lang="en-US" sz="2400" b="0" i="0" u="none" strike="noStrike" dirty="0">
-                <a:solidFill>
-                  <a:srgbClr val="000000"/>
-                </a:solidFill>
-                <a:effectLst/>
-                <a:latin typeface="Arial" panose="020B0604020202020204" pitchFamily="34" charset="0"/>
-              </a:rPr>
-              <a:t>Per-residue energy terms  (one value per row)</a:t>
-            </a:r>
-          </a:p>
-          <a:p>
-            <a:pPr marL="342900" indent="-342900">
-              <a:spcAft>
-                <a:spcPts val="100"/>
-              </a:spcAft>
-              <a:buFont typeface="Arial" panose="020B0604020202020204" pitchFamily="34" charset="0"/>
-              <a:buChar char="•"/>
-            </a:pPr>
-            <a:r>
-              <a:rPr lang="en-US" sz="2400" b="0" i="0" u="none" strike="noStrike" dirty="0">
-                <a:solidFill>
-                  <a:srgbClr val="000000"/>
-                </a:solidFill>
-                <a:effectLst/>
-                <a:latin typeface="Arial" panose="020B0604020202020204" pitchFamily="34" charset="0"/>
+                <a:cs typeface="Arial" panose="020B0604020202020204" pitchFamily="34" charset="0"/>
               </a:rPr>
               <a:t>Global energy terms (constant, one value per column)</a:t>
             </a:r>
@@ -5413,7 +5731,7 @@
           <p:cNvPr id="16" name="Table 16">
             <a:extLst>
               <a:ext uri="{FF2B5EF4-FFF2-40B4-BE49-F238E27FC236}">
-                <a16:creationId xmlns:a16="http://schemas.microsoft.com/office/drawing/2014/main" id="{B3DD0E64-0B7C-4139-8170-FF729427F72A}"/>
+                <a16:creationId xmlns:a16="http://schemas.microsoft.com/office/drawing/2014/main" xmlns="" id="{B3DD0E64-0B7C-4139-8170-FF729427F72A}"/>
               </a:ext>
             </a:extLst>
           </p:cNvPr>
@@ -5423,14 +5741,14 @@
           <p:nvPr>
             <p:extLst>
               <p:ext uri="{D42A27DB-BD31-4B8C-83A1-F6EECF244321}">
-                <p14:modId xmlns:p14="http://schemas.microsoft.com/office/powerpoint/2010/main" val="692489850"/>
+                <p14:modId xmlns:p14="http://schemas.microsoft.com/office/powerpoint/2010/main" val="1570940618"/>
               </p:ext>
             </p:extLst>
           </p:nvPr>
         </p:nvGraphicFramePr>
         <p:xfrm>
-          <a:off x="558746" y="22502322"/>
-          <a:ext cx="9118043" cy="3562351"/>
+          <a:off x="309341" y="20020833"/>
+          <a:ext cx="8347903" cy="3562351"/>
         </p:xfrm>
         <a:graphic>
           <a:graphicData uri="http://schemas.openxmlformats.org/drawingml/2006/table">
@@ -5439,45 +5757,45 @@
                 <a:tableStyleId>{073A0DAA-6AF3-43AB-8588-CEC1D06C72B9}</a:tableStyleId>
               </a:tblPr>
               <a:tblGrid>
-                <a:gridCol w="2919178">
+                <a:gridCol w="3371090">
                   <a:extLst>
                     <a:ext uri="{9D8B030D-6E8A-4147-A177-3AD203B41FA5}">
-                      <a16:colId xmlns:a16="http://schemas.microsoft.com/office/drawing/2014/main" val="630018940"/>
+                      <a16:colId xmlns:a16="http://schemas.microsoft.com/office/drawing/2014/main" xmlns="" val="630018940"/>
                     </a:ext>
                   </a:extLst>
                 </a:gridCol>
-                <a:gridCol w="1239773">
+                <a:gridCol w="805180">
                   <a:extLst>
                     <a:ext uri="{9D8B030D-6E8A-4147-A177-3AD203B41FA5}">
-                      <a16:colId xmlns:a16="http://schemas.microsoft.com/office/drawing/2014/main" val="1361621000"/>
+                      <a16:colId xmlns:a16="http://schemas.microsoft.com/office/drawing/2014/main" xmlns="" val="1361621000"/>
                     </a:ext>
                   </a:extLst>
                 </a:gridCol>
-                <a:gridCol w="1239773">
+                <a:gridCol w="887730">
                   <a:extLst>
                     <a:ext uri="{9D8B030D-6E8A-4147-A177-3AD203B41FA5}">
-                      <a16:colId xmlns:a16="http://schemas.microsoft.com/office/drawing/2014/main" val="3966724582"/>
+                      <a16:colId xmlns:a16="http://schemas.microsoft.com/office/drawing/2014/main" xmlns="" val="3966724582"/>
                     </a:ext>
                   </a:extLst>
                 </a:gridCol>
-                <a:gridCol w="1239773">
+                <a:gridCol w="1395730">
                   <a:extLst>
                     <a:ext uri="{9D8B030D-6E8A-4147-A177-3AD203B41FA5}">
-                      <a16:colId xmlns:a16="http://schemas.microsoft.com/office/drawing/2014/main" val="2736714997"/>
+                      <a16:colId xmlns:a16="http://schemas.microsoft.com/office/drawing/2014/main" xmlns="" val="2736714997"/>
                     </a:ext>
                   </a:extLst>
                 </a:gridCol>
-                <a:gridCol w="1239773">
+                <a:gridCol w="1000443">
                   <a:extLst>
                     <a:ext uri="{9D8B030D-6E8A-4147-A177-3AD203B41FA5}">
-                      <a16:colId xmlns:a16="http://schemas.microsoft.com/office/drawing/2014/main" val="3764394228"/>
+                      <a16:colId xmlns:a16="http://schemas.microsoft.com/office/drawing/2014/main" xmlns="" val="3764394228"/>
                     </a:ext>
                   </a:extLst>
                 </a:gridCol>
-                <a:gridCol w="1239773">
+                <a:gridCol w="887730">
                   <a:extLst>
                     <a:ext uri="{9D8B030D-6E8A-4147-A177-3AD203B41FA5}">
-                      <a16:colId xmlns:a16="http://schemas.microsoft.com/office/drawing/2014/main" val="4125354729"/>
+                      <a16:colId xmlns:a16="http://schemas.microsoft.com/office/drawing/2014/main" xmlns="" val="4125354729"/>
                     </a:ext>
                   </a:extLst>
                 </a:gridCol>
@@ -5490,10 +5808,16 @@
                     <a:p>
                       <a:pPr algn="ctr"/>
                       <a:r>
-                        <a:rPr lang="en-US" sz="2200" dirty="0"/>
+                        <a:rPr lang="en-US" sz="2000" dirty="0">
+                          <a:latin typeface="Arial" panose="020B0604020202020204" pitchFamily="34" charset="0"/>
+                          <a:cs typeface="Arial" panose="020B0604020202020204" pitchFamily="34" charset="0"/>
+                        </a:rPr>
                         <a:t>Network architecture</a:t>
                       </a:r>
-                      <a:endParaRPr lang="da-DK" sz="2200" dirty="0"/>
+                      <a:endParaRPr lang="da-DK" sz="2000" dirty="0">
+                        <a:latin typeface="Arial" panose="020B0604020202020204" pitchFamily="34" charset="0"/>
+                        <a:cs typeface="Arial" panose="020B0604020202020204" pitchFamily="34" charset="0"/>
+                      </a:endParaRPr>
                     </a:p>
                   </a:txBody>
                   <a:tcPr anchor="ctr">
@@ -5509,10 +5833,16 @@
                     <a:p>
                       <a:pPr algn="ctr"/>
                       <a:r>
-                        <a:rPr lang="en-US" sz="2200" b="1" dirty="0"/>
+                        <a:rPr lang="en-US" sz="2000" b="1" dirty="0">
+                          <a:latin typeface="Arial" panose="020B0604020202020204" pitchFamily="34" charset="0"/>
+                          <a:cs typeface="Arial" panose="020B0604020202020204" pitchFamily="34" charset="0"/>
+                        </a:rPr>
                         <a:t>AUC</a:t>
                       </a:r>
-                      <a:endParaRPr lang="da-DK" sz="2200" b="1" dirty="0"/>
+                      <a:endParaRPr lang="da-DK" sz="2000" b="1" dirty="0">
+                        <a:latin typeface="Arial" panose="020B0604020202020204" pitchFamily="34" charset="0"/>
+                        <a:cs typeface="Arial" panose="020B0604020202020204" pitchFamily="34" charset="0"/>
+                      </a:endParaRPr>
                     </a:p>
                   </a:txBody>
                   <a:tcPr anchor="ctr">
@@ -5528,10 +5858,16 @@
                     <a:p>
                       <a:pPr algn="ctr"/>
                       <a:r>
-                        <a:rPr lang="en-US" sz="2200" dirty="0"/>
+                        <a:rPr lang="en-US" sz="2000" dirty="0">
+                          <a:latin typeface="Arial" panose="020B0604020202020204" pitchFamily="34" charset="0"/>
+                          <a:cs typeface="Arial" panose="020B0604020202020204" pitchFamily="34" charset="0"/>
+                        </a:rPr>
                         <a:t>MCC</a:t>
                       </a:r>
-                      <a:endParaRPr lang="da-DK" sz="2200" dirty="0"/>
+                      <a:endParaRPr lang="da-DK" sz="2000" dirty="0">
+                        <a:latin typeface="Arial" panose="020B0604020202020204" pitchFamily="34" charset="0"/>
+                        <a:cs typeface="Arial" panose="020B0604020202020204" pitchFamily="34" charset="0"/>
+                      </a:endParaRPr>
                     </a:p>
                   </a:txBody>
                   <a:tcPr anchor="ctr">
@@ -5547,10 +5883,16 @@
                     <a:p>
                       <a:pPr algn="ctr"/>
                       <a:r>
-                        <a:rPr lang="en-US" sz="2200" dirty="0"/>
+                        <a:rPr lang="en-US" sz="2000" dirty="0">
+                          <a:latin typeface="Arial" panose="020B0604020202020204" pitchFamily="34" charset="0"/>
+                          <a:cs typeface="Arial" panose="020B0604020202020204" pitchFamily="34" charset="0"/>
+                        </a:rPr>
                         <a:t>Precision</a:t>
                       </a:r>
-                      <a:endParaRPr lang="da-DK" sz="2200" dirty="0"/>
+                      <a:endParaRPr lang="da-DK" sz="2000" dirty="0">
+                        <a:latin typeface="Arial" panose="020B0604020202020204" pitchFamily="34" charset="0"/>
+                        <a:cs typeface="Arial" panose="020B0604020202020204" pitchFamily="34" charset="0"/>
+                      </a:endParaRPr>
                     </a:p>
                   </a:txBody>
                   <a:tcPr anchor="ctr">
@@ -5566,10 +5908,16 @@
                     <a:p>
                       <a:pPr algn="ctr"/>
                       <a:r>
-                        <a:rPr lang="en-US" sz="2200" dirty="0"/>
+                        <a:rPr lang="en-US" sz="2000" dirty="0">
+                          <a:latin typeface="Arial" panose="020B0604020202020204" pitchFamily="34" charset="0"/>
+                          <a:cs typeface="Arial" panose="020B0604020202020204" pitchFamily="34" charset="0"/>
+                        </a:rPr>
                         <a:t>Recall</a:t>
                       </a:r>
-                      <a:endParaRPr lang="da-DK" sz="2200" dirty="0"/>
+                      <a:endParaRPr lang="da-DK" sz="2000" dirty="0">
+                        <a:latin typeface="Arial" panose="020B0604020202020204" pitchFamily="34" charset="0"/>
+                        <a:cs typeface="Arial" panose="020B0604020202020204" pitchFamily="34" charset="0"/>
+                      </a:endParaRPr>
                     </a:p>
                   </a:txBody>
                   <a:tcPr anchor="ctr">
@@ -5585,10 +5933,16 @@
                     <a:p>
                       <a:pPr algn="ctr"/>
                       <a:r>
-                        <a:rPr lang="en-US" sz="2200" dirty="0"/>
+                        <a:rPr lang="en-US" sz="2000" dirty="0">
+                          <a:latin typeface="Arial" panose="020B0604020202020204" pitchFamily="34" charset="0"/>
+                          <a:cs typeface="Arial" panose="020B0604020202020204" pitchFamily="34" charset="0"/>
+                        </a:rPr>
                         <a:t>F1</a:t>
                       </a:r>
-                      <a:endParaRPr lang="da-DK" sz="2200" dirty="0"/>
+                      <a:endParaRPr lang="da-DK" sz="2000" dirty="0">
+                        <a:latin typeface="Arial" panose="020B0604020202020204" pitchFamily="34" charset="0"/>
+                        <a:cs typeface="Arial" panose="020B0604020202020204" pitchFamily="34" charset="0"/>
+                      </a:endParaRPr>
                     </a:p>
                   </a:txBody>
                   <a:tcPr anchor="ctr">
@@ -5599,7 +5953,7 @@
                 </a:tc>
                 <a:extLst>
                   <a:ext uri="{0D108BD9-81ED-4DB2-BD59-A6C34878D82A}">
-                    <a16:rowId xmlns:a16="http://schemas.microsoft.com/office/drawing/2014/main" val="2350932793"/>
+                    <a16:rowId xmlns:a16="http://schemas.microsoft.com/office/drawing/2014/main" xmlns="" val="2350932793"/>
                   </a:ext>
                 </a:extLst>
               </a:tr>
@@ -5611,10 +5965,16 @@
                     <a:p>
                       <a:pPr algn="ctr"/>
                       <a:r>
-                        <a:rPr lang="en-US" sz="2200" dirty="0"/>
+                        <a:rPr lang="en-US" sz="2000" dirty="0">
+                          <a:latin typeface="Arial" panose="020B0604020202020204" pitchFamily="34" charset="0"/>
+                          <a:cs typeface="Arial" panose="020B0604020202020204" pitchFamily="34" charset="0"/>
+                        </a:rPr>
                         <a:t>Vanilla architecture</a:t>
                       </a:r>
-                      <a:endParaRPr lang="da-DK" sz="2200" dirty="0"/>
+                      <a:endParaRPr lang="da-DK" sz="2000" dirty="0">
+                        <a:latin typeface="Arial" panose="020B0604020202020204" pitchFamily="34" charset="0"/>
+                        <a:cs typeface="Arial" panose="020B0604020202020204" pitchFamily="34" charset="0"/>
+                      </a:endParaRPr>
                     </a:p>
                   </a:txBody>
                   <a:tcPr anchor="ctr"/>
@@ -5626,10 +5986,16 @@
                     <a:p>
                       <a:pPr algn="ctr"/>
                       <a:r>
-                        <a:rPr lang="en-US" sz="2200" dirty="0"/>
+                        <a:rPr lang="en-US" sz="2000" dirty="0">
+                          <a:latin typeface="Arial" panose="020B0604020202020204" pitchFamily="34" charset="0"/>
+                          <a:cs typeface="Arial" panose="020B0604020202020204" pitchFamily="34" charset="0"/>
+                        </a:rPr>
                         <a:t>0.82</a:t>
                       </a:r>
-                      <a:endParaRPr lang="da-DK" sz="2200" dirty="0"/>
+                      <a:endParaRPr lang="da-DK" sz="2000" dirty="0">
+                        <a:latin typeface="Arial" panose="020B0604020202020204" pitchFamily="34" charset="0"/>
+                        <a:cs typeface="Arial" panose="020B0604020202020204" pitchFamily="34" charset="0"/>
+                      </a:endParaRPr>
                     </a:p>
                   </a:txBody>
                   <a:tcPr anchor="ctr"/>
@@ -5641,10 +6007,16 @@
                     <a:p>
                       <a:pPr algn="ctr"/>
                       <a:r>
-                        <a:rPr lang="en-US" sz="2200" dirty="0"/>
+                        <a:rPr lang="en-US" sz="2000" dirty="0">
+                          <a:latin typeface="Arial" panose="020B0604020202020204" pitchFamily="34" charset="0"/>
+                          <a:cs typeface="Arial" panose="020B0604020202020204" pitchFamily="34" charset="0"/>
+                        </a:rPr>
                         <a:t>0.473</a:t>
                       </a:r>
-                      <a:endParaRPr lang="da-DK" sz="2200" dirty="0"/>
+                      <a:endParaRPr lang="da-DK" sz="2000" dirty="0">
+                        <a:latin typeface="Arial" panose="020B0604020202020204" pitchFamily="34" charset="0"/>
+                        <a:cs typeface="Arial" panose="020B0604020202020204" pitchFamily="34" charset="0"/>
+                      </a:endParaRPr>
                     </a:p>
                   </a:txBody>
                   <a:tcPr anchor="ctr"/>
@@ -5656,10 +6028,16 @@
                     <a:p>
                       <a:pPr algn="ctr"/>
                       <a:r>
-                        <a:rPr lang="en-US" sz="2200" dirty="0"/>
+                        <a:rPr lang="en-US" sz="2000" dirty="0">
+                          <a:latin typeface="Arial" panose="020B0604020202020204" pitchFamily="34" charset="0"/>
+                          <a:cs typeface="Arial" panose="020B0604020202020204" pitchFamily="34" charset="0"/>
+                        </a:rPr>
                         <a:t>0.572</a:t>
                       </a:r>
-                      <a:endParaRPr lang="da-DK" sz="2200" dirty="0"/>
+                      <a:endParaRPr lang="da-DK" sz="2000" dirty="0">
+                        <a:latin typeface="Arial" panose="020B0604020202020204" pitchFamily="34" charset="0"/>
+                        <a:cs typeface="Arial" panose="020B0604020202020204" pitchFamily="34" charset="0"/>
+                      </a:endParaRPr>
                     </a:p>
                   </a:txBody>
                   <a:tcPr anchor="ctr"/>
@@ -5671,10 +6049,16 @@
                     <a:p>
                       <a:pPr algn="ctr"/>
                       <a:r>
-                        <a:rPr lang="en-US" sz="2200" dirty="0"/>
+                        <a:rPr lang="en-US" sz="2000" dirty="0">
+                          <a:latin typeface="Arial" panose="020B0604020202020204" pitchFamily="34" charset="0"/>
+                          <a:cs typeface="Arial" panose="020B0604020202020204" pitchFamily="34" charset="0"/>
+                        </a:rPr>
                         <a:t>0.658</a:t>
                       </a:r>
-                      <a:endParaRPr lang="da-DK" sz="2200" dirty="0"/>
+                      <a:endParaRPr lang="da-DK" sz="2000" dirty="0">
+                        <a:latin typeface="Arial" panose="020B0604020202020204" pitchFamily="34" charset="0"/>
+                        <a:cs typeface="Arial" panose="020B0604020202020204" pitchFamily="34" charset="0"/>
+                      </a:endParaRPr>
                     </a:p>
                   </a:txBody>
                   <a:tcPr anchor="ctr"/>
@@ -5686,17 +6070,23 @@
                     <a:p>
                       <a:pPr algn="ctr"/>
                       <a:r>
-                        <a:rPr lang="en-US" sz="2200" dirty="0"/>
+                        <a:rPr lang="en-US" sz="2000" dirty="0">
+                          <a:latin typeface="Arial" panose="020B0604020202020204" pitchFamily="34" charset="0"/>
+                          <a:cs typeface="Arial" panose="020B0604020202020204" pitchFamily="34" charset="0"/>
+                        </a:rPr>
                         <a:t>0.612</a:t>
                       </a:r>
-                      <a:endParaRPr lang="da-DK" sz="2200" dirty="0"/>
+                      <a:endParaRPr lang="da-DK" sz="2000" dirty="0">
+                        <a:latin typeface="Arial" panose="020B0604020202020204" pitchFamily="34" charset="0"/>
+                        <a:cs typeface="Arial" panose="020B0604020202020204" pitchFamily="34" charset="0"/>
+                      </a:endParaRPr>
                     </a:p>
                   </a:txBody>
                   <a:tcPr anchor="ctr"/>
                 </a:tc>
                 <a:extLst>
                   <a:ext uri="{0D108BD9-81ED-4DB2-BD59-A6C34878D82A}">
-                    <a16:rowId xmlns:a16="http://schemas.microsoft.com/office/drawing/2014/main" val="2262440005"/>
+                    <a16:rowId xmlns:a16="http://schemas.microsoft.com/office/drawing/2014/main" xmlns="" val="2262440005"/>
                   </a:ext>
                 </a:extLst>
               </a:tr>
@@ -5708,10 +6098,16 @@
                     <a:p>
                       <a:pPr algn="ctr"/>
                       <a:r>
-                        <a:rPr lang="en-US" sz="2200" dirty="0"/>
+                        <a:rPr lang="en-US" sz="2000" dirty="0">
+                          <a:latin typeface="Arial" panose="020B0604020202020204" pitchFamily="34" charset="0"/>
+                          <a:cs typeface="Arial" panose="020B0604020202020204" pitchFamily="34" charset="0"/>
+                        </a:rPr>
                         <a:t>Improved architecture </a:t>
                       </a:r>
-                      <a:endParaRPr lang="da-DK" sz="2200" dirty="0"/>
+                      <a:endParaRPr lang="da-DK" sz="2000" dirty="0">
+                        <a:latin typeface="Arial" panose="020B0604020202020204" pitchFamily="34" charset="0"/>
+                        <a:cs typeface="Arial" panose="020B0604020202020204" pitchFamily="34" charset="0"/>
+                      </a:endParaRPr>
                     </a:p>
                   </a:txBody>
                   <a:tcPr anchor="ctr"/>
@@ -5723,10 +6119,16 @@
                     <a:p>
                       <a:pPr algn="ctr"/>
                       <a:r>
-                        <a:rPr lang="en-US" sz="2200" dirty="0"/>
+                        <a:rPr lang="en-US" sz="2000" dirty="0">
+                          <a:latin typeface="Arial" panose="020B0604020202020204" pitchFamily="34" charset="0"/>
+                          <a:cs typeface="Arial" panose="020B0604020202020204" pitchFamily="34" charset="0"/>
+                        </a:rPr>
                         <a:t>0.86</a:t>
                       </a:r>
-                      <a:endParaRPr lang="da-DK" sz="2200" dirty="0"/>
+                      <a:endParaRPr lang="da-DK" sz="2000" dirty="0">
+                        <a:latin typeface="Arial" panose="020B0604020202020204" pitchFamily="34" charset="0"/>
+                        <a:cs typeface="Arial" panose="020B0604020202020204" pitchFamily="34" charset="0"/>
+                      </a:endParaRPr>
                     </a:p>
                   </a:txBody>
                   <a:tcPr anchor="ctr"/>
@@ -5738,10 +6140,16 @@
                     <a:p>
                       <a:pPr algn="ctr"/>
                       <a:r>
-                        <a:rPr lang="en-US" sz="2200" dirty="0"/>
+                        <a:rPr lang="en-US" sz="2000" dirty="0">
+                          <a:latin typeface="Arial" panose="020B0604020202020204" pitchFamily="34" charset="0"/>
+                          <a:cs typeface="Arial" panose="020B0604020202020204" pitchFamily="34" charset="0"/>
+                        </a:rPr>
                         <a:t>0.452</a:t>
                       </a:r>
-                      <a:endParaRPr lang="da-DK" sz="2200" dirty="0"/>
+                      <a:endParaRPr lang="da-DK" sz="2000" dirty="0">
+                        <a:latin typeface="Arial" panose="020B0604020202020204" pitchFamily="34" charset="0"/>
+                        <a:cs typeface="Arial" panose="020B0604020202020204" pitchFamily="34" charset="0"/>
+                      </a:endParaRPr>
                     </a:p>
                   </a:txBody>
                   <a:tcPr anchor="ctr"/>
@@ -5753,10 +6161,16 @@
                     <a:p>
                       <a:pPr algn="ctr"/>
                       <a:r>
-                        <a:rPr lang="en-US" sz="2200" dirty="0"/>
+                        <a:rPr lang="en-US" sz="2000" dirty="0">
+                          <a:latin typeface="Arial" panose="020B0604020202020204" pitchFamily="34" charset="0"/>
+                          <a:cs typeface="Arial" panose="020B0604020202020204" pitchFamily="34" charset="0"/>
+                        </a:rPr>
                         <a:t>0.468</a:t>
                       </a:r>
-                      <a:endParaRPr lang="da-DK" sz="2200" dirty="0"/>
+                      <a:endParaRPr lang="da-DK" sz="2000" dirty="0">
+                        <a:latin typeface="Arial" panose="020B0604020202020204" pitchFamily="34" charset="0"/>
+                        <a:cs typeface="Arial" panose="020B0604020202020204" pitchFamily="34" charset="0"/>
+                      </a:endParaRPr>
                     </a:p>
                   </a:txBody>
                   <a:tcPr anchor="ctr"/>
@@ -5768,10 +6182,16 @@
                     <a:p>
                       <a:pPr algn="ctr"/>
                       <a:r>
-                        <a:rPr lang="en-US" sz="2200" dirty="0"/>
+                        <a:rPr lang="en-US" sz="2000" dirty="0">
+                          <a:latin typeface="Arial" panose="020B0604020202020204" pitchFamily="34" charset="0"/>
+                          <a:cs typeface="Arial" panose="020B0604020202020204" pitchFamily="34" charset="0"/>
+                        </a:rPr>
                         <a:t>0.833</a:t>
                       </a:r>
-                      <a:endParaRPr lang="da-DK" sz="2200" dirty="0"/>
+                      <a:endParaRPr lang="da-DK" sz="2000" dirty="0">
+                        <a:latin typeface="Arial" panose="020B0604020202020204" pitchFamily="34" charset="0"/>
+                        <a:cs typeface="Arial" panose="020B0604020202020204" pitchFamily="34" charset="0"/>
+                      </a:endParaRPr>
                     </a:p>
                   </a:txBody>
                   <a:tcPr anchor="ctr"/>
@@ -5783,17 +6203,23 @@
                     <a:p>
                       <a:pPr algn="ctr"/>
                       <a:r>
-                        <a:rPr lang="en-US" sz="2200" dirty="0"/>
+                        <a:rPr lang="en-US" sz="2000" dirty="0">
+                          <a:latin typeface="Arial" panose="020B0604020202020204" pitchFamily="34" charset="0"/>
+                          <a:cs typeface="Arial" panose="020B0604020202020204" pitchFamily="34" charset="0"/>
+                        </a:rPr>
                         <a:t>0.600</a:t>
                       </a:r>
-                      <a:endParaRPr lang="da-DK" sz="2200" dirty="0"/>
+                      <a:endParaRPr lang="da-DK" sz="2000" dirty="0">
+                        <a:latin typeface="Arial" panose="020B0604020202020204" pitchFamily="34" charset="0"/>
+                        <a:cs typeface="Arial" panose="020B0604020202020204" pitchFamily="34" charset="0"/>
+                      </a:endParaRPr>
                     </a:p>
                   </a:txBody>
                   <a:tcPr anchor="ctr"/>
                 </a:tc>
                 <a:extLst>
                   <a:ext uri="{0D108BD9-81ED-4DB2-BD59-A6C34878D82A}">
-                    <a16:rowId xmlns:a16="http://schemas.microsoft.com/office/drawing/2014/main" val="3805626318"/>
+                    <a16:rowId xmlns:a16="http://schemas.microsoft.com/office/drawing/2014/main" xmlns="" val="3805626318"/>
                   </a:ext>
                 </a:extLst>
               </a:tr>
@@ -5805,10 +6231,16 @@
                     <a:p>
                       <a:pPr algn="ctr"/>
                       <a:r>
-                        <a:rPr lang="en-US" sz="2200" dirty="0"/>
+                        <a:rPr lang="en-US" sz="2000" dirty="0">
+                          <a:latin typeface="Arial" panose="020B0604020202020204" pitchFamily="34" charset="0"/>
+                          <a:cs typeface="Arial" panose="020B0604020202020204" pitchFamily="34" charset="0"/>
+                        </a:rPr>
                         <a:t>Improved architecture with BLOSUM encoding</a:t>
                       </a:r>
-                      <a:endParaRPr lang="da-DK" sz="2200" dirty="0"/>
+                      <a:endParaRPr lang="da-DK" sz="2000" dirty="0">
+                        <a:latin typeface="Arial" panose="020B0604020202020204" pitchFamily="34" charset="0"/>
+                        <a:cs typeface="Arial" panose="020B0604020202020204" pitchFamily="34" charset="0"/>
+                      </a:endParaRPr>
                     </a:p>
                   </a:txBody>
                   <a:tcPr anchor="ctr"/>
@@ -5820,10 +6252,16 @@
                     <a:p>
                       <a:pPr algn="ctr"/>
                       <a:r>
-                        <a:rPr lang="en-US" sz="2200" dirty="0"/>
+                        <a:rPr lang="en-US" sz="2000" dirty="0">
+                          <a:latin typeface="Arial" panose="020B0604020202020204" pitchFamily="34" charset="0"/>
+                          <a:cs typeface="Arial" panose="020B0604020202020204" pitchFamily="34" charset="0"/>
+                        </a:rPr>
                         <a:t>0.88</a:t>
                       </a:r>
-                      <a:endParaRPr lang="da-DK" sz="2200" dirty="0"/>
+                      <a:endParaRPr lang="da-DK" sz="2000" dirty="0">
+                        <a:latin typeface="Arial" panose="020B0604020202020204" pitchFamily="34" charset="0"/>
+                        <a:cs typeface="Arial" panose="020B0604020202020204" pitchFamily="34" charset="0"/>
+                      </a:endParaRPr>
                     </a:p>
                   </a:txBody>
                   <a:tcPr anchor="ctr"/>
@@ -5835,10 +6273,16 @@
                     <a:p>
                       <a:pPr algn="ctr"/>
                       <a:r>
-                        <a:rPr lang="en-US" sz="2200" dirty="0"/>
+                        <a:rPr lang="en-US" sz="2000" dirty="0">
+                          <a:latin typeface="Arial" panose="020B0604020202020204" pitchFamily="34" charset="0"/>
+                          <a:cs typeface="Arial" panose="020B0604020202020204" pitchFamily="34" charset="0"/>
+                        </a:rPr>
                         <a:t>0.568</a:t>
                       </a:r>
-                      <a:endParaRPr lang="da-DK" sz="2200" dirty="0"/>
+                      <a:endParaRPr lang="da-DK" sz="2000" dirty="0">
+                        <a:latin typeface="Arial" panose="020B0604020202020204" pitchFamily="34" charset="0"/>
+                        <a:cs typeface="Arial" panose="020B0604020202020204" pitchFamily="34" charset="0"/>
+                      </a:endParaRPr>
                     </a:p>
                   </a:txBody>
                   <a:tcPr anchor="ctr"/>
@@ -5850,10 +6294,16 @@
                     <a:p>
                       <a:pPr algn="ctr"/>
                       <a:r>
-                        <a:rPr lang="en-US" sz="2200" dirty="0"/>
+                        <a:rPr lang="en-US" sz="2000" dirty="0">
+                          <a:latin typeface="Arial" panose="020B0604020202020204" pitchFamily="34" charset="0"/>
+                          <a:cs typeface="Arial" panose="020B0604020202020204" pitchFamily="34" charset="0"/>
+                        </a:rPr>
                         <a:t>0.632</a:t>
                       </a:r>
-                      <a:endParaRPr lang="da-DK" sz="2200" dirty="0"/>
+                      <a:endParaRPr lang="da-DK" sz="2000" dirty="0">
+                        <a:latin typeface="Arial" panose="020B0604020202020204" pitchFamily="34" charset="0"/>
+                        <a:cs typeface="Arial" panose="020B0604020202020204" pitchFamily="34" charset="0"/>
+                      </a:endParaRPr>
                     </a:p>
                   </a:txBody>
                   <a:tcPr anchor="ctr"/>
@@ -5865,10 +6315,16 @@
                     <a:p>
                       <a:pPr algn="ctr"/>
                       <a:r>
-                        <a:rPr lang="en-US" sz="2200" dirty="0"/>
+                        <a:rPr lang="en-US" sz="2000" dirty="0">
+                          <a:latin typeface="Arial" panose="020B0604020202020204" pitchFamily="34" charset="0"/>
+                          <a:cs typeface="Arial" panose="020B0604020202020204" pitchFamily="34" charset="0"/>
+                        </a:rPr>
                         <a:t>0.741</a:t>
                       </a:r>
-                      <a:endParaRPr lang="da-DK" sz="2200" dirty="0"/>
+                      <a:endParaRPr lang="da-DK" sz="2000" dirty="0">
+                        <a:latin typeface="Arial" panose="020B0604020202020204" pitchFamily="34" charset="0"/>
+                        <a:cs typeface="Arial" panose="020B0604020202020204" pitchFamily="34" charset="0"/>
+                      </a:endParaRPr>
                     </a:p>
                   </a:txBody>
                   <a:tcPr anchor="ctr"/>
@@ -5880,17 +6336,23 @@
                     <a:p>
                       <a:pPr algn="ctr"/>
                       <a:r>
-                        <a:rPr lang="en-US" sz="2200" dirty="0"/>
+                        <a:rPr lang="en-US" sz="2000" dirty="0">
+                          <a:latin typeface="Arial" panose="020B0604020202020204" pitchFamily="34" charset="0"/>
+                          <a:cs typeface="Arial" panose="020B0604020202020204" pitchFamily="34" charset="0"/>
+                        </a:rPr>
                         <a:t>0.682</a:t>
                       </a:r>
-                      <a:endParaRPr lang="da-DK" sz="2200" dirty="0"/>
+                      <a:endParaRPr lang="da-DK" sz="2000" dirty="0">
+                        <a:latin typeface="Arial" panose="020B0604020202020204" pitchFamily="34" charset="0"/>
+                        <a:cs typeface="Arial" panose="020B0604020202020204" pitchFamily="34" charset="0"/>
+                      </a:endParaRPr>
                     </a:p>
                   </a:txBody>
                   <a:tcPr anchor="ctr"/>
                 </a:tc>
                 <a:extLst>
                   <a:ext uri="{0D108BD9-81ED-4DB2-BD59-A6C34878D82A}">
-                    <a16:rowId xmlns:a16="http://schemas.microsoft.com/office/drawing/2014/main" val="3022607923"/>
+                    <a16:rowId xmlns:a16="http://schemas.microsoft.com/office/drawing/2014/main" xmlns="" val="3022607923"/>
                   </a:ext>
                 </a:extLst>
               </a:tr>
@@ -5902,10 +6364,16 @@
                     <a:p>
                       <a:pPr algn="ctr"/>
                       <a:r>
-                        <a:rPr lang="en-US" sz="2200" dirty="0"/>
+                        <a:rPr lang="en-US" sz="2000" dirty="0">
+                          <a:latin typeface="Arial" panose="020B0604020202020204" pitchFamily="34" charset="0"/>
+                          <a:cs typeface="Arial" panose="020B0604020202020204" pitchFamily="34" charset="0"/>
+                        </a:rPr>
                         <a:t>Improved architecture with ESM encoding</a:t>
                       </a:r>
-                      <a:endParaRPr lang="da-DK" sz="2200" dirty="0"/>
+                      <a:endParaRPr lang="da-DK" sz="2000" dirty="0">
+                        <a:latin typeface="Arial" panose="020B0604020202020204" pitchFamily="34" charset="0"/>
+                        <a:cs typeface="Arial" panose="020B0604020202020204" pitchFamily="34" charset="0"/>
+                      </a:endParaRPr>
                     </a:p>
                   </a:txBody>
                   <a:tcPr anchor="ctr"/>
@@ -5917,10 +6385,16 @@
                     <a:p>
                       <a:pPr algn="ctr"/>
                       <a:r>
-                        <a:rPr lang="en-US" sz="2200" dirty="0"/>
+                        <a:rPr lang="en-US" sz="2000" dirty="0">
+                          <a:latin typeface="Arial" panose="020B0604020202020204" pitchFamily="34" charset="0"/>
+                          <a:cs typeface="Arial" panose="020B0604020202020204" pitchFamily="34" charset="0"/>
+                        </a:rPr>
                         <a:t>0.9</a:t>
                       </a:r>
-                      <a:endParaRPr lang="da-DK" sz="2200" dirty="0"/>
+                      <a:endParaRPr lang="da-DK" sz="2000" dirty="0">
+                        <a:latin typeface="Arial" panose="020B0604020202020204" pitchFamily="34" charset="0"/>
+                        <a:cs typeface="Arial" panose="020B0604020202020204" pitchFamily="34" charset="0"/>
+                      </a:endParaRPr>
                     </a:p>
                   </a:txBody>
                   <a:tcPr anchor="ctr"/>
@@ -5932,10 +6406,16 @@
                     <a:p>
                       <a:pPr algn="ctr"/>
                       <a:r>
-                        <a:rPr lang="en-US" sz="2200" dirty="0"/>
+                        <a:rPr lang="en-US" sz="2000" dirty="0">
+                          <a:latin typeface="Arial" panose="020B0604020202020204" pitchFamily="34" charset="0"/>
+                          <a:cs typeface="Arial" panose="020B0604020202020204" pitchFamily="34" charset="0"/>
+                        </a:rPr>
                         <a:t>0.612</a:t>
                       </a:r>
-                      <a:endParaRPr lang="da-DK" sz="2200" dirty="0"/>
+                      <a:endParaRPr lang="da-DK" sz="2000" dirty="0">
+                        <a:latin typeface="Arial" panose="020B0604020202020204" pitchFamily="34" charset="0"/>
+                        <a:cs typeface="Arial" panose="020B0604020202020204" pitchFamily="34" charset="0"/>
+                      </a:endParaRPr>
                     </a:p>
                   </a:txBody>
                   <a:tcPr anchor="ctr"/>
@@ -5947,10 +6427,16 @@
                     <a:p>
                       <a:pPr algn="ctr"/>
                       <a:r>
-                        <a:rPr lang="en-US" sz="2200" dirty="0"/>
+                        <a:rPr lang="en-US" sz="2000" dirty="0">
+                          <a:latin typeface="Arial" panose="020B0604020202020204" pitchFamily="34" charset="0"/>
+                          <a:cs typeface="Arial" panose="020B0604020202020204" pitchFamily="34" charset="0"/>
+                        </a:rPr>
                         <a:t>0.676</a:t>
                       </a:r>
-                      <a:endParaRPr lang="da-DK" sz="2200" dirty="0"/>
+                      <a:endParaRPr lang="da-DK" sz="2000" dirty="0">
+                        <a:latin typeface="Arial" panose="020B0604020202020204" pitchFamily="34" charset="0"/>
+                        <a:cs typeface="Arial" panose="020B0604020202020204" pitchFamily="34" charset="0"/>
+                      </a:endParaRPr>
                     </a:p>
                   </a:txBody>
                   <a:tcPr anchor="ctr"/>
@@ -5962,10 +6448,16 @@
                     <a:p>
                       <a:pPr algn="ctr"/>
                       <a:r>
-                        <a:rPr lang="en-US" sz="2200" dirty="0"/>
+                        <a:rPr lang="en-US" sz="2000" dirty="0">
+                          <a:latin typeface="Arial" panose="020B0604020202020204" pitchFamily="34" charset="0"/>
+                          <a:cs typeface="Arial" panose="020B0604020202020204" pitchFamily="34" charset="0"/>
+                        </a:rPr>
                         <a:t>0.753</a:t>
                       </a:r>
-                      <a:endParaRPr lang="da-DK" sz="2200" dirty="0"/>
+                      <a:endParaRPr lang="da-DK" sz="2000" dirty="0">
+                        <a:latin typeface="Arial" panose="020B0604020202020204" pitchFamily="34" charset="0"/>
+                        <a:cs typeface="Arial" panose="020B0604020202020204" pitchFamily="34" charset="0"/>
+                      </a:endParaRPr>
                     </a:p>
                   </a:txBody>
                   <a:tcPr anchor="ctr"/>
@@ -5977,17 +6469,23 @@
                     <a:p>
                       <a:pPr algn="ctr"/>
                       <a:r>
-                        <a:rPr lang="en-US" sz="2200" dirty="0"/>
+                        <a:rPr lang="en-US" sz="2000" dirty="0">
+                          <a:latin typeface="Arial" panose="020B0604020202020204" pitchFamily="34" charset="0"/>
+                          <a:cs typeface="Arial" panose="020B0604020202020204" pitchFamily="34" charset="0"/>
+                        </a:rPr>
                         <a:t>0.712</a:t>
                       </a:r>
-                      <a:endParaRPr lang="da-DK" sz="2200" dirty="0"/>
+                      <a:endParaRPr lang="da-DK" sz="2000" dirty="0">
+                        <a:latin typeface="Arial" panose="020B0604020202020204" pitchFamily="34" charset="0"/>
+                        <a:cs typeface="Arial" panose="020B0604020202020204" pitchFamily="34" charset="0"/>
+                      </a:endParaRPr>
                     </a:p>
                   </a:txBody>
                   <a:tcPr anchor="ctr"/>
                 </a:tc>
                 <a:extLst>
                   <a:ext uri="{0D108BD9-81ED-4DB2-BD59-A6C34878D82A}">
-                    <a16:rowId xmlns:a16="http://schemas.microsoft.com/office/drawing/2014/main" val="73323118"/>
+                    <a16:rowId xmlns:a16="http://schemas.microsoft.com/office/drawing/2014/main" xmlns="" val="73323118"/>
                   </a:ext>
                 </a:extLst>
               </a:tr>
@@ -6005,6 +6503,13 @@
   <p:clrMapOvr>
     <a:masterClrMapping/>
   </p:clrMapOvr>
+  <p:timing>
+    <p:tnLst>
+      <p:par>
+        <p:cTn id="1" dur="indefinite" restart="never" nodeType="tmRoot"/>
+      </p:par>
+    </p:tnLst>
+  </p:timing>
 </p:sld>
 </file>
 
@@ -6565,9 +7070,12 @@
 </file>
 
 <file path=customXml/item1.xml><?xml version="1.0" encoding="utf-8"?>
-<p:properties xmlns:p="http://schemas.microsoft.com/office/2006/metadata/properties" xmlns:xsi="http://www.w3.org/2001/XMLSchema-instance" xmlns:pc="http://schemas.microsoft.com/office/infopath/2007/PartnerControls">
-  <documentManagement/>
-</p:properties>
+<?mso-contentType ?>
+<FormTemplates xmlns="http://schemas.microsoft.com/sharepoint/v3/contenttype/forms">
+  <Display>DocumentLibraryForm</Display>
+  <Edit>DocumentLibraryForm</Edit>
+  <New>DocumentLibraryForm</New>
+</FormTemplates>
 </file>
 
 <file path=customXml/item2.xml><?xml version="1.0" encoding="utf-8"?>
@@ -6703,19 +7211,15 @@
 </file>
 
 <file path=customXml/item3.xml><?xml version="1.0" encoding="utf-8"?>
-<?mso-contentType ?>
-<FormTemplates xmlns="http://schemas.microsoft.com/sharepoint/v3/contenttype/forms">
-  <Display>DocumentLibraryForm</Display>
-  <Edit>DocumentLibraryForm</Edit>
-  <New>DocumentLibraryForm</New>
-</FormTemplates>
+<p:properties xmlns:p="http://schemas.microsoft.com/office/2006/metadata/properties" xmlns:xsi="http://www.w3.org/2001/XMLSchema-instance" xmlns:pc="http://schemas.microsoft.com/office/infopath/2007/PartnerControls">
+  <documentManagement/>
+</p:properties>
 </file>
 
 <file path=customXml/itemProps1.xml><?xml version="1.0" encoding="utf-8"?>
-<ds:datastoreItem xmlns:ds="http://schemas.openxmlformats.org/officeDocument/2006/customXml" ds:itemID="{CB370A3C-731B-4F4D-ABD0-42474AC25910}">
+<ds:datastoreItem xmlns:ds="http://schemas.openxmlformats.org/officeDocument/2006/customXml" ds:itemID="{405562AF-484A-42F9-A02C-A3F5AD59D6C1}">
   <ds:schemaRefs>
-    <ds:schemaRef ds:uri="http://schemas.microsoft.com/office/2006/metadata/properties"/>
-    <ds:schemaRef ds:uri="http://schemas.microsoft.com/office/infopath/2007/PartnerControls"/>
+    <ds:schemaRef ds:uri="http://schemas.microsoft.com/sharepoint/v3/contenttype/forms"/>
   </ds:schemaRefs>
 </ds:datastoreItem>
 </file>
@@ -6739,9 +7243,10 @@
 </file>
 
 <file path=customXml/itemProps3.xml><?xml version="1.0" encoding="utf-8"?>
-<ds:datastoreItem xmlns:ds="http://schemas.openxmlformats.org/officeDocument/2006/customXml" ds:itemID="{405562AF-484A-42F9-A02C-A3F5AD59D6C1}">
+<ds:datastoreItem xmlns:ds="http://schemas.openxmlformats.org/officeDocument/2006/customXml" ds:itemID="{CB370A3C-731B-4F4D-ABD0-42474AC25910}">
   <ds:schemaRefs>
-    <ds:schemaRef ds:uri="http://schemas.microsoft.com/sharepoint/v3/contenttype/forms"/>
+    <ds:schemaRef ds:uri="http://schemas.microsoft.com/office/2006/metadata/properties"/>
+    <ds:schemaRef ds:uri="http://schemas.microsoft.com/office/infopath/2007/PartnerControls"/>
   </ds:schemaRefs>
 </ds:datastoreItem>
 </file>
</xml_diff>

<commit_message>
Changed wording on BLOSSUM explanation
</commit_message>
<xml_diff>
--- a/presentation/presentation.pptx
+++ b/presentation/presentation.pptx
@@ -349,7 +349,7 @@
           <a:p>
             <a:fld id="{C6F05EAB-B404-4249-9B6E-2AB49D341D90}" type="datetimeFigureOut">
               <a:rPr lang="aa-ET" smtClean="0"/>
-              <a:t>01/12/2021</a:t>
+              <a:t>12/2/21</a:t>
             </a:fld>
             <a:endParaRPr lang="aa-ET"/>
           </a:p>
@@ -508,7 +508,7 @@
           <a:p>
             <a:fld id="{CC384317-2FF9-C745-838D-094DFBA5C4CC}" type="slidenum">
               <a:rPr lang="aa-ET" smtClean="0"/>
-              <a:t>‹N°›</a:t>
+              <a:t>‹#›</a:t>
             </a:fld>
             <a:endParaRPr lang="aa-ET"/>
           </a:p>
@@ -818,7 +818,7 @@
           <a:p>
             <a:fld id="{C1520061-EEF2-4648-A61C-FD1D344FB2F0}" type="datetimeFigureOut">
               <a:rPr lang="aa-ET" smtClean="0"/>
-              <a:t>01/12/2021</a:t>
+              <a:t>12/2/21</a:t>
             </a:fld>
             <a:endParaRPr lang="aa-ET"/>
           </a:p>
@@ -860,7 +860,7 @@
           <a:p>
             <a:fld id="{FDB24838-7C19-CC4E-B2E6-66E840BA735D}" type="slidenum">
               <a:rPr lang="aa-ET" smtClean="0"/>
-              <a:t>‹N°›</a:t>
+              <a:t>‹#›</a:t>
             </a:fld>
             <a:endParaRPr lang="aa-ET"/>
           </a:p>
@@ -988,7 +988,7 @@
           <a:p>
             <a:fld id="{C1520061-EEF2-4648-A61C-FD1D344FB2F0}" type="datetimeFigureOut">
               <a:rPr lang="aa-ET" smtClean="0"/>
-              <a:t>01/12/2021</a:t>
+              <a:t>12/2/21</a:t>
             </a:fld>
             <a:endParaRPr lang="aa-ET"/>
           </a:p>
@@ -1030,7 +1030,7 @@
           <a:p>
             <a:fld id="{FDB24838-7C19-CC4E-B2E6-66E840BA735D}" type="slidenum">
               <a:rPr lang="aa-ET" smtClean="0"/>
-              <a:t>‹N°›</a:t>
+              <a:t>‹#›</a:t>
             </a:fld>
             <a:endParaRPr lang="aa-ET"/>
           </a:p>
@@ -1168,7 +1168,7 @@
           <a:p>
             <a:fld id="{C1520061-EEF2-4648-A61C-FD1D344FB2F0}" type="datetimeFigureOut">
               <a:rPr lang="aa-ET" smtClean="0"/>
-              <a:t>01/12/2021</a:t>
+              <a:t>12/2/21</a:t>
             </a:fld>
             <a:endParaRPr lang="aa-ET"/>
           </a:p>
@@ -1210,7 +1210,7 @@
           <a:p>
             <a:fld id="{FDB24838-7C19-CC4E-B2E6-66E840BA735D}" type="slidenum">
               <a:rPr lang="aa-ET" smtClean="0"/>
-              <a:t>‹N°›</a:t>
+              <a:t>‹#›</a:t>
             </a:fld>
             <a:endParaRPr lang="aa-ET"/>
           </a:p>
@@ -1338,7 +1338,7 @@
           <a:p>
             <a:fld id="{C1520061-EEF2-4648-A61C-FD1D344FB2F0}" type="datetimeFigureOut">
               <a:rPr lang="aa-ET" smtClean="0"/>
-              <a:t>01/12/2021</a:t>
+              <a:t>12/2/21</a:t>
             </a:fld>
             <a:endParaRPr lang="aa-ET"/>
           </a:p>
@@ -1380,7 +1380,7 @@
           <a:p>
             <a:fld id="{FDB24838-7C19-CC4E-B2E6-66E840BA735D}" type="slidenum">
               <a:rPr lang="aa-ET" smtClean="0"/>
-              <a:t>‹N°›</a:t>
+              <a:t>‹#›</a:t>
             </a:fld>
             <a:endParaRPr lang="aa-ET"/>
           </a:p>
@@ -1582,7 +1582,7 @@
           <a:p>
             <a:fld id="{C1520061-EEF2-4648-A61C-FD1D344FB2F0}" type="datetimeFigureOut">
               <a:rPr lang="aa-ET" smtClean="0"/>
-              <a:t>01/12/2021</a:t>
+              <a:t>12/2/21</a:t>
             </a:fld>
             <a:endParaRPr lang="aa-ET"/>
           </a:p>
@@ -1624,7 +1624,7 @@
           <a:p>
             <a:fld id="{FDB24838-7C19-CC4E-B2E6-66E840BA735D}" type="slidenum">
               <a:rPr lang="aa-ET" smtClean="0"/>
-              <a:t>‹N°›</a:t>
+              <a:t>‹#›</a:t>
             </a:fld>
             <a:endParaRPr lang="aa-ET"/>
           </a:p>
@@ -1814,7 +1814,7 @@
           <a:p>
             <a:fld id="{C1520061-EEF2-4648-A61C-FD1D344FB2F0}" type="datetimeFigureOut">
               <a:rPr lang="aa-ET" smtClean="0"/>
-              <a:t>01/12/2021</a:t>
+              <a:t>12/2/21</a:t>
             </a:fld>
             <a:endParaRPr lang="aa-ET"/>
           </a:p>
@@ -1856,7 +1856,7 @@
           <a:p>
             <a:fld id="{FDB24838-7C19-CC4E-B2E6-66E840BA735D}" type="slidenum">
               <a:rPr lang="aa-ET" smtClean="0"/>
-              <a:t>‹N°›</a:t>
+              <a:t>‹#›</a:t>
             </a:fld>
             <a:endParaRPr lang="aa-ET"/>
           </a:p>
@@ -2181,7 +2181,7 @@
           <a:p>
             <a:fld id="{C1520061-EEF2-4648-A61C-FD1D344FB2F0}" type="datetimeFigureOut">
               <a:rPr lang="aa-ET" smtClean="0"/>
-              <a:t>01/12/2021</a:t>
+              <a:t>12/2/21</a:t>
             </a:fld>
             <a:endParaRPr lang="aa-ET"/>
           </a:p>
@@ -2223,7 +2223,7 @@
           <a:p>
             <a:fld id="{FDB24838-7C19-CC4E-B2E6-66E840BA735D}" type="slidenum">
               <a:rPr lang="aa-ET" smtClean="0"/>
-              <a:t>‹N°›</a:t>
+              <a:t>‹#›</a:t>
             </a:fld>
             <a:endParaRPr lang="aa-ET"/>
           </a:p>
@@ -2299,7 +2299,7 @@
           <a:p>
             <a:fld id="{C1520061-EEF2-4648-A61C-FD1D344FB2F0}" type="datetimeFigureOut">
               <a:rPr lang="aa-ET" smtClean="0"/>
-              <a:t>01/12/2021</a:t>
+              <a:t>12/2/21</a:t>
             </a:fld>
             <a:endParaRPr lang="aa-ET"/>
           </a:p>
@@ -2341,7 +2341,7 @@
           <a:p>
             <a:fld id="{FDB24838-7C19-CC4E-B2E6-66E840BA735D}" type="slidenum">
               <a:rPr lang="aa-ET" smtClean="0"/>
-              <a:t>‹N°›</a:t>
+              <a:t>‹#›</a:t>
             </a:fld>
             <a:endParaRPr lang="aa-ET"/>
           </a:p>
@@ -2394,7 +2394,7 @@
           <a:p>
             <a:fld id="{C1520061-EEF2-4648-A61C-FD1D344FB2F0}" type="datetimeFigureOut">
               <a:rPr lang="aa-ET" smtClean="0"/>
-              <a:t>01/12/2021</a:t>
+              <a:t>12/2/21</a:t>
             </a:fld>
             <a:endParaRPr lang="aa-ET"/>
           </a:p>
@@ -2436,7 +2436,7 @@
           <a:p>
             <a:fld id="{FDB24838-7C19-CC4E-B2E6-66E840BA735D}" type="slidenum">
               <a:rPr lang="aa-ET" smtClean="0"/>
-              <a:t>‹N°›</a:t>
+              <a:t>‹#›</a:t>
             </a:fld>
             <a:endParaRPr lang="aa-ET"/>
           </a:p>
@@ -2671,7 +2671,7 @@
           <a:p>
             <a:fld id="{C1520061-EEF2-4648-A61C-FD1D344FB2F0}" type="datetimeFigureOut">
               <a:rPr lang="aa-ET" smtClean="0"/>
-              <a:t>01/12/2021</a:t>
+              <a:t>12/2/21</a:t>
             </a:fld>
             <a:endParaRPr lang="aa-ET"/>
           </a:p>
@@ -2713,7 +2713,7 @@
           <a:p>
             <a:fld id="{FDB24838-7C19-CC4E-B2E6-66E840BA735D}" type="slidenum">
               <a:rPr lang="aa-ET" smtClean="0"/>
-              <a:t>‹N°›</a:t>
+              <a:t>‹#›</a:t>
             </a:fld>
             <a:endParaRPr lang="aa-ET"/>
           </a:p>
@@ -2928,7 +2928,7 @@
           <a:p>
             <a:fld id="{C1520061-EEF2-4648-A61C-FD1D344FB2F0}" type="datetimeFigureOut">
               <a:rPr lang="aa-ET" smtClean="0"/>
-              <a:t>01/12/2021</a:t>
+              <a:t>12/2/21</a:t>
             </a:fld>
             <a:endParaRPr lang="aa-ET"/>
           </a:p>
@@ -2970,7 +2970,7 @@
           <a:p>
             <a:fld id="{FDB24838-7C19-CC4E-B2E6-66E840BA735D}" type="slidenum">
               <a:rPr lang="aa-ET" smtClean="0"/>
-              <a:t>‹N°›</a:t>
+              <a:t>‹#›</a:t>
             </a:fld>
             <a:endParaRPr lang="aa-ET"/>
           </a:p>
@@ -3141,7 +3141,7 @@
           <a:p>
             <a:fld id="{C1520061-EEF2-4648-A61C-FD1D344FB2F0}" type="datetimeFigureOut">
               <a:rPr lang="aa-ET" smtClean="0"/>
-              <a:t>01/12/2021</a:t>
+              <a:t>12/2/21</a:t>
             </a:fld>
             <a:endParaRPr lang="aa-ET"/>
           </a:p>
@@ -3219,7 +3219,7 @@
           <a:p>
             <a:fld id="{FDB24838-7C19-CC4E-B2E6-66E840BA735D}" type="slidenum">
               <a:rPr lang="aa-ET" smtClean="0"/>
-              <a:t>‹N°›</a:t>
+              <a:t>‹#›</a:t>
             </a:fld>
             <a:endParaRPr lang="aa-ET"/>
           </a:p>
@@ -3816,7 +3816,7 @@
           <p:cNvPr id="24" name="Straight Connector 23">
             <a:extLst>
               <a:ext uri="{FF2B5EF4-FFF2-40B4-BE49-F238E27FC236}">
-                <a16:creationId xmlns:a16="http://schemas.microsoft.com/office/drawing/2014/main" xmlns="" id="{3CD061AB-8876-704F-BE6A-E397F33852E1}"/>
+                <a16:creationId xmlns:a16="http://schemas.microsoft.com/office/drawing/2014/main" id="{3CD061AB-8876-704F-BE6A-E397F33852E1}"/>
               </a:ext>
             </a:extLst>
           </p:cNvPr>
@@ -3859,7 +3859,7 @@
           <p:cNvPr id="128" name="Round Same Side Corner Rectangle 137">
             <a:extLst>
               <a:ext uri="{FF2B5EF4-FFF2-40B4-BE49-F238E27FC236}">
-                <a16:creationId xmlns:a16="http://schemas.microsoft.com/office/drawing/2014/main" xmlns="" id="{85003210-220B-9A49-8091-B1A85DD76CE8}"/>
+                <a16:creationId xmlns:a16="http://schemas.microsoft.com/office/drawing/2014/main" id="{85003210-220B-9A49-8091-B1A85DD76CE8}"/>
               </a:ext>
             </a:extLst>
           </p:cNvPr>
@@ -3923,7 +3923,7 @@
           <p:cNvPr id="129" name="Round Same Side Corner Rectangle 137">
             <a:extLst>
               <a:ext uri="{FF2B5EF4-FFF2-40B4-BE49-F238E27FC236}">
-                <a16:creationId xmlns:a16="http://schemas.microsoft.com/office/drawing/2014/main" xmlns="" id="{7226A277-A8A7-9549-8FCF-1175CB0CE7B6}"/>
+                <a16:creationId xmlns:a16="http://schemas.microsoft.com/office/drawing/2014/main" id="{7226A277-A8A7-9549-8FCF-1175CB0CE7B6}"/>
               </a:ext>
             </a:extLst>
           </p:cNvPr>
@@ -3987,7 +3987,7 @@
           <p:cNvPr id="130" name="Round Same Side Corner Rectangle 137">
             <a:extLst>
               <a:ext uri="{FF2B5EF4-FFF2-40B4-BE49-F238E27FC236}">
-                <a16:creationId xmlns:a16="http://schemas.microsoft.com/office/drawing/2014/main" xmlns="" id="{0D73ACE7-C686-234D-9978-B3229B92843A}"/>
+                <a16:creationId xmlns:a16="http://schemas.microsoft.com/office/drawing/2014/main" id="{0D73ACE7-C686-234D-9978-B3229B92843A}"/>
               </a:ext>
             </a:extLst>
           </p:cNvPr>
@@ -4051,7 +4051,7 @@
           <p:cNvPr id="91" name="TextBox 90">
             <a:extLst>
               <a:ext uri="{FF2B5EF4-FFF2-40B4-BE49-F238E27FC236}">
-                <a16:creationId xmlns:a16="http://schemas.microsoft.com/office/drawing/2014/main" xmlns="" id="{CE8C58B8-C0BC-CE41-9C20-5C588C41F47C}"/>
+                <a16:creationId xmlns:a16="http://schemas.microsoft.com/office/drawing/2014/main" id="{CE8C58B8-C0BC-CE41-9C20-5C588C41F47C}"/>
               </a:ext>
             </a:extLst>
           </p:cNvPr>
@@ -4120,7 +4120,7 @@
           <p:cNvPr id="3" name="Billede 6">
             <a:extLst>
               <a:ext uri="{FF2B5EF4-FFF2-40B4-BE49-F238E27FC236}">
-                <a16:creationId xmlns:a16="http://schemas.microsoft.com/office/drawing/2014/main" xmlns="" id="{79D342DF-0A65-4821-8F47-A3CE1793E1E6}"/>
+                <a16:creationId xmlns:a16="http://schemas.microsoft.com/office/drawing/2014/main" id="{79D342DF-0A65-4821-8F47-A3CE1793E1E6}"/>
               </a:ext>
             </a:extLst>
           </p:cNvPr>
@@ -4150,7 +4150,7 @@
           <p:cNvPr id="5" name="TextBox 4">
             <a:extLst>
               <a:ext uri="{FF2B5EF4-FFF2-40B4-BE49-F238E27FC236}">
-                <a16:creationId xmlns:a16="http://schemas.microsoft.com/office/drawing/2014/main" xmlns="" id="{555DBE74-403C-4246-B0C1-4F2AAF162AFF}"/>
+                <a16:creationId xmlns:a16="http://schemas.microsoft.com/office/drawing/2014/main" id="{555DBE74-403C-4246-B0C1-4F2AAF162AFF}"/>
               </a:ext>
             </a:extLst>
           </p:cNvPr>
@@ -4352,7 +4352,7 @@
           <p:cNvPr id="8" name="TextBox 7">
             <a:extLst>
               <a:ext uri="{FF2B5EF4-FFF2-40B4-BE49-F238E27FC236}">
-                <a16:creationId xmlns:a16="http://schemas.microsoft.com/office/drawing/2014/main" xmlns="" id="{BF27FA47-F412-41BA-9674-4AB98ABB11FF}"/>
+                <a16:creationId xmlns:a16="http://schemas.microsoft.com/office/drawing/2014/main" id="{BF27FA47-F412-41BA-9674-4AB98ABB11FF}"/>
               </a:ext>
             </a:extLst>
           </p:cNvPr>
@@ -4514,7 +4514,7 @@
           <p:cNvPr id="39" name="Round Same Side Corner Rectangle 137">
             <a:extLst>
               <a:ext uri="{FF2B5EF4-FFF2-40B4-BE49-F238E27FC236}">
-                <a16:creationId xmlns:a16="http://schemas.microsoft.com/office/drawing/2014/main" xmlns="" id="{E416DD2D-00A9-4581-8B16-BB3C03226A4A}"/>
+                <a16:creationId xmlns:a16="http://schemas.microsoft.com/office/drawing/2014/main" id="{E416DD2D-00A9-4581-8B16-BB3C03226A4A}"/>
               </a:ext>
             </a:extLst>
           </p:cNvPr>
@@ -4578,7 +4578,7 @@
           <p:cNvPr id="61" name="TextBox 9">
             <a:extLst>
               <a:ext uri="{FF2B5EF4-FFF2-40B4-BE49-F238E27FC236}">
-                <a16:creationId xmlns:a16="http://schemas.microsoft.com/office/drawing/2014/main" xmlns="" id="{0F50DE13-E128-4F41-B202-B86A9CAA9FC5}"/>
+                <a16:creationId xmlns:a16="http://schemas.microsoft.com/office/drawing/2014/main" id="{0F50DE13-E128-4F41-B202-B86A9CAA9FC5}"/>
               </a:ext>
             </a:extLst>
           </p:cNvPr>
@@ -4605,21 +4605,21 @@
           <a:lstStyle/>
           <a:p>
             <a:r>
-              <a:rPr lang="en-GB" sz="3000" dirty="0" smtClean="0">
+              <a:rPr lang="en-GB" sz="3000" dirty="0">
                 <a:latin typeface="Arial" panose="020B0604020202020204" pitchFamily="34" charset="0"/>
                 <a:cs typeface="Arial" panose="020B0604020202020204" pitchFamily="34" charset="0"/>
               </a:rPr>
               <a:t>From 2</a:t>
             </a:r>
             <a:r>
-              <a:rPr lang="en-GB" sz="3000" baseline="30000" dirty="0" smtClean="0">
+              <a:rPr lang="en-GB" sz="3000" baseline="30000" dirty="0">
                 <a:latin typeface="Arial" panose="020B0604020202020204" pitchFamily="34" charset="0"/>
                 <a:cs typeface="Arial" panose="020B0604020202020204" pitchFamily="34" charset="0"/>
               </a:rPr>
               <a:t>nd</a:t>
             </a:r>
             <a:r>
-              <a:rPr lang="en-GB" sz="3000" dirty="0" smtClean="0">
+              <a:rPr lang="en-GB" sz="3000" dirty="0">
                 <a:latin typeface="Arial" panose="020B0604020202020204" pitchFamily="34" charset="0"/>
                 <a:cs typeface="Arial" panose="020B0604020202020204" pitchFamily="34" charset="0"/>
               </a:rPr>
@@ -4634,18 +4634,11 @@
           </a:p>
           <a:p>
             <a:r>
-              <a:rPr lang="en-GB" sz="3000" dirty="0" smtClean="0">
-                <a:latin typeface="Arial" panose="020B0604020202020204" pitchFamily="34" charset="0"/>
-                <a:cs typeface="Arial" panose="020B0604020202020204" pitchFamily="34" charset="0"/>
-              </a:rPr>
-              <a:t>MCC </a:t>
-            </a:r>
-            <a:r>
               <a:rPr lang="en-GB" sz="3000" dirty="0">
                 <a:latin typeface="Arial" panose="020B0604020202020204" pitchFamily="34" charset="0"/>
                 <a:cs typeface="Arial" panose="020B0604020202020204" pitchFamily="34" charset="0"/>
               </a:rPr>
-              <a:t>on test</a:t>
+              <a:t>MCC on test</a:t>
             </a:r>
           </a:p>
           <a:p>
@@ -4673,7 +4666,7 @@
           <p:cNvPr id="68" name="Round Same Side Corner Rectangle 137">
             <a:extLst>
               <a:ext uri="{FF2B5EF4-FFF2-40B4-BE49-F238E27FC236}">
-                <a16:creationId xmlns:a16="http://schemas.microsoft.com/office/drawing/2014/main" xmlns="" id="{E416DD2D-00A9-4581-8B16-BB3C03226A4A}"/>
+                <a16:creationId xmlns:a16="http://schemas.microsoft.com/office/drawing/2014/main" id="{E416DD2D-00A9-4581-8B16-BB3C03226A4A}"/>
               </a:ext>
             </a:extLst>
           </p:cNvPr>
@@ -4763,37 +4756,8 @@
                 <a:ea typeface="+mn-lt"/>
                 <a:cs typeface="Arial" panose="020B0604020202020204" pitchFamily="34" charset="0"/>
               </a:rPr>
-              <a:t>The dataset is really skewed towards </a:t>
-            </a:r>
-            <a:r>
-              <a:rPr lang="en-US" sz="2400" dirty="0" smtClean="0">
-                <a:latin typeface="Arial" panose="020B0604020202020204" pitchFamily="34" charset="0"/>
-                <a:ea typeface="+mn-lt"/>
-                <a:cs typeface="Arial" panose="020B0604020202020204" pitchFamily="34" charset="0"/>
-              </a:rPr>
-              <a:t>negative (75%) </a:t>
-            </a:r>
-            <a:r>
-              <a:rPr lang="en-US" sz="2400" dirty="0">
-                <a:latin typeface="Arial" panose="020B0604020202020204" pitchFamily="34" charset="0"/>
-                <a:ea typeface="+mn-lt"/>
-                <a:cs typeface="Arial" panose="020B0604020202020204" pitchFamily="34" charset="0"/>
-              </a:rPr>
-              <a:t>which makes metrics like accuracy less reliable. Changing the threshold gives a better MCC because the model tends to predict more negatives. The best threshold is found to be </a:t>
-            </a:r>
-            <a:r>
-              <a:rPr lang="en-US" sz="2400" dirty="0" smtClean="0">
-                <a:latin typeface="Arial" panose="020B0604020202020204" pitchFamily="34" charset="0"/>
-                <a:ea typeface="+mn-lt"/>
-                <a:cs typeface="Arial" panose="020B0604020202020204" pitchFamily="34" charset="0"/>
-              </a:rPr>
-              <a:t>0.63 during validation and is applied for testing.</a:t>
-            </a:r>
-            <a:endParaRPr lang="en-US" sz="2400" dirty="0">
-              <a:latin typeface="Arial" panose="020B0604020202020204" pitchFamily="34" charset="0"/>
-              <a:ea typeface="+mn-lt"/>
-              <a:cs typeface="Arial" panose="020B0604020202020204" pitchFamily="34" charset="0"/>
-            </a:endParaRPr>
+              <a:t>The dataset is really skewed towards negative (75%) which makes metrics like accuracy less reliable. Changing the threshold gives a better MCC because the model tends to predict more negatives. The best threshold is found to be 0.63 during validation and is applied for testing.</a:t>
+            </a:r>
           </a:p>
           <a:p>
             <a:pPr marL="342900" indent="-342900">
@@ -4801,7 +4765,7 @@
               <a:buChar char="•"/>
             </a:pPr>
             <a:r>
-              <a:rPr lang="en-US" sz="2400" dirty="0" smtClean="0">
+              <a:rPr lang="en-US" sz="2400" dirty="0">
                 <a:latin typeface="Arial" panose="020B0604020202020204" pitchFamily="34" charset="0"/>
                 <a:ea typeface="+mn-lt"/>
                 <a:cs typeface="Arial" panose="020B0604020202020204" pitchFamily="34" charset="0"/>
@@ -4809,7 +4773,7 @@
               <a:t>The model </a:t>
             </a:r>
             <a:r>
-              <a:rPr lang="en-US" sz="2400" dirty="0" err="1" smtClean="0">
+              <a:rPr lang="en-US" sz="2400" dirty="0" err="1">
                 <a:latin typeface="Arial" panose="020B0604020202020204" pitchFamily="34" charset="0"/>
                 <a:ea typeface="+mn-lt"/>
                 <a:cs typeface="Arial" panose="020B0604020202020204" pitchFamily="34" charset="0"/>
@@ -4817,18 +4781,13 @@
               <a:t>overfits</a:t>
             </a:r>
             <a:r>
-              <a:rPr lang="en-US" sz="2400" dirty="0" smtClean="0">
+              <a:rPr lang="en-US" sz="2400" dirty="0">
                 <a:latin typeface="Arial" panose="020B0604020202020204" pitchFamily="34" charset="0"/>
                 <a:ea typeface="+mn-lt"/>
                 <a:cs typeface="Arial" panose="020B0604020202020204" pitchFamily="34" charset="0"/>
               </a:rPr>
               <a:t> the dataset. If we were to predict binding for other peptides, the model would likely fail. This can be shown by leave-one-out cross-validation [2].</a:t>
             </a:r>
-            <a:endParaRPr lang="en-US" sz="2400" dirty="0">
-              <a:latin typeface="Arial" panose="020B0604020202020204" pitchFamily="34" charset="0"/>
-              <a:ea typeface="+mn-lt"/>
-              <a:cs typeface="Arial" panose="020B0604020202020204" pitchFamily="34" charset="0"/>
-            </a:endParaRPr>
           </a:p>
           <a:p>
             <a:pPr marL="342900" indent="-342900">
@@ -4836,7 +4795,7 @@
               <a:buChar char="•"/>
             </a:pPr>
             <a:r>
-              <a:rPr lang="en-US" sz="2400" dirty="0" smtClean="0">
+              <a:rPr lang="en-US" sz="2400" dirty="0">
                 <a:latin typeface="Arial" panose="020B0604020202020204" pitchFamily="34" charset="0"/>
                 <a:ea typeface="+mn-lt"/>
                 <a:cs typeface="Arial" panose="020B0604020202020204" pitchFamily="34" charset="0"/>
@@ -4880,30 +4839,19 @@
               <a:t>Figure 2. Pipeline for the </a:t>
             </a:r>
             <a:r>
-              <a:rPr lang="fr-FR" i="1" dirty="0" err="1" smtClean="0">
+              <a:rPr lang="fr-FR" i="1" dirty="0" err="1">
                 <a:latin typeface="Arial" panose="020B0604020202020204" pitchFamily="34" charset="0"/>
                 <a:cs typeface="Arial" panose="020B0604020202020204" pitchFamily="34" charset="0"/>
               </a:rPr>
               <a:t>pre-processing</a:t>
             </a:r>
             <a:r>
-              <a:rPr lang="fr-FR" i="1" dirty="0" smtClean="0">
-                <a:latin typeface="Arial" panose="020B0604020202020204" pitchFamily="34" charset="0"/>
-                <a:cs typeface="Arial" panose="020B0604020202020204" pitchFamily="34" charset="0"/>
-              </a:rPr>
-              <a:t> of the data</a:t>
-            </a:r>
-            <a:r>
-              <a:rPr lang="fr-FR" i="1" dirty="0" smtClean="0">
-                <a:latin typeface="Arial" panose="020B0604020202020204" pitchFamily="34" charset="0"/>
-                <a:cs typeface="Arial" panose="020B0604020202020204" pitchFamily="34" charset="0"/>
-              </a:rPr>
-              <a:t>.</a:t>
-            </a:r>
-            <a:endParaRPr lang="fr-FR" i="1" dirty="0">
-              <a:latin typeface="Arial" panose="020B0604020202020204" pitchFamily="34" charset="0"/>
-              <a:cs typeface="Arial" panose="020B0604020202020204" pitchFamily="34" charset="0"/>
-            </a:endParaRPr>
+              <a:rPr lang="fr-FR" i="1" dirty="0">
+                <a:latin typeface="Arial" panose="020B0604020202020204" pitchFamily="34" charset="0"/>
+                <a:cs typeface="Arial" panose="020B0604020202020204" pitchFamily="34" charset="0"/>
+              </a:rPr>
+              <a:t> of the data.</a:t>
+            </a:r>
           </a:p>
         </p:txBody>
       </p:sp>
@@ -5226,7 +5174,7 @@
           <p:cNvPr id="15" name="Picture 14" descr="Graphical user interface&#10;&#10;Description automatically generated with low confidence">
             <a:extLst>
               <a:ext uri="{FF2B5EF4-FFF2-40B4-BE49-F238E27FC236}">
-                <a16:creationId xmlns:a16="http://schemas.microsoft.com/office/drawing/2014/main" xmlns="" id="{3BC95CEC-30C8-4CC6-9A6F-CEA5128B28D7}"/>
+                <a16:creationId xmlns:a16="http://schemas.microsoft.com/office/drawing/2014/main" id="{3BC95CEC-30C8-4CC6-9A6F-CEA5128B28D7}"/>
               </a:ext>
             </a:extLst>
           </p:cNvPr>
@@ -5295,7 +5243,7 @@
           <p:cNvPr id="52" name="TextBox 51">
             <a:extLst>
               <a:ext uri="{FF2B5EF4-FFF2-40B4-BE49-F238E27FC236}">
-                <a16:creationId xmlns:a16="http://schemas.microsoft.com/office/drawing/2014/main" xmlns="" id="{8D25C8AF-29B9-4B5F-A484-1C152F2D45F1}"/>
+                <a16:creationId xmlns:a16="http://schemas.microsoft.com/office/drawing/2014/main" id="{8D25C8AF-29B9-4B5F-A484-1C152F2D45F1}"/>
               </a:ext>
             </a:extLst>
           </p:cNvPr>
@@ -5390,7 +5338,7 @@
           <p:cNvPr id="59" name="TextBox 58">
             <a:extLst>
               <a:ext uri="{FF2B5EF4-FFF2-40B4-BE49-F238E27FC236}">
-                <a16:creationId xmlns:a16="http://schemas.microsoft.com/office/drawing/2014/main" xmlns="" id="{25FCE40A-6812-4241-9AFC-C4527E1E08D6}"/>
+                <a16:creationId xmlns:a16="http://schemas.microsoft.com/office/drawing/2014/main" id="{25FCE40A-6812-4241-9AFC-C4527E1E08D6}"/>
               </a:ext>
             </a:extLst>
           </p:cNvPr>
@@ -5435,21 +5383,21 @@
               <a:buChar char="•"/>
             </a:pPr>
             <a:r>
-              <a:rPr lang="en-GB" sz="2400" b="1" dirty="0" smtClean="0">
+              <a:rPr lang="en-GB" sz="2400" b="1" dirty="0">
                 <a:latin typeface="Arial" panose="020B0604020202020204" pitchFamily="34" charset="0"/>
                 <a:cs typeface="Arial" panose="020B0604020202020204" pitchFamily="34" charset="0"/>
               </a:rPr>
               <a:t>BLOSUM (</a:t>
             </a:r>
             <a:r>
-              <a:rPr lang="en-GB" sz="2400" b="1" dirty="0" err="1" smtClean="0">
+              <a:rPr lang="en-GB" sz="2400" b="1" dirty="0" err="1">
                 <a:latin typeface="Arial" panose="020B0604020202020204" pitchFamily="34" charset="0"/>
                 <a:cs typeface="Arial" panose="020B0604020202020204" pitchFamily="34" charset="0"/>
               </a:rPr>
               <a:t>BLOcks</a:t>
             </a:r>
             <a:r>
-              <a:rPr lang="en-GB" sz="2400" b="1" dirty="0" smtClean="0">
+              <a:rPr lang="en-GB" sz="2400" b="1" dirty="0">
                 <a:latin typeface="Arial" panose="020B0604020202020204" pitchFamily="34" charset="0"/>
                 <a:cs typeface="Arial" panose="020B0604020202020204" pitchFamily="34" charset="0"/>
               </a:rPr>
@@ -5467,23 +5415,23 @@
                 <a:latin typeface="Arial" panose="020B0604020202020204" pitchFamily="34" charset="0"/>
                 <a:cs typeface="Arial" panose="020B0604020202020204" pitchFamily="34" charset="0"/>
               </a:rPr>
-              <a:t> Matrix</a:t>
-            </a:r>
-            <a:r>
-              <a:rPr lang="en-GB" sz="2400" b="1" dirty="0" smtClean="0">
-                <a:latin typeface="Arial" panose="020B0604020202020204" pitchFamily="34" charset="0"/>
-                <a:cs typeface="Arial" panose="020B0604020202020204" pitchFamily="34" charset="0"/>
-              </a:rPr>
-              <a:t>): </a:t>
-            </a:r>
-            <a:r>
-              <a:rPr lang="en-GB" sz="2400" dirty="0" smtClean="0">
-                <a:latin typeface="Arial" panose="020B0604020202020204" pitchFamily="34" charset="0"/>
-                <a:cs typeface="Arial" panose="020B0604020202020204" pitchFamily="34" charset="0"/>
-              </a:rPr>
-              <a:t>Captures the biochemical properties of amino acids. It turns one-hot encoding into a vector with less 0s.</a:t>
-            </a:r>
-            <a:endParaRPr lang="en-GB" sz="2400" b="1" dirty="0" smtClean="0">
+              <a:t> Matrix): </a:t>
+            </a:r>
+            <a:r>
+              <a:rPr lang="en-GB" sz="2400" dirty="0">
+                <a:latin typeface="Arial" panose="020B0604020202020204" pitchFamily="34" charset="0"/>
+                <a:cs typeface="Arial" panose="020B0604020202020204" pitchFamily="34" charset="0"/>
+              </a:rPr>
+              <a:t>Captures the biochemical properties of amino acids. It turns one-hot encoding into a non </a:t>
+            </a:r>
+            <a:r>
+              <a:rPr lang="en-GB" sz="2400">
+                <a:latin typeface="Arial" panose="020B0604020202020204" pitchFamily="34" charset="0"/>
+                <a:cs typeface="Arial" panose="020B0604020202020204" pitchFamily="34" charset="0"/>
+              </a:rPr>
+              <a:t>sparse vector.</a:t>
+            </a:r>
+            <a:endParaRPr lang="en-GB" sz="2400" b="1" dirty="0">
               <a:latin typeface="Arial" panose="020B0604020202020204" pitchFamily="34" charset="0"/>
               <a:cs typeface="Arial" panose="020B0604020202020204" pitchFamily="34" charset="0"/>
             </a:endParaRPr>
@@ -5501,77 +5449,35 @@
                 <a:latin typeface="Arial" panose="020B0604020202020204" pitchFamily="34" charset="0"/>
                 <a:cs typeface="Arial" panose="020B0604020202020204" pitchFamily="34" charset="0"/>
               </a:rPr>
-              <a:t>ESM </a:t>
-            </a:r>
-            <a:r>
-              <a:rPr lang="en-GB" sz="2400" b="1" dirty="0" smtClean="0">
-                <a:latin typeface="Arial" panose="020B0604020202020204" pitchFamily="34" charset="0"/>
-                <a:cs typeface="Arial" panose="020B0604020202020204" pitchFamily="34" charset="0"/>
-              </a:rPr>
-              <a:t>(</a:t>
+              <a:t>ESM (Evolutionary Scale </a:t>
+            </a:r>
+            <a:r>
+              <a:rPr lang="en-GB" sz="2400" b="1" dirty="0" err="1">
+                <a:latin typeface="Arial" panose="020B0604020202020204" pitchFamily="34" charset="0"/>
+                <a:cs typeface="Arial" panose="020B0604020202020204" pitchFamily="34" charset="0"/>
+              </a:rPr>
+              <a:t>Modeling</a:t>
             </a:r>
             <a:r>
               <a:rPr lang="en-GB" sz="2400" b="1" dirty="0">
                 <a:latin typeface="Arial" panose="020B0604020202020204" pitchFamily="34" charset="0"/>
                 <a:cs typeface="Arial" panose="020B0604020202020204" pitchFamily="34" charset="0"/>
               </a:rPr>
-              <a:t>Evolutionary Scale </a:t>
-            </a:r>
-            <a:r>
-              <a:rPr lang="en-GB" sz="2400" b="1" dirty="0" err="1">
-                <a:latin typeface="Arial" panose="020B0604020202020204" pitchFamily="34" charset="0"/>
-                <a:cs typeface="Arial" panose="020B0604020202020204" pitchFamily="34" charset="0"/>
-              </a:rPr>
-              <a:t>Modeling</a:t>
-            </a:r>
-            <a:r>
-              <a:rPr lang="en-GB" sz="2400" b="1" dirty="0" smtClean="0">
-                <a:latin typeface="Arial" panose="020B0604020202020204" pitchFamily="34" charset="0"/>
-                <a:cs typeface="Arial" panose="020B0604020202020204" pitchFamily="34" charset="0"/>
-              </a:rPr>
               <a:t>) [3]: </a:t>
             </a:r>
             <a:r>
-              <a:rPr lang="en-GB" sz="2400" dirty="0" smtClean="0">
+              <a:rPr lang="en-GB" sz="2400" dirty="0">
                 <a:latin typeface="Arial" panose="020B0604020202020204" pitchFamily="34" charset="0"/>
                 <a:cs typeface="Arial" panose="020B0604020202020204" pitchFamily="34" charset="0"/>
               </a:rPr>
               <a:t>A transformer, i.e. a </a:t>
             </a:r>
             <a:r>
-              <a:rPr lang="en-US" sz="2400" dirty="0" smtClean="0">
-                <a:latin typeface="Arial" panose="020B0604020202020204" pitchFamily="34" charset="0"/>
-                <a:cs typeface="Arial" panose="020B0604020202020204" pitchFamily="34" charset="0"/>
-              </a:rPr>
-              <a:t>series </a:t>
-            </a:r>
-            <a:r>
               <a:rPr lang="en-US" sz="2400" dirty="0">
                 <a:latin typeface="Arial" panose="020B0604020202020204" pitchFamily="34" charset="0"/>
                 <a:cs typeface="Arial" panose="020B0604020202020204" pitchFamily="34" charset="0"/>
               </a:rPr>
-              <a:t>of </a:t>
-            </a:r>
-            <a:r>
-              <a:rPr lang="en-US" sz="2400" dirty="0" smtClean="0">
-                <a:latin typeface="Arial" panose="020B0604020202020204" pitchFamily="34" charset="0"/>
-                <a:cs typeface="Arial" panose="020B0604020202020204" pitchFamily="34" charset="0"/>
-              </a:rPr>
-              <a:t>blocks that </a:t>
-            </a:r>
-            <a:r>
-              <a:rPr lang="en-US" sz="2400" dirty="0">
-                <a:latin typeface="Arial" panose="020B0604020202020204" pitchFamily="34" charset="0"/>
-                <a:cs typeface="Arial" panose="020B0604020202020204" pitchFamily="34" charset="0"/>
-              </a:rPr>
-              <a:t>alternate self-attention with feed-forward </a:t>
-            </a:r>
-            <a:r>
-              <a:rPr lang="en-US" sz="2400" dirty="0" smtClean="0">
-                <a:latin typeface="Arial" panose="020B0604020202020204" pitchFamily="34" charset="0"/>
-                <a:cs typeface="Arial" panose="020B0604020202020204" pitchFamily="34" charset="0"/>
-              </a:rPr>
-              <a:t>connections. It has been trained beforehand with 250 million sequences and has 650 million weights. The output is a vector of size 1280 for each amino acid position.</a:t>
+              <a:t>series of blocks that alternate self-attention with feed-forward connections. It has been trained beforehand with 250 million sequences and has 650 million weights. The output is a vector of size 1280 for each amino acid position.</a:t>
             </a:r>
             <a:endParaRPr lang="en-GB" sz="2400" b="1" dirty="0">
               <a:latin typeface="Arial" panose="020B0604020202020204" pitchFamily="34" charset="0"/>
@@ -5585,7 +5491,7 @@
           <p:cNvPr id="60" name="TextBox 59">
             <a:extLst>
               <a:ext uri="{FF2B5EF4-FFF2-40B4-BE49-F238E27FC236}">
-                <a16:creationId xmlns:a16="http://schemas.microsoft.com/office/drawing/2014/main" xmlns="" id="{5EC9703E-C0FE-42AC-9186-837AE535C777}"/>
+                <a16:creationId xmlns:a16="http://schemas.microsoft.com/office/drawing/2014/main" id="{5EC9703E-C0FE-42AC-9186-837AE535C777}"/>
               </a:ext>
             </a:extLst>
           </p:cNvPr>
@@ -5628,7 +5534,7 @@
           <p:cNvPr id="62" name="TextBox 61">
             <a:extLst>
               <a:ext uri="{FF2B5EF4-FFF2-40B4-BE49-F238E27FC236}">
-                <a16:creationId xmlns:a16="http://schemas.microsoft.com/office/drawing/2014/main" xmlns="" id="{658BED85-75EA-4BFC-BF85-417C54E59FAC}"/>
+                <a16:creationId xmlns:a16="http://schemas.microsoft.com/office/drawing/2014/main" id="{658BED85-75EA-4BFC-BF85-417C54E59FAC}"/>
               </a:ext>
             </a:extLst>
           </p:cNvPr>
@@ -5731,7 +5637,7 @@
           <p:cNvPr id="16" name="Table 16">
             <a:extLst>
               <a:ext uri="{FF2B5EF4-FFF2-40B4-BE49-F238E27FC236}">
-                <a16:creationId xmlns:a16="http://schemas.microsoft.com/office/drawing/2014/main" xmlns="" id="{B3DD0E64-0B7C-4139-8170-FF729427F72A}"/>
+                <a16:creationId xmlns:a16="http://schemas.microsoft.com/office/drawing/2014/main" id="{B3DD0E64-0B7C-4139-8170-FF729427F72A}"/>
               </a:ext>
             </a:extLst>
           </p:cNvPr>
@@ -5760,42 +5666,42 @@
                 <a:gridCol w="3371090">
                   <a:extLst>
                     <a:ext uri="{9D8B030D-6E8A-4147-A177-3AD203B41FA5}">
-                      <a16:colId xmlns:a16="http://schemas.microsoft.com/office/drawing/2014/main" xmlns="" val="630018940"/>
+                      <a16:colId xmlns:a16="http://schemas.microsoft.com/office/drawing/2014/main" val="630018940"/>
                     </a:ext>
                   </a:extLst>
                 </a:gridCol>
                 <a:gridCol w="805180">
                   <a:extLst>
                     <a:ext uri="{9D8B030D-6E8A-4147-A177-3AD203B41FA5}">
-                      <a16:colId xmlns:a16="http://schemas.microsoft.com/office/drawing/2014/main" xmlns="" val="1361621000"/>
+                      <a16:colId xmlns:a16="http://schemas.microsoft.com/office/drawing/2014/main" val="1361621000"/>
                     </a:ext>
                   </a:extLst>
                 </a:gridCol>
                 <a:gridCol w="887730">
                   <a:extLst>
                     <a:ext uri="{9D8B030D-6E8A-4147-A177-3AD203B41FA5}">
-                      <a16:colId xmlns:a16="http://schemas.microsoft.com/office/drawing/2014/main" xmlns="" val="3966724582"/>
+                      <a16:colId xmlns:a16="http://schemas.microsoft.com/office/drawing/2014/main" val="3966724582"/>
                     </a:ext>
                   </a:extLst>
                 </a:gridCol>
                 <a:gridCol w="1395730">
                   <a:extLst>
                     <a:ext uri="{9D8B030D-6E8A-4147-A177-3AD203B41FA5}">
-                      <a16:colId xmlns:a16="http://schemas.microsoft.com/office/drawing/2014/main" xmlns="" val="2736714997"/>
+                      <a16:colId xmlns:a16="http://schemas.microsoft.com/office/drawing/2014/main" val="2736714997"/>
                     </a:ext>
                   </a:extLst>
                 </a:gridCol>
                 <a:gridCol w="1000443">
                   <a:extLst>
                     <a:ext uri="{9D8B030D-6E8A-4147-A177-3AD203B41FA5}">
-                      <a16:colId xmlns:a16="http://schemas.microsoft.com/office/drawing/2014/main" xmlns="" val="3764394228"/>
+                      <a16:colId xmlns:a16="http://schemas.microsoft.com/office/drawing/2014/main" val="3764394228"/>
                     </a:ext>
                   </a:extLst>
                 </a:gridCol>
                 <a:gridCol w="887730">
                   <a:extLst>
                     <a:ext uri="{9D8B030D-6E8A-4147-A177-3AD203B41FA5}">
-                      <a16:colId xmlns:a16="http://schemas.microsoft.com/office/drawing/2014/main" xmlns="" val="4125354729"/>
+                      <a16:colId xmlns:a16="http://schemas.microsoft.com/office/drawing/2014/main" val="4125354729"/>
                     </a:ext>
                   </a:extLst>
                 </a:gridCol>
@@ -5953,7 +5859,7 @@
                 </a:tc>
                 <a:extLst>
                   <a:ext uri="{0D108BD9-81ED-4DB2-BD59-A6C34878D82A}">
-                    <a16:rowId xmlns:a16="http://schemas.microsoft.com/office/drawing/2014/main" xmlns="" val="2350932793"/>
+                    <a16:rowId xmlns:a16="http://schemas.microsoft.com/office/drawing/2014/main" val="2350932793"/>
                   </a:ext>
                 </a:extLst>
               </a:tr>
@@ -6086,7 +5992,7 @@
                 </a:tc>
                 <a:extLst>
                   <a:ext uri="{0D108BD9-81ED-4DB2-BD59-A6C34878D82A}">
-                    <a16:rowId xmlns:a16="http://schemas.microsoft.com/office/drawing/2014/main" xmlns="" val="2262440005"/>
+                    <a16:rowId xmlns:a16="http://schemas.microsoft.com/office/drawing/2014/main" val="2262440005"/>
                   </a:ext>
                 </a:extLst>
               </a:tr>
@@ -6219,7 +6125,7 @@
                 </a:tc>
                 <a:extLst>
                   <a:ext uri="{0D108BD9-81ED-4DB2-BD59-A6C34878D82A}">
-                    <a16:rowId xmlns:a16="http://schemas.microsoft.com/office/drawing/2014/main" xmlns="" val="3805626318"/>
+                    <a16:rowId xmlns:a16="http://schemas.microsoft.com/office/drawing/2014/main" val="3805626318"/>
                   </a:ext>
                 </a:extLst>
               </a:tr>
@@ -6352,7 +6258,7 @@
                 </a:tc>
                 <a:extLst>
                   <a:ext uri="{0D108BD9-81ED-4DB2-BD59-A6C34878D82A}">
-                    <a16:rowId xmlns:a16="http://schemas.microsoft.com/office/drawing/2014/main" xmlns="" val="3022607923"/>
+                    <a16:rowId xmlns:a16="http://schemas.microsoft.com/office/drawing/2014/main" val="3022607923"/>
                   </a:ext>
                 </a:extLst>
               </a:tr>
@@ -6485,7 +6391,7 @@
                 </a:tc>
                 <a:extLst>
                   <a:ext uri="{0D108BD9-81ED-4DB2-BD59-A6C34878D82A}">
-                    <a16:rowId xmlns:a16="http://schemas.microsoft.com/office/drawing/2014/main" xmlns="" val="73323118"/>
+                    <a16:rowId xmlns:a16="http://schemas.microsoft.com/office/drawing/2014/main" val="73323118"/>
                   </a:ext>
                 </a:extLst>
               </a:tr>
@@ -6503,13 +6409,6 @@
   <p:clrMapOvr>
     <a:masterClrMapping/>
   </p:clrMapOvr>
-  <p:timing>
-    <p:tnLst>
-      <p:par>
-        <p:cTn id="1" dur="indefinite" restart="never" nodeType="tmRoot"/>
-      </p:par>
-    </p:tnLst>
-  </p:timing>
 </p:sld>
 </file>
 
@@ -7070,12 +6969,9 @@
 </file>
 
 <file path=customXml/item1.xml><?xml version="1.0" encoding="utf-8"?>
-<?mso-contentType ?>
-<FormTemplates xmlns="http://schemas.microsoft.com/sharepoint/v3/contenttype/forms">
-  <Display>DocumentLibraryForm</Display>
-  <Edit>DocumentLibraryForm</Edit>
-  <New>DocumentLibraryForm</New>
-</FormTemplates>
+<p:properties xmlns:p="http://schemas.microsoft.com/office/2006/metadata/properties" xmlns:xsi="http://www.w3.org/2001/XMLSchema-instance" xmlns:pc="http://schemas.microsoft.com/office/infopath/2007/PartnerControls">
+  <documentManagement/>
+</p:properties>
 </file>
 
 <file path=customXml/item2.xml><?xml version="1.0" encoding="utf-8"?>
@@ -7211,15 +7107,19 @@
 </file>
 
 <file path=customXml/item3.xml><?xml version="1.0" encoding="utf-8"?>
-<p:properties xmlns:p="http://schemas.microsoft.com/office/2006/metadata/properties" xmlns:xsi="http://www.w3.org/2001/XMLSchema-instance" xmlns:pc="http://schemas.microsoft.com/office/infopath/2007/PartnerControls">
-  <documentManagement/>
-</p:properties>
+<?mso-contentType ?>
+<FormTemplates xmlns="http://schemas.microsoft.com/sharepoint/v3/contenttype/forms">
+  <Display>DocumentLibraryForm</Display>
+  <Edit>DocumentLibraryForm</Edit>
+  <New>DocumentLibraryForm</New>
+</FormTemplates>
 </file>
 
 <file path=customXml/itemProps1.xml><?xml version="1.0" encoding="utf-8"?>
-<ds:datastoreItem xmlns:ds="http://schemas.openxmlformats.org/officeDocument/2006/customXml" ds:itemID="{405562AF-484A-42F9-A02C-A3F5AD59D6C1}">
+<ds:datastoreItem xmlns:ds="http://schemas.openxmlformats.org/officeDocument/2006/customXml" ds:itemID="{CB370A3C-731B-4F4D-ABD0-42474AC25910}">
   <ds:schemaRefs>
-    <ds:schemaRef ds:uri="http://schemas.microsoft.com/sharepoint/v3/contenttype/forms"/>
+    <ds:schemaRef ds:uri="http://schemas.microsoft.com/office/2006/metadata/properties"/>
+    <ds:schemaRef ds:uri="http://schemas.microsoft.com/office/infopath/2007/PartnerControls"/>
   </ds:schemaRefs>
 </ds:datastoreItem>
 </file>
@@ -7243,10 +7143,9 @@
 </file>
 
 <file path=customXml/itemProps3.xml><?xml version="1.0" encoding="utf-8"?>
-<ds:datastoreItem xmlns:ds="http://schemas.openxmlformats.org/officeDocument/2006/customXml" ds:itemID="{CB370A3C-731B-4F4D-ABD0-42474AC25910}">
+<ds:datastoreItem xmlns:ds="http://schemas.openxmlformats.org/officeDocument/2006/customXml" ds:itemID="{405562AF-484A-42F9-A02C-A3F5AD59D6C1}">
   <ds:schemaRefs>
-    <ds:schemaRef ds:uri="http://schemas.microsoft.com/office/2006/metadata/properties"/>
-    <ds:schemaRef ds:uri="http://schemas.microsoft.com/office/infopath/2007/PartnerControls"/>
+    <ds:schemaRef ds:uri="http://schemas.microsoft.com/sharepoint/v3/contenttype/forms"/>
   </ds:schemaRefs>
 </ds:datastoreItem>
 </file>
</xml_diff>

<commit_message>
Updated discussion in poster
</commit_message>
<xml_diff>
--- a/presentation/presentation.pptx
+++ b/presentation/presentation.pptx
@@ -349,7 +349,7 @@
           <a:p>
             <a:fld id="{C6F05EAB-B404-4249-9B6E-2AB49D341D90}" type="datetimeFigureOut">
               <a:rPr lang="aa-ET" smtClean="0"/>
-              <a:t>06/12/2021</a:t>
+              <a:t>12/7/21</a:t>
             </a:fld>
             <a:endParaRPr lang="aa-ET"/>
           </a:p>
@@ -508,7 +508,7 @@
           <a:p>
             <a:fld id="{CC384317-2FF9-C745-838D-094DFBA5C4CC}" type="slidenum">
               <a:rPr lang="aa-ET" smtClean="0"/>
-              <a:t>‹N°›</a:t>
+              <a:t>‹#›</a:t>
             </a:fld>
             <a:endParaRPr lang="aa-ET"/>
           </a:p>
@@ -818,7 +818,7 @@
           <a:p>
             <a:fld id="{C1520061-EEF2-4648-A61C-FD1D344FB2F0}" type="datetimeFigureOut">
               <a:rPr lang="aa-ET" smtClean="0"/>
-              <a:t>06/12/2021</a:t>
+              <a:t>12/7/21</a:t>
             </a:fld>
             <a:endParaRPr lang="aa-ET"/>
           </a:p>
@@ -860,7 +860,7 @@
           <a:p>
             <a:fld id="{FDB24838-7C19-CC4E-B2E6-66E840BA735D}" type="slidenum">
               <a:rPr lang="aa-ET" smtClean="0"/>
-              <a:t>‹N°›</a:t>
+              <a:t>‹#›</a:t>
             </a:fld>
             <a:endParaRPr lang="aa-ET"/>
           </a:p>
@@ -988,7 +988,7 @@
           <a:p>
             <a:fld id="{C1520061-EEF2-4648-A61C-FD1D344FB2F0}" type="datetimeFigureOut">
               <a:rPr lang="aa-ET" smtClean="0"/>
-              <a:t>06/12/2021</a:t>
+              <a:t>12/7/21</a:t>
             </a:fld>
             <a:endParaRPr lang="aa-ET"/>
           </a:p>
@@ -1030,7 +1030,7 @@
           <a:p>
             <a:fld id="{FDB24838-7C19-CC4E-B2E6-66E840BA735D}" type="slidenum">
               <a:rPr lang="aa-ET" smtClean="0"/>
-              <a:t>‹N°›</a:t>
+              <a:t>‹#›</a:t>
             </a:fld>
             <a:endParaRPr lang="aa-ET"/>
           </a:p>
@@ -1168,7 +1168,7 @@
           <a:p>
             <a:fld id="{C1520061-EEF2-4648-A61C-FD1D344FB2F0}" type="datetimeFigureOut">
               <a:rPr lang="aa-ET" smtClean="0"/>
-              <a:t>06/12/2021</a:t>
+              <a:t>12/7/21</a:t>
             </a:fld>
             <a:endParaRPr lang="aa-ET"/>
           </a:p>
@@ -1210,7 +1210,7 @@
           <a:p>
             <a:fld id="{FDB24838-7C19-CC4E-B2E6-66E840BA735D}" type="slidenum">
               <a:rPr lang="aa-ET" smtClean="0"/>
-              <a:t>‹N°›</a:t>
+              <a:t>‹#›</a:t>
             </a:fld>
             <a:endParaRPr lang="aa-ET"/>
           </a:p>
@@ -1338,7 +1338,7 @@
           <a:p>
             <a:fld id="{C1520061-EEF2-4648-A61C-FD1D344FB2F0}" type="datetimeFigureOut">
               <a:rPr lang="aa-ET" smtClean="0"/>
-              <a:t>06/12/2021</a:t>
+              <a:t>12/7/21</a:t>
             </a:fld>
             <a:endParaRPr lang="aa-ET"/>
           </a:p>
@@ -1380,7 +1380,7 @@
           <a:p>
             <a:fld id="{FDB24838-7C19-CC4E-B2E6-66E840BA735D}" type="slidenum">
               <a:rPr lang="aa-ET" smtClean="0"/>
-              <a:t>‹N°›</a:t>
+              <a:t>‹#›</a:t>
             </a:fld>
             <a:endParaRPr lang="aa-ET"/>
           </a:p>
@@ -1582,7 +1582,7 @@
           <a:p>
             <a:fld id="{C1520061-EEF2-4648-A61C-FD1D344FB2F0}" type="datetimeFigureOut">
               <a:rPr lang="aa-ET" smtClean="0"/>
-              <a:t>06/12/2021</a:t>
+              <a:t>12/7/21</a:t>
             </a:fld>
             <a:endParaRPr lang="aa-ET"/>
           </a:p>
@@ -1624,7 +1624,7 @@
           <a:p>
             <a:fld id="{FDB24838-7C19-CC4E-B2E6-66E840BA735D}" type="slidenum">
               <a:rPr lang="aa-ET" smtClean="0"/>
-              <a:t>‹N°›</a:t>
+              <a:t>‹#›</a:t>
             </a:fld>
             <a:endParaRPr lang="aa-ET"/>
           </a:p>
@@ -1814,7 +1814,7 @@
           <a:p>
             <a:fld id="{C1520061-EEF2-4648-A61C-FD1D344FB2F0}" type="datetimeFigureOut">
               <a:rPr lang="aa-ET" smtClean="0"/>
-              <a:t>06/12/2021</a:t>
+              <a:t>12/7/21</a:t>
             </a:fld>
             <a:endParaRPr lang="aa-ET"/>
           </a:p>
@@ -1856,7 +1856,7 @@
           <a:p>
             <a:fld id="{FDB24838-7C19-CC4E-B2E6-66E840BA735D}" type="slidenum">
               <a:rPr lang="aa-ET" smtClean="0"/>
-              <a:t>‹N°›</a:t>
+              <a:t>‹#›</a:t>
             </a:fld>
             <a:endParaRPr lang="aa-ET"/>
           </a:p>
@@ -2181,7 +2181,7 @@
           <a:p>
             <a:fld id="{C1520061-EEF2-4648-A61C-FD1D344FB2F0}" type="datetimeFigureOut">
               <a:rPr lang="aa-ET" smtClean="0"/>
-              <a:t>06/12/2021</a:t>
+              <a:t>12/7/21</a:t>
             </a:fld>
             <a:endParaRPr lang="aa-ET"/>
           </a:p>
@@ -2223,7 +2223,7 @@
           <a:p>
             <a:fld id="{FDB24838-7C19-CC4E-B2E6-66E840BA735D}" type="slidenum">
               <a:rPr lang="aa-ET" smtClean="0"/>
-              <a:t>‹N°›</a:t>
+              <a:t>‹#›</a:t>
             </a:fld>
             <a:endParaRPr lang="aa-ET"/>
           </a:p>
@@ -2299,7 +2299,7 @@
           <a:p>
             <a:fld id="{C1520061-EEF2-4648-A61C-FD1D344FB2F0}" type="datetimeFigureOut">
               <a:rPr lang="aa-ET" smtClean="0"/>
-              <a:t>06/12/2021</a:t>
+              <a:t>12/7/21</a:t>
             </a:fld>
             <a:endParaRPr lang="aa-ET"/>
           </a:p>
@@ -2341,7 +2341,7 @@
           <a:p>
             <a:fld id="{FDB24838-7C19-CC4E-B2E6-66E840BA735D}" type="slidenum">
               <a:rPr lang="aa-ET" smtClean="0"/>
-              <a:t>‹N°›</a:t>
+              <a:t>‹#›</a:t>
             </a:fld>
             <a:endParaRPr lang="aa-ET"/>
           </a:p>
@@ -2394,7 +2394,7 @@
           <a:p>
             <a:fld id="{C1520061-EEF2-4648-A61C-FD1D344FB2F0}" type="datetimeFigureOut">
               <a:rPr lang="aa-ET" smtClean="0"/>
-              <a:t>06/12/2021</a:t>
+              <a:t>12/7/21</a:t>
             </a:fld>
             <a:endParaRPr lang="aa-ET"/>
           </a:p>
@@ -2436,7 +2436,7 @@
           <a:p>
             <a:fld id="{FDB24838-7C19-CC4E-B2E6-66E840BA735D}" type="slidenum">
               <a:rPr lang="aa-ET" smtClean="0"/>
-              <a:t>‹N°›</a:t>
+              <a:t>‹#›</a:t>
             </a:fld>
             <a:endParaRPr lang="aa-ET"/>
           </a:p>
@@ -2671,7 +2671,7 @@
           <a:p>
             <a:fld id="{C1520061-EEF2-4648-A61C-FD1D344FB2F0}" type="datetimeFigureOut">
               <a:rPr lang="aa-ET" smtClean="0"/>
-              <a:t>06/12/2021</a:t>
+              <a:t>12/7/21</a:t>
             </a:fld>
             <a:endParaRPr lang="aa-ET"/>
           </a:p>
@@ -2713,7 +2713,7 @@
           <a:p>
             <a:fld id="{FDB24838-7C19-CC4E-B2E6-66E840BA735D}" type="slidenum">
               <a:rPr lang="aa-ET" smtClean="0"/>
-              <a:t>‹N°›</a:t>
+              <a:t>‹#›</a:t>
             </a:fld>
             <a:endParaRPr lang="aa-ET"/>
           </a:p>
@@ -2928,7 +2928,7 @@
           <a:p>
             <a:fld id="{C1520061-EEF2-4648-A61C-FD1D344FB2F0}" type="datetimeFigureOut">
               <a:rPr lang="aa-ET" smtClean="0"/>
-              <a:t>06/12/2021</a:t>
+              <a:t>12/7/21</a:t>
             </a:fld>
             <a:endParaRPr lang="aa-ET"/>
           </a:p>
@@ -2970,7 +2970,7 @@
           <a:p>
             <a:fld id="{FDB24838-7C19-CC4E-B2E6-66E840BA735D}" type="slidenum">
               <a:rPr lang="aa-ET" smtClean="0"/>
-              <a:t>‹N°›</a:t>
+              <a:t>‹#›</a:t>
             </a:fld>
             <a:endParaRPr lang="aa-ET"/>
           </a:p>
@@ -3141,7 +3141,7 @@
           <a:p>
             <a:fld id="{C1520061-EEF2-4648-A61C-FD1D344FB2F0}" type="datetimeFigureOut">
               <a:rPr lang="aa-ET" smtClean="0"/>
-              <a:t>06/12/2021</a:t>
+              <a:t>12/7/21</a:t>
             </a:fld>
             <a:endParaRPr lang="aa-ET"/>
           </a:p>
@@ -3219,7 +3219,7 @@
           <a:p>
             <a:fld id="{FDB24838-7C19-CC4E-B2E6-66E840BA735D}" type="slidenum">
               <a:rPr lang="aa-ET" smtClean="0"/>
-              <a:t>‹N°›</a:t>
+              <a:t>‹#›</a:t>
             </a:fld>
             <a:endParaRPr lang="aa-ET"/>
           </a:p>
@@ -3856,7 +3856,7 @@
           <p:cNvPr id="24" name="Straight Connector 23">
             <a:extLst>
               <a:ext uri="{FF2B5EF4-FFF2-40B4-BE49-F238E27FC236}">
-                <a16:creationId xmlns:a16="http://schemas.microsoft.com/office/drawing/2014/main" xmlns="" id="{3CD061AB-8876-704F-BE6A-E397F33852E1}"/>
+                <a16:creationId xmlns:a16="http://schemas.microsoft.com/office/drawing/2014/main" id="{3CD061AB-8876-704F-BE6A-E397F33852E1}"/>
               </a:ext>
             </a:extLst>
           </p:cNvPr>
@@ -3899,7 +3899,7 @@
           <p:cNvPr id="128" name="Round Same Side Corner Rectangle 137">
             <a:extLst>
               <a:ext uri="{FF2B5EF4-FFF2-40B4-BE49-F238E27FC236}">
-                <a16:creationId xmlns:a16="http://schemas.microsoft.com/office/drawing/2014/main" xmlns="" id="{85003210-220B-9A49-8091-B1A85DD76CE8}"/>
+                <a16:creationId xmlns:a16="http://schemas.microsoft.com/office/drawing/2014/main" id="{85003210-220B-9A49-8091-B1A85DD76CE8}"/>
               </a:ext>
             </a:extLst>
           </p:cNvPr>
@@ -3963,7 +3963,7 @@
           <p:cNvPr id="129" name="Round Same Side Corner Rectangle 137">
             <a:extLst>
               <a:ext uri="{FF2B5EF4-FFF2-40B4-BE49-F238E27FC236}">
-                <a16:creationId xmlns:a16="http://schemas.microsoft.com/office/drawing/2014/main" xmlns="" id="{7226A277-A8A7-9549-8FCF-1175CB0CE7B6}"/>
+                <a16:creationId xmlns:a16="http://schemas.microsoft.com/office/drawing/2014/main" id="{7226A277-A8A7-9549-8FCF-1175CB0CE7B6}"/>
               </a:ext>
             </a:extLst>
           </p:cNvPr>
@@ -4027,7 +4027,7 @@
           <p:cNvPr id="130" name="Round Same Side Corner Rectangle 137">
             <a:extLst>
               <a:ext uri="{FF2B5EF4-FFF2-40B4-BE49-F238E27FC236}">
-                <a16:creationId xmlns:a16="http://schemas.microsoft.com/office/drawing/2014/main" xmlns="" id="{0D73ACE7-C686-234D-9978-B3229B92843A}"/>
+                <a16:creationId xmlns:a16="http://schemas.microsoft.com/office/drawing/2014/main" id="{0D73ACE7-C686-234D-9978-B3229B92843A}"/>
               </a:ext>
             </a:extLst>
           </p:cNvPr>
@@ -4091,7 +4091,7 @@
           <p:cNvPr id="3" name="Billede 6">
             <a:extLst>
               <a:ext uri="{FF2B5EF4-FFF2-40B4-BE49-F238E27FC236}">
-                <a16:creationId xmlns:a16="http://schemas.microsoft.com/office/drawing/2014/main" xmlns="" id="{79D342DF-0A65-4821-8F47-A3CE1793E1E6}"/>
+                <a16:creationId xmlns:a16="http://schemas.microsoft.com/office/drawing/2014/main" id="{79D342DF-0A65-4821-8F47-A3CE1793E1E6}"/>
               </a:ext>
             </a:extLst>
           </p:cNvPr>
@@ -4121,7 +4121,7 @@
           <p:cNvPr id="5" name="TextBox 4">
             <a:extLst>
               <a:ext uri="{FF2B5EF4-FFF2-40B4-BE49-F238E27FC236}">
-                <a16:creationId xmlns:a16="http://schemas.microsoft.com/office/drawing/2014/main" xmlns="" id="{555DBE74-403C-4246-B0C1-4F2AAF162AFF}"/>
+                <a16:creationId xmlns:a16="http://schemas.microsoft.com/office/drawing/2014/main" id="{555DBE74-403C-4246-B0C1-4F2AAF162AFF}"/>
               </a:ext>
             </a:extLst>
           </p:cNvPr>
@@ -4286,7 +4286,7 @@
           <p:cNvPr id="8" name="TextBox 7">
             <a:extLst>
               <a:ext uri="{FF2B5EF4-FFF2-40B4-BE49-F238E27FC236}">
-                <a16:creationId xmlns:a16="http://schemas.microsoft.com/office/drawing/2014/main" xmlns="" id="{BF27FA47-F412-41BA-9674-4AB98ABB11FF}"/>
+                <a16:creationId xmlns:a16="http://schemas.microsoft.com/office/drawing/2014/main" id="{BF27FA47-F412-41BA-9674-4AB98ABB11FF}"/>
               </a:ext>
             </a:extLst>
           </p:cNvPr>
@@ -4457,7 +4457,7 @@
           </a:p>
           <a:p>
             <a:r>
-              <a:rPr lang="en-US" baseline="30000" dirty="0" smtClean="0">
+              <a:rPr lang="en-US" baseline="30000" dirty="0">
                 <a:latin typeface="Arial" panose="020B0604020202020204" pitchFamily="34" charset="0"/>
                 <a:ea typeface="+mn-lt"/>
                 <a:cs typeface="Arial" panose="020B0604020202020204" pitchFamily="34" charset="0"/>
@@ -4465,36 +4465,12 @@
               <a:t>4</a:t>
             </a:r>
             <a:r>
-              <a:rPr lang="en-US" dirty="0" smtClean="0">
+              <a:rPr lang="en-US" dirty="0">
                 <a:latin typeface="Arial" panose="020B0604020202020204" pitchFamily="34" charset="0"/>
                 <a:ea typeface="+mn-lt"/>
                 <a:cs typeface="Arial" panose="020B0604020202020204" pitchFamily="34" charset="0"/>
               </a:rPr>
-              <a:t>Wu</a:t>
-            </a:r>
-            <a:r>
-              <a:rPr lang="en-US" dirty="0">
-                <a:latin typeface="Arial" panose="020B0604020202020204" pitchFamily="34" charset="0"/>
-                <a:ea typeface="+mn-lt"/>
-                <a:cs typeface="Arial" panose="020B0604020202020204" pitchFamily="34" charset="0"/>
-              </a:rPr>
-              <a:t>, K</a:t>
-            </a:r>
-            <a:r>
-              <a:rPr lang="en-US" dirty="0" smtClean="0">
-                <a:latin typeface="Arial" panose="020B0604020202020204" pitchFamily="34" charset="0"/>
-                <a:ea typeface="+mn-lt"/>
-                <a:cs typeface="Arial" panose="020B0604020202020204" pitchFamily="34" charset="0"/>
-              </a:rPr>
-              <a:t>. et al. </a:t>
-            </a:r>
-            <a:r>
-              <a:rPr lang="en-US" dirty="0">
-                <a:latin typeface="Arial" panose="020B0604020202020204" pitchFamily="34" charset="0"/>
-                <a:ea typeface="+mn-lt"/>
-                <a:cs typeface="Arial" panose="020B0604020202020204" pitchFamily="34" charset="0"/>
-              </a:rPr>
-              <a:t>(2021). TCR-BERT: learning the grammar of T-cell receptors for flexible antigen-</a:t>
+              <a:t>Wu, K. et al. (2021). TCR-BERT: learning the grammar of T-cell receptors for flexible antigen-</a:t>
             </a:r>
             <a:r>
               <a:rPr lang="en-US" dirty="0" err="1">
@@ -4540,7 +4516,7 @@
           <p:cNvPr id="39" name="Round Same Side Corner Rectangle 137">
             <a:extLst>
               <a:ext uri="{FF2B5EF4-FFF2-40B4-BE49-F238E27FC236}">
-                <a16:creationId xmlns:a16="http://schemas.microsoft.com/office/drawing/2014/main" xmlns="" id="{E416DD2D-00A9-4581-8B16-BB3C03226A4A}"/>
+                <a16:creationId xmlns:a16="http://schemas.microsoft.com/office/drawing/2014/main" id="{E416DD2D-00A9-4581-8B16-BB3C03226A4A}"/>
               </a:ext>
             </a:extLst>
           </p:cNvPr>
@@ -4604,7 +4580,7 @@
           <p:cNvPr id="68" name="Round Same Side Corner Rectangle 137">
             <a:extLst>
               <a:ext uri="{FF2B5EF4-FFF2-40B4-BE49-F238E27FC236}">
-                <a16:creationId xmlns:a16="http://schemas.microsoft.com/office/drawing/2014/main" xmlns="" id="{E416DD2D-00A9-4581-8B16-BB3C03226A4A}"/>
+                <a16:creationId xmlns:a16="http://schemas.microsoft.com/office/drawing/2014/main" id="{E416DD2D-00A9-4581-8B16-BB3C03226A4A}"/>
               </a:ext>
             </a:extLst>
           </p:cNvPr>
@@ -4672,7 +4648,7 @@
         <p:spPr>
           <a:xfrm>
             <a:off x="222652" y="25556472"/>
-            <a:ext cx="20938321" cy="2677656"/>
+            <a:ext cx="20938321" cy="3046988"/>
           </a:xfrm>
           <a:prstGeom prst="rect">
             <a:avLst/>
@@ -4747,34 +4723,61 @@
                 <a:cs typeface="Arial" panose="020B0604020202020204" pitchFamily="34" charset="0"/>
                 <a:sym typeface="Wingdings" pitchFamily="2" charset="2"/>
               </a:rPr>
-              <a:t> would be good to have TCR-specific embeddings (e.g. transfer learning) (like in preprint) but data availability is major </a:t>
-            </a:r>
-            <a:r>
-              <a:rPr lang="en-US" sz="2400" dirty="0" smtClean="0">
+              <a:t> would be good to have TCR-specific embeddings (e.g. transfer learning) (like in preprint) but data availability is major challenge</a:t>
+            </a:r>
+            <a:r>
+              <a:rPr lang="en-US" sz="2400" baseline="30000" dirty="0">
                 <a:latin typeface="Arial" panose="020B0604020202020204" pitchFamily="34" charset="0"/>
                 <a:ea typeface="+mn-lt"/>
                 <a:cs typeface="Arial" panose="020B0604020202020204" pitchFamily="34" charset="0"/>
                 <a:sym typeface="Wingdings" pitchFamily="2" charset="2"/>
               </a:rPr>
-              <a:t>challenge</a:t>
-            </a:r>
-            <a:r>
-              <a:rPr lang="en-US" sz="2400" baseline="30000" dirty="0">
+              <a:t>4</a:t>
+            </a:r>
+            <a:r>
+              <a:rPr lang="en-US" sz="2400" dirty="0">
                 <a:latin typeface="Arial" panose="020B0604020202020204" pitchFamily="34" charset="0"/>
                 <a:ea typeface="+mn-lt"/>
                 <a:cs typeface="Arial" panose="020B0604020202020204" pitchFamily="34" charset="0"/>
                 <a:sym typeface="Wingdings" pitchFamily="2" charset="2"/>
               </a:rPr>
+              <a:t>. The ESM Transformer is trained using evolutionary sequences. To improve our model a TCR-specific transformer such as TCR-BERT could be used to generate </a:t>
+            </a:r>
+            <a:r>
+              <a:rPr lang="en-US" sz="2400">
+                <a:latin typeface="Arial" panose="020B0604020202020204" pitchFamily="34" charset="0"/>
+                <a:ea typeface="+mn-lt"/>
+                <a:cs typeface="Arial" panose="020B0604020202020204" pitchFamily="34" charset="0"/>
+                <a:sym typeface="Wingdings" pitchFamily="2" charset="2"/>
+              </a:rPr>
+              <a:t>TCR-specific embeddings</a:t>
+            </a:r>
+            <a:r>
+              <a:rPr lang="en-US" sz="2400" baseline="30000">
+                <a:latin typeface="Arial" panose="020B0604020202020204" pitchFamily="34" charset="0"/>
+                <a:ea typeface="+mn-lt"/>
+                <a:cs typeface="Arial" panose="020B0604020202020204" pitchFamily="34" charset="0"/>
+                <a:sym typeface="Wingdings" pitchFamily="2" charset="2"/>
+              </a:rPr>
               <a:t>4</a:t>
             </a:r>
             <a:r>
-              <a:rPr lang="en-US" sz="2400" dirty="0" smtClean="0">
+              <a:rPr lang="en-US" sz="2400">
                 <a:latin typeface="Arial" panose="020B0604020202020204" pitchFamily="34" charset="0"/>
                 <a:ea typeface="+mn-lt"/>
                 <a:cs typeface="Arial" panose="020B0604020202020204" pitchFamily="34" charset="0"/>
                 <a:sym typeface="Wingdings" pitchFamily="2" charset="2"/>
               </a:rPr>
-              <a:t>.</a:t>
+              <a:t>. </a:t>
+            </a:r>
+            <a:r>
+              <a:rPr lang="en-US" sz="2400" dirty="0">
+                <a:latin typeface="Arial" panose="020B0604020202020204" pitchFamily="34" charset="0"/>
+                <a:ea typeface="+mn-lt"/>
+                <a:cs typeface="Arial" panose="020B0604020202020204" pitchFamily="34" charset="0"/>
+                <a:sym typeface="Wingdings" pitchFamily="2" charset="2"/>
+              </a:rPr>
+              <a:t>These embeddings should be more specific for our problem than ESM.</a:t>
             </a:r>
             <a:endParaRPr lang="en-US" sz="2400" dirty="0">
               <a:latin typeface="Arial" panose="020B0604020202020204" pitchFamily="34" charset="0"/>
@@ -4995,7 +4998,7 @@
           <p:cNvPr id="52" name="TextBox 51">
             <a:extLst>
               <a:ext uri="{FF2B5EF4-FFF2-40B4-BE49-F238E27FC236}">
-                <a16:creationId xmlns:a16="http://schemas.microsoft.com/office/drawing/2014/main" xmlns="" id="{8D25C8AF-29B9-4B5F-A484-1C152F2D45F1}"/>
+                <a16:creationId xmlns:a16="http://schemas.microsoft.com/office/drawing/2014/main" id="{8D25C8AF-29B9-4B5F-A484-1C152F2D45F1}"/>
               </a:ext>
             </a:extLst>
           </p:cNvPr>
@@ -5090,7 +5093,7 @@
           <p:cNvPr id="59" name="TextBox 58">
             <a:extLst>
               <a:ext uri="{FF2B5EF4-FFF2-40B4-BE49-F238E27FC236}">
-                <a16:creationId xmlns:a16="http://schemas.microsoft.com/office/drawing/2014/main" xmlns="" id="{25FCE40A-6812-4241-9AFC-C4527E1E08D6}"/>
+                <a16:creationId xmlns:a16="http://schemas.microsoft.com/office/drawing/2014/main" id="{25FCE40A-6812-4241-9AFC-C4527E1E08D6}"/>
               </a:ext>
             </a:extLst>
           </p:cNvPr>
@@ -5225,7 +5228,7 @@
           <p:cNvPr id="60" name="TextBox 59">
             <a:extLst>
               <a:ext uri="{FF2B5EF4-FFF2-40B4-BE49-F238E27FC236}">
-                <a16:creationId xmlns:a16="http://schemas.microsoft.com/office/drawing/2014/main" xmlns="" id="{5EC9703E-C0FE-42AC-9186-837AE535C777}"/>
+                <a16:creationId xmlns:a16="http://schemas.microsoft.com/office/drawing/2014/main" id="{5EC9703E-C0FE-42AC-9186-837AE535C777}"/>
               </a:ext>
             </a:extLst>
           </p:cNvPr>
@@ -5311,7 +5314,7 @@
           <p:cNvPr id="62" name="TextBox 61">
             <a:extLst>
               <a:ext uri="{FF2B5EF4-FFF2-40B4-BE49-F238E27FC236}">
-                <a16:creationId xmlns:a16="http://schemas.microsoft.com/office/drawing/2014/main" xmlns="" id="{658BED85-75EA-4BFC-BF85-417C54E59FAC}"/>
+                <a16:creationId xmlns:a16="http://schemas.microsoft.com/office/drawing/2014/main" id="{658BED85-75EA-4BFC-BF85-417C54E59FAC}"/>
               </a:ext>
             </a:extLst>
           </p:cNvPr>
@@ -5421,7 +5424,7 @@
           <p:cNvPr id="16" name="Table 16">
             <a:extLst>
               <a:ext uri="{FF2B5EF4-FFF2-40B4-BE49-F238E27FC236}">
-                <a16:creationId xmlns:a16="http://schemas.microsoft.com/office/drawing/2014/main" xmlns="" id="{B3DD0E64-0B7C-4139-8170-FF729427F72A}"/>
+                <a16:creationId xmlns:a16="http://schemas.microsoft.com/office/drawing/2014/main" id="{B3DD0E64-0B7C-4139-8170-FF729427F72A}"/>
               </a:ext>
             </a:extLst>
           </p:cNvPr>
@@ -5450,42 +5453,42 @@
                 <a:gridCol w="3045949">
                   <a:extLst>
                     <a:ext uri="{9D8B030D-6E8A-4147-A177-3AD203B41FA5}">
-                      <a16:colId xmlns:a16="http://schemas.microsoft.com/office/drawing/2014/main" xmlns="" val="630018940"/>
+                      <a16:colId xmlns:a16="http://schemas.microsoft.com/office/drawing/2014/main" val="630018940"/>
                     </a:ext>
                   </a:extLst>
                 </a:gridCol>
                 <a:gridCol w="805180">
                   <a:extLst>
                     <a:ext uri="{9D8B030D-6E8A-4147-A177-3AD203B41FA5}">
-                      <a16:colId xmlns:a16="http://schemas.microsoft.com/office/drawing/2014/main" xmlns="" val="1361621000"/>
+                      <a16:colId xmlns:a16="http://schemas.microsoft.com/office/drawing/2014/main" val="1361621000"/>
                     </a:ext>
                   </a:extLst>
                 </a:gridCol>
                 <a:gridCol w="887730">
                   <a:extLst>
                     <a:ext uri="{9D8B030D-6E8A-4147-A177-3AD203B41FA5}">
-                      <a16:colId xmlns:a16="http://schemas.microsoft.com/office/drawing/2014/main" xmlns="" val="3966724582"/>
+                      <a16:colId xmlns:a16="http://schemas.microsoft.com/office/drawing/2014/main" val="3966724582"/>
                     </a:ext>
                   </a:extLst>
                 </a:gridCol>
                 <a:gridCol w="1395730">
                   <a:extLst>
                     <a:ext uri="{9D8B030D-6E8A-4147-A177-3AD203B41FA5}">
-                      <a16:colId xmlns:a16="http://schemas.microsoft.com/office/drawing/2014/main" xmlns="" val="2736714997"/>
+                      <a16:colId xmlns:a16="http://schemas.microsoft.com/office/drawing/2014/main" val="2736714997"/>
                     </a:ext>
                   </a:extLst>
                 </a:gridCol>
                 <a:gridCol w="1000443">
                   <a:extLst>
                     <a:ext uri="{9D8B030D-6E8A-4147-A177-3AD203B41FA5}">
-                      <a16:colId xmlns:a16="http://schemas.microsoft.com/office/drawing/2014/main" xmlns="" val="3764394228"/>
+                      <a16:colId xmlns:a16="http://schemas.microsoft.com/office/drawing/2014/main" val="3764394228"/>
                     </a:ext>
                   </a:extLst>
                 </a:gridCol>
                 <a:gridCol w="887730">
                   <a:extLst>
                     <a:ext uri="{9D8B030D-6E8A-4147-A177-3AD203B41FA5}">
-                      <a16:colId xmlns:a16="http://schemas.microsoft.com/office/drawing/2014/main" xmlns="" val="4125354729"/>
+                      <a16:colId xmlns:a16="http://schemas.microsoft.com/office/drawing/2014/main" val="4125354729"/>
                     </a:ext>
                   </a:extLst>
                 </a:gridCol>
@@ -5643,7 +5646,7 @@
                 </a:tc>
                 <a:extLst>
                   <a:ext uri="{0D108BD9-81ED-4DB2-BD59-A6C34878D82A}">
-                    <a16:rowId xmlns:a16="http://schemas.microsoft.com/office/drawing/2014/main" xmlns="" val="2350932793"/>
+                    <a16:rowId xmlns:a16="http://schemas.microsoft.com/office/drawing/2014/main" val="2350932793"/>
                   </a:ext>
                 </a:extLst>
               </a:tr>
@@ -5830,7 +5833,7 @@
                 </a:tc>
                 <a:extLst>
                   <a:ext uri="{0D108BD9-81ED-4DB2-BD59-A6C34878D82A}">
-                    <a16:rowId xmlns:a16="http://schemas.microsoft.com/office/drawing/2014/main" xmlns="" val="2262440005"/>
+                    <a16:rowId xmlns:a16="http://schemas.microsoft.com/office/drawing/2014/main" val="2262440005"/>
                   </a:ext>
                 </a:extLst>
               </a:tr>
@@ -6017,7 +6020,7 @@
                 </a:tc>
                 <a:extLst>
                   <a:ext uri="{0D108BD9-81ED-4DB2-BD59-A6C34878D82A}">
-                    <a16:rowId xmlns:a16="http://schemas.microsoft.com/office/drawing/2014/main" xmlns="" val="3805626318"/>
+                    <a16:rowId xmlns:a16="http://schemas.microsoft.com/office/drawing/2014/main" val="3805626318"/>
                   </a:ext>
                 </a:extLst>
               </a:tr>
@@ -6204,7 +6207,7 @@
                 </a:tc>
                 <a:extLst>
                   <a:ext uri="{0D108BD9-81ED-4DB2-BD59-A6C34878D82A}">
-                    <a16:rowId xmlns:a16="http://schemas.microsoft.com/office/drawing/2014/main" xmlns="" val="3022607923"/>
+                    <a16:rowId xmlns:a16="http://schemas.microsoft.com/office/drawing/2014/main" val="3022607923"/>
                   </a:ext>
                 </a:extLst>
               </a:tr>
@@ -6391,7 +6394,7 @@
                 </a:tc>
                 <a:extLst>
                   <a:ext uri="{0D108BD9-81ED-4DB2-BD59-A6C34878D82A}">
-                    <a16:rowId xmlns:a16="http://schemas.microsoft.com/office/drawing/2014/main" xmlns="" val="73323118"/>
+                    <a16:rowId xmlns:a16="http://schemas.microsoft.com/office/drawing/2014/main" val="73323118"/>
                   </a:ext>
                 </a:extLst>
               </a:tr>
@@ -6404,7 +6407,7 @@
           <p:cNvPr id="34" name="Picture 33">
             <a:extLst>
               <a:ext uri="{FF2B5EF4-FFF2-40B4-BE49-F238E27FC236}">
-                <a16:creationId xmlns:a16="http://schemas.microsoft.com/office/drawing/2014/main" xmlns="" id="{009AA18F-AFE2-5D47-9309-6D28CEF1AEC7}"/>
+                <a16:creationId xmlns:a16="http://schemas.microsoft.com/office/drawing/2014/main" id="{009AA18F-AFE2-5D47-9309-6D28CEF1AEC7}"/>
               </a:ext>
             </a:extLst>
           </p:cNvPr>
@@ -6434,7 +6437,7 @@
           <p:cNvPr id="10" name="TextBox 9">
             <a:extLst>
               <a:ext uri="{FF2B5EF4-FFF2-40B4-BE49-F238E27FC236}">
-                <a16:creationId xmlns:a16="http://schemas.microsoft.com/office/drawing/2014/main" xmlns="" id="{5305FA10-9288-7B48-90B7-C15D115D1054}"/>
+                <a16:creationId xmlns:a16="http://schemas.microsoft.com/office/drawing/2014/main" id="{5305FA10-9288-7B48-90B7-C15D115D1054}"/>
               </a:ext>
             </a:extLst>
           </p:cNvPr>
@@ -6489,7 +6492,7 @@
           <p:cNvPr id="42" name="Rectangle 41">
             <a:extLst>
               <a:ext uri="{FF2B5EF4-FFF2-40B4-BE49-F238E27FC236}">
-                <a16:creationId xmlns:a16="http://schemas.microsoft.com/office/drawing/2014/main" xmlns="" id="{8F9D5055-0619-1C43-BE80-475271362937}"/>
+                <a16:creationId xmlns:a16="http://schemas.microsoft.com/office/drawing/2014/main" id="{8F9D5055-0619-1C43-BE80-475271362937}"/>
               </a:ext>
             </a:extLst>
           </p:cNvPr>
@@ -6535,7 +6538,7 @@
           <p:cNvPr id="1028" name="Picture 4">
             <a:extLst>
               <a:ext uri="{FF2B5EF4-FFF2-40B4-BE49-F238E27FC236}">
-                <a16:creationId xmlns:a16="http://schemas.microsoft.com/office/drawing/2014/main" xmlns="" id="{3F9F01C9-07DA-264D-BEC8-52DCD921122E}"/>
+                <a16:creationId xmlns:a16="http://schemas.microsoft.com/office/drawing/2014/main" id="{3F9F01C9-07DA-264D-BEC8-52DCD921122E}"/>
               </a:ext>
             </a:extLst>
           </p:cNvPr>
@@ -6582,7 +6585,7 @@
           <p:cNvPr id="6" name="Table 6">
             <a:extLst>
               <a:ext uri="{FF2B5EF4-FFF2-40B4-BE49-F238E27FC236}">
-                <a16:creationId xmlns:a16="http://schemas.microsoft.com/office/drawing/2014/main" xmlns="" id="{3760B689-1A4D-3246-9088-5992D7F633AE}"/>
+                <a16:creationId xmlns:a16="http://schemas.microsoft.com/office/drawing/2014/main" id="{3760B689-1A4D-3246-9088-5992D7F633AE}"/>
               </a:ext>
             </a:extLst>
           </p:cNvPr>
@@ -6611,21 +6614,21 @@
                 <a:gridCol w="1976441">
                   <a:extLst>
                     <a:ext uri="{9D8B030D-6E8A-4147-A177-3AD203B41FA5}">
-                      <a16:colId xmlns:a16="http://schemas.microsoft.com/office/drawing/2014/main" xmlns="" val="2349603488"/>
+                      <a16:colId xmlns:a16="http://schemas.microsoft.com/office/drawing/2014/main" val="2349603488"/>
                     </a:ext>
                   </a:extLst>
                 </a:gridCol>
                 <a:gridCol w="1976441">
                   <a:extLst>
                     <a:ext uri="{9D8B030D-6E8A-4147-A177-3AD203B41FA5}">
-                      <a16:colId xmlns:a16="http://schemas.microsoft.com/office/drawing/2014/main" xmlns="" val="3515897520"/>
+                      <a16:colId xmlns:a16="http://schemas.microsoft.com/office/drawing/2014/main" val="3515897520"/>
                     </a:ext>
                   </a:extLst>
                 </a:gridCol>
                 <a:gridCol w="1976441">
                   <a:extLst>
                     <a:ext uri="{9D8B030D-6E8A-4147-A177-3AD203B41FA5}">
-                      <a16:colId xmlns:a16="http://schemas.microsoft.com/office/drawing/2014/main" xmlns="" val="3363298409"/>
+                      <a16:colId xmlns:a16="http://schemas.microsoft.com/office/drawing/2014/main" val="3363298409"/>
                     </a:ext>
                   </a:extLst>
                 </a:gridCol>
@@ -6693,7 +6696,7 @@
                 </a:tc>
                 <a:extLst>
                   <a:ext uri="{0D108BD9-81ED-4DB2-BD59-A6C34878D82A}">
-                    <a16:rowId xmlns:a16="http://schemas.microsoft.com/office/drawing/2014/main" xmlns="" val="3087985295"/>
+                    <a16:rowId xmlns:a16="http://schemas.microsoft.com/office/drawing/2014/main" val="3087985295"/>
                   </a:ext>
                 </a:extLst>
               </a:tr>
@@ -6757,7 +6760,7 @@
                 </a:tc>
                 <a:extLst>
                   <a:ext uri="{0D108BD9-81ED-4DB2-BD59-A6C34878D82A}">
-                    <a16:rowId xmlns:a16="http://schemas.microsoft.com/office/drawing/2014/main" xmlns="" val="1359549375"/>
+                    <a16:rowId xmlns:a16="http://schemas.microsoft.com/office/drawing/2014/main" val="1359549375"/>
                   </a:ext>
                 </a:extLst>
               </a:tr>
@@ -6821,7 +6824,7 @@
                 </a:tc>
                 <a:extLst>
                   <a:ext uri="{0D108BD9-81ED-4DB2-BD59-A6C34878D82A}">
-                    <a16:rowId xmlns:a16="http://schemas.microsoft.com/office/drawing/2014/main" xmlns="" val="1069740977"/>
+                    <a16:rowId xmlns:a16="http://schemas.microsoft.com/office/drawing/2014/main" val="1069740977"/>
                   </a:ext>
                 </a:extLst>
               </a:tr>
@@ -6834,7 +6837,7 @@
           <p:cNvPr id="46" name="Rectangle 45">
             <a:extLst>
               <a:ext uri="{FF2B5EF4-FFF2-40B4-BE49-F238E27FC236}">
-                <a16:creationId xmlns:a16="http://schemas.microsoft.com/office/drawing/2014/main" xmlns="" id="{964E3663-361F-234F-8DB1-125E94CA453E}"/>
+                <a16:creationId xmlns:a16="http://schemas.microsoft.com/office/drawing/2014/main" id="{964E3663-361F-234F-8DB1-125E94CA453E}"/>
               </a:ext>
             </a:extLst>
           </p:cNvPr>
@@ -6871,7 +6874,7 @@
           <p:cNvPr id="11" name="Group 10">
             <a:extLst>
               <a:ext uri="{FF2B5EF4-FFF2-40B4-BE49-F238E27FC236}">
-                <a16:creationId xmlns:a16="http://schemas.microsoft.com/office/drawing/2014/main" xmlns="" id="{3AED7200-7C92-B14A-84E4-06156227898D}"/>
+                <a16:creationId xmlns:a16="http://schemas.microsoft.com/office/drawing/2014/main" id="{3AED7200-7C92-B14A-84E4-06156227898D}"/>
               </a:ext>
             </a:extLst>
           </p:cNvPr>
@@ -6891,7 +6894,7 @@
             <p:cNvPr id="4" name="Picture 2">
               <a:extLst>
                 <a:ext uri="{FF2B5EF4-FFF2-40B4-BE49-F238E27FC236}">
-                  <a16:creationId xmlns:a16="http://schemas.microsoft.com/office/drawing/2014/main" xmlns="" id="{A70BCE07-72DC-0247-A3B9-AB0B19DA3D7C}"/>
+                  <a16:creationId xmlns:a16="http://schemas.microsoft.com/office/drawing/2014/main" id="{A70BCE07-72DC-0247-A3B9-AB0B19DA3D7C}"/>
                 </a:ext>
               </a:extLst>
             </p:cNvPr>
@@ -6938,7 +6941,7 @@
             <p:cNvPr id="9" name="Rectangle 8">
               <a:extLst>
                 <a:ext uri="{FF2B5EF4-FFF2-40B4-BE49-F238E27FC236}">
-                  <a16:creationId xmlns:a16="http://schemas.microsoft.com/office/drawing/2014/main" xmlns="" id="{66A57E36-D0AE-F64A-8DC0-85C4FBDEDA93}"/>
+                  <a16:creationId xmlns:a16="http://schemas.microsoft.com/office/drawing/2014/main" id="{66A57E36-D0AE-F64A-8DC0-85C4FBDEDA93}"/>
                 </a:ext>
               </a:extLst>
             </p:cNvPr>
@@ -6991,7 +6994,7 @@
           <p:cNvPr id="13" name="Picture 12">
             <a:extLst>
               <a:ext uri="{FF2B5EF4-FFF2-40B4-BE49-F238E27FC236}">
-                <a16:creationId xmlns:a16="http://schemas.microsoft.com/office/drawing/2014/main" xmlns="" id="{61D7E7CE-F29E-0E48-AB01-D8F922CEE716}"/>
+                <a16:creationId xmlns:a16="http://schemas.microsoft.com/office/drawing/2014/main" id="{61D7E7CE-F29E-0E48-AB01-D8F922CEE716}"/>
               </a:ext>
             </a:extLst>
           </p:cNvPr>
@@ -7586,18 +7589,18 @@
 </file>
 
 <file path=customXml/item1.xml><?xml version="1.0" encoding="utf-8"?>
+<p:properties xmlns:p="http://schemas.microsoft.com/office/2006/metadata/properties" xmlns:xsi="http://www.w3.org/2001/XMLSchema-instance" xmlns:pc="http://schemas.microsoft.com/office/infopath/2007/PartnerControls">
+  <documentManagement/>
+</p:properties>
+</file>
+
+<file path=customXml/item2.xml><?xml version="1.0" encoding="utf-8"?>
 <?mso-contentType ?>
 <FormTemplates xmlns="http://schemas.microsoft.com/sharepoint/v3/contenttype/forms">
   <Display>DocumentLibraryForm</Display>
   <Edit>DocumentLibraryForm</Edit>
   <New>DocumentLibraryForm</New>
 </FormTemplates>
-</file>
-
-<file path=customXml/item2.xml><?xml version="1.0" encoding="utf-8"?>
-<p:properties xmlns:p="http://schemas.microsoft.com/office/2006/metadata/properties" xmlns:xsi="http://www.w3.org/2001/XMLSchema-instance" xmlns:pc="http://schemas.microsoft.com/office/infopath/2007/PartnerControls">
-  <documentManagement/>
-</p:properties>
 </file>
 
 <file path=customXml/item3.xml><?xml version="1.0" encoding="utf-8"?>
@@ -7733,18 +7736,18 @@
 </file>
 
 <file path=customXml/itemProps1.xml><?xml version="1.0" encoding="utf-8"?>
-<ds:datastoreItem xmlns:ds="http://schemas.openxmlformats.org/officeDocument/2006/customXml" ds:itemID="{405562AF-484A-42F9-A02C-A3F5AD59D6C1}">
+<ds:datastoreItem xmlns:ds="http://schemas.openxmlformats.org/officeDocument/2006/customXml" ds:itemID="{CB370A3C-731B-4F4D-ABD0-42474AC25910}">
   <ds:schemaRefs>
-    <ds:schemaRef ds:uri="http://schemas.microsoft.com/sharepoint/v3/contenttype/forms"/>
+    <ds:schemaRef ds:uri="http://schemas.microsoft.com/office/2006/metadata/properties"/>
+    <ds:schemaRef ds:uri="http://schemas.microsoft.com/office/infopath/2007/PartnerControls"/>
   </ds:schemaRefs>
 </ds:datastoreItem>
 </file>
 
 <file path=customXml/itemProps2.xml><?xml version="1.0" encoding="utf-8"?>
-<ds:datastoreItem xmlns:ds="http://schemas.openxmlformats.org/officeDocument/2006/customXml" ds:itemID="{CB370A3C-731B-4F4D-ABD0-42474AC25910}">
+<ds:datastoreItem xmlns:ds="http://schemas.openxmlformats.org/officeDocument/2006/customXml" ds:itemID="{405562AF-484A-42F9-A02C-A3F5AD59D6C1}">
   <ds:schemaRefs>
-    <ds:schemaRef ds:uri="http://schemas.microsoft.com/office/2006/metadata/properties"/>
-    <ds:schemaRef ds:uri="http://schemas.microsoft.com/office/infopath/2007/PartnerControls"/>
+    <ds:schemaRef ds:uri="http://schemas.microsoft.com/sharepoint/v3/contenttype/forms"/>
   </ds:schemaRefs>
 </ds:datastoreItem>
 </file>

</xml_diff>